<commit_message>
Deploying to gh-pages from @ ManuelePasini/slides-markdown@b340a786b5ea502051575306727e0e8b3b7b7bca 🚀
</commit_message>
<xml_diff>
--- a/phd_secondyear.pptx
+++ b/phd_secondyear.pptx
@@ -13,6 +13,9 @@
     <p:sldId id="261" r:id="rId7"/>
     <p:sldId id="262" r:id="rId8"/>
     <p:sldId id="263" r:id="rId9"/>
+    <p:sldId id="264" r:id="rId10"/>
+    <p:sldId id="265" r:id="rId11"/>
+    <p:sldId id="266" r:id="rId12"/>
   </p:sldIdLst>
   <p:sldSz cx="9144000" cy="5143500" type="screen16x9"/>
   <p:notesSz cx="6858000" cy="9144000"/>
@@ -3180,6 +3183,290 @@
 </p:sld>
 </file>
 
+<file path=ppt/slides/slide10.xml><?xml version="1.0" encoding="utf-8"?>
+<p:sld xmlns:a="http://schemas.openxmlformats.org/drawingml/2006/main" xmlns:r="http://schemas.openxmlformats.org/officeDocument/2006/relationships" xmlns:p="http://schemas.openxmlformats.org/presentationml/2006/main">
+  <p:cSld>
+    <p:spTree>
+      <p:nvGrpSpPr>
+        <p:cNvPr id="1" name=""/>
+        <p:cNvGrpSpPr/>
+        <p:nvPr/>
+      </p:nvGrpSpPr>
+      <p:grpSpPr>
+        <a:xfrm>
+          <a:off x="0" y="0"/>
+          <a:ext cx="0" cy="0"/>
+          <a:chOff x="0" y="0"/>
+          <a:chExt cx="0" cy="0"/>
+        </a:xfrm>
+      </p:grpSpPr>
+      <p:sp>
+        <p:nvSpPr>
+          <p:cNvPr id="2" name="Title 1"/>
+          <p:cNvSpPr>
+            <a:spLocks noGrp="1"/>
+          </p:cNvSpPr>
+          <p:nvPr>
+            <p:ph type="title"/>
+          </p:nvPr>
+        </p:nvSpPr>
+        <p:spPr/>
+        <p:txBody>
+          <a:bodyPr/>
+          <a:lstStyle/>
+          <a:p>
+            <a:pPr lvl="0" indent="0" marL="0">
+              <a:buNone/>
+            </a:pPr>
+            <a:r>
+              <a:rPr/>
+              <a:t>An Hybryd data structure enabling Digital Twin Data</a:t>
+            </a:r>
+          </a:p>
+        </p:txBody>
+      </p:sp>
+      <p:sp>
+        <p:nvSpPr>
+          <p:cNvPr id="3" name="Content Placeholder 2"/>
+          <p:cNvSpPr>
+            <a:spLocks noGrp="1"/>
+          </p:cNvSpPr>
+          <p:nvPr>
+            <p:ph idx="1"/>
+          </p:nvPr>
+        </p:nvSpPr>
+        <p:spPr/>
+        <p:txBody>
+          <a:bodyPr/>
+          <a:lstStyle/>
+          <a:p>
+            <a:pPr lvl="0"/>
+            <a:r>
+              <a:rPr/>
+              <a:t>Workload definition (queries)</a:t>
+            </a:r>
+          </a:p>
+        </p:txBody>
+      </p:sp>
+    </p:spTree>
+  </p:cSld>
+</p:sld>
+</file>
+
+<file path=ppt/slides/slide11.xml><?xml version="1.0" encoding="utf-8"?>
+<p:sld xmlns:a="http://schemas.openxmlformats.org/drawingml/2006/main" xmlns:r="http://schemas.openxmlformats.org/officeDocument/2006/relationships" xmlns:p="http://schemas.openxmlformats.org/presentationml/2006/main">
+  <p:cSld>
+    <p:spTree>
+      <p:nvGrpSpPr>
+        <p:cNvPr id="1" name=""/>
+        <p:cNvGrpSpPr/>
+        <p:nvPr/>
+      </p:nvGrpSpPr>
+      <p:grpSpPr>
+        <a:xfrm>
+          <a:off x="0" y="0"/>
+          <a:ext cx="0" cy="0"/>
+          <a:chOff x="0" y="0"/>
+          <a:chExt cx="0" cy="0"/>
+        </a:xfrm>
+      </p:grpSpPr>
+      <p:sp>
+        <p:nvSpPr>
+          <p:cNvPr id="2" name="Title 1"/>
+          <p:cNvSpPr>
+            <a:spLocks noGrp="1"/>
+          </p:cNvSpPr>
+          <p:nvPr>
+            <p:ph type="title"/>
+          </p:nvPr>
+        </p:nvSpPr>
+        <p:spPr/>
+        <p:txBody>
+          <a:bodyPr/>
+          <a:lstStyle/>
+          <a:p>
+            <a:pPr lvl="0" indent="0" marL="0">
+              <a:buNone/>
+            </a:pPr>
+            <a:r>
+              <a:rPr/>
+              <a:t>External activities</a:t>
+            </a:r>
+          </a:p>
+        </p:txBody>
+      </p:sp>
+      <p:sp>
+        <p:nvSpPr>
+          <p:cNvPr id="3" name="Content Placeholder 2"/>
+          <p:cNvSpPr>
+            <a:spLocks noGrp="1"/>
+          </p:cNvSpPr>
+          <p:nvPr>
+            <p:ph idx="1"/>
+          </p:nvPr>
+        </p:nvSpPr>
+        <p:spPr/>
+        <p:txBody>
+          <a:bodyPr/>
+          <a:lstStyle/>
+          <a:p>
+            <a:pPr lvl="0" indent="0" marL="0">
+              <a:spcBef>
+                <a:spcPts val="3000"/>
+              </a:spcBef>
+              <a:buNone/>
+            </a:pPr>
+            <a:r>
+              <a:rPr b="1"/>
+              <a:t>Tutoring</a:t>
+            </a:r>
+          </a:p>
+          <a:p>
+            <a:pPr lvl="0"/>
+            <a:r>
+              <a:rPr/>
+              <a:t>95631 - MACHINE LEARNING AND DATA MINING - 6 cfu (a.a. 23/24)</a:t>
+            </a:r>
+          </a:p>
+          <a:p>
+            <a:pPr lvl="0"/>
+            <a:r>
+              <a:rPr/>
+              <a:t>95631 - MACHINE LEARNING AND DATA MINING - 6 cfu (a.a. 24/25)</a:t>
+            </a:r>
+          </a:p>
+          <a:p>
+            <a:pPr lvl="0"/>
+            <a:r>
+              <a:rPr/>
+              <a:t>95631 - MACHINE LEARNING AND DATA MINING - 6 cfu (a.a. 25/26)</a:t>
+            </a:r>
+          </a:p>
+          <a:p>
+            <a:pPr lvl="0" indent="0" marL="0">
+              <a:spcBef>
+                <a:spcPts val="3000"/>
+              </a:spcBef>
+              <a:buNone/>
+            </a:pPr>
+            <a:r>
+              <a:rPr b="1"/>
+              <a:t>Summer schools</a:t>
+            </a:r>
+          </a:p>
+          <a:p>
+            <a:pPr lvl="0"/>
+            <a:r>
+              <a:rPr/>
+              <a:t>6th ACM Europe Summer School on Data Science, Ioannina (Greece)</a:t>
+            </a:r>
+          </a:p>
+          <a:p>
+            <a:pPr lvl="0" indent="0" marL="0">
+              <a:spcBef>
+                <a:spcPts val="3000"/>
+              </a:spcBef>
+              <a:buNone/>
+            </a:pPr>
+            <a:r>
+              <a:rPr b="1"/>
+              <a:t>Conferences</a:t>
+            </a:r>
+          </a:p>
+          <a:p>
+            <a:pPr lvl="0"/>
+            <a:r>
+              <a:rPr/>
+              <a:t>Project meeting Spoke 3 PNRR Agritech</a:t>
+            </a:r>
+          </a:p>
+          <a:p>
+            <a:pPr lvl="0"/>
+            <a:r>
+              <a:rPr/>
+              <a:t>EDBT/ICDT 2024 Joint Conference</a:t>
+            </a:r>
+          </a:p>
+          <a:p>
+            <a:pPr lvl="0" indent="0" marL="0">
+              <a:spcBef>
+                <a:spcPts val="3000"/>
+              </a:spcBef>
+              <a:buNone/>
+            </a:pPr>
+            <a:r>
+              <a:rPr b="1"/>
+              <a:t>External activities</a:t>
+            </a:r>
+          </a:p>
+          <a:p>
+            <a:pPr lvl="0"/>
+            <a:r>
+              <a:rPr/>
+              <a:t>Teaching Relational Database, 30 hrs, ITS Olivetti (2023/2024)</a:t>
+            </a:r>
+          </a:p>
+          <a:p>
+            <a:pPr lvl="0"/>
+            <a:r>
+              <a:rPr/>
+              <a:t>Teaching NoSQL Database, 30 hrs, ITS Olivetti (2024/2025)</a:t>
+            </a:r>
+          </a:p>
+          <a:p>
+            <a:pPr lvl="0"/>
+            <a:r>
+              <a:rPr/>
+              <a:t>Teaching NoSQL Database, 30 hrs, ITS Olivetti (2025/2026)</a:t>
+            </a:r>
+          </a:p>
+          <a:p>
+            <a:pPr lvl="0"/>
+            <a:r>
+              <a:rPr/>
+              <a:t>Consultancy on Digitalization in Precision Agriculture, iFarming s.r.l.</a:t>
+            </a:r>
+          </a:p>
+          <a:p>
+            <a:pPr lvl="0" indent="0" marL="0">
+              <a:spcBef>
+                <a:spcPts val="3000"/>
+              </a:spcBef>
+              <a:buNone/>
+            </a:pPr>
+            <a:r>
+              <a:rPr b="1"/>
+              <a:t>Bachelor Thesis advisr</a:t>
+            </a:r>
+          </a:p>
+          <a:p>
+            <a:pPr lvl="0"/>
+            <a:r>
+              <a:rPr/>
+              <a:t>Denis Nikaj (Progettazione e prototipazione di un’applicazione web per l’irrigazione di precisione), March 2024.</a:t>
+            </a:r>
+          </a:p>
+          <a:p>
+            <a:pPr lvl="0"/>
+            <a:r>
+              <a:rPr/>
+              <a:t>Davide Speziali (Progettazione e realizzazione di un simulatore per l’irrigazione di precisione), December 2024.</a:t>
+            </a:r>
+          </a:p>
+          <a:p>
+            <a:pPr lvl="0"/>
+            <a:r>
+              <a:rPr/>
+              <a:t>Federico Capponi (Progettazione e prototipazione di un sistema di irrigazione di precisione), July 2025.</a:t>
+            </a:r>
+          </a:p>
+        </p:txBody>
+      </p:sp>
+    </p:spTree>
+  </p:cSld>
+</p:sld>
+</file>
+
 <file path=ppt/slides/slide2.xml><?xml version="1.0" encoding="utf-8"?>
 <p:sld xmlns:a="http://schemas.openxmlformats.org/drawingml/2006/main" xmlns:r="http://schemas.openxmlformats.org/officeDocument/2006/relationships" xmlns:p="http://schemas.openxmlformats.org/presentationml/2006/main">
   <p:cSld>
@@ -3713,7 +4000,7 @@
             <a:pPr lvl="0"/>
             <a:r>
               <a:rPr/>
-              <a:t>Scientific Article submitted to Computer and Electronics in Agriculture (September 2025)</a:t>
+              <a:t>Scientific Article submitted to Computer and Electronics in Agriculture (September 2025).</a:t>
             </a:r>
           </a:p>
         </p:txBody>
@@ -3760,7 +4047,7 @@
             </a:pPr>
             <a:r>
               <a:rPr/>
-              <a:t>From application oriented to domain oriented</a:t>
+              <a:t>A Data Platform fostering collaboration between DTs</a:t>
             </a:r>
           </a:p>
         </p:txBody>
@@ -3831,8 +4118,8 @@
           <a:p>
             <a:pPr lvl="0"/>
             <a:r>
-              <a:rPr/>
-              <a:t>A DT can be described by the pipelines of data</a:t>
+              <a:rPr b="1"/>
+              <a:t>Currently working on its implementation</a:t>
             </a:r>
           </a:p>
         </p:txBody>
@@ -3879,7 +4166,7 @@
             </a:pPr>
             <a:r>
               <a:rPr/>
-              <a:t>External activities</a:t>
+              <a:t>From application-oriented to domain-oriented</a:t>
             </a:r>
           </a:p>
         </p:txBody>
@@ -3899,154 +4186,85 @@
           <a:bodyPr/>
           <a:lstStyle/>
           <a:p>
+            <a:pPr lvl="0"/>
+            <a:r>
+              <a:rPr/>
+              <a:t>A DT can be characterized by the data pipelines that collect, process, and generate insights from data.</a:t>
+            </a:r>
+          </a:p>
+          <a:p>
+            <a:pPr lvl="0"/>
+            <a:r>
+              <a:rPr/>
+              <a:t>Is it possible, given a data pipeline, to determine the set of a data platform services enibling such pipeline?</a:t>
+            </a:r>
+          </a:p>
+          <a:p>
+            <a:pPr lvl="0"/>
+            <a:r>
+              <a:rPr/>
+              <a:t>Matteo Francia, Matteo Golfarelli, Manuele Pasini - Towards a process-driven design of data platforms. In DOLAP, pages 28–35, 2024.</a:t>
+            </a:r>
+          </a:p>
+          <a:p>
+            <a:pPr lvl="0"/>
+            <a:r>
+              <a:rPr/>
+              <a:t>Matteo Francia, Matteo Golfarelli, Manuele Pasini - Process-Driven Design of Cloud Data Platforms, Information Systems journal, Manuscript Number: INFOSYS-D-24-00444</a:t>
+            </a:r>
+          </a:p>
+          <a:p>
+            <a:pPr lvl="0"/>
+            <a:r>
+              <a:rPr b="1"/>
+              <a:t>But something was missing..</a:t>
+            </a:r>
+          </a:p>
+        </p:txBody>
+      </p:sp>
+    </p:spTree>
+  </p:cSld>
+</p:sld>
+</file>
+
+<file path=ppt/slides/slide9.xml><?xml version="1.0" encoding="utf-8"?>
+<p:sld xmlns:a="http://schemas.openxmlformats.org/drawingml/2006/main" xmlns:r="http://schemas.openxmlformats.org/officeDocument/2006/relationships" xmlns:p="http://schemas.openxmlformats.org/presentationml/2006/main">
+  <p:cSld>
+    <p:spTree>
+      <p:nvGrpSpPr>
+        <p:cNvPr id="1" name=""/>
+        <p:cNvGrpSpPr/>
+        <p:nvPr/>
+      </p:nvGrpSpPr>
+      <p:grpSpPr>
+        <a:xfrm>
+          <a:off x="0" y="0"/>
+          <a:ext cx="0" cy="0"/>
+          <a:chOff x="0" y="0"/>
+          <a:chExt cx="0" cy="0"/>
+        </a:xfrm>
+      </p:grpSpPr>
+      <p:sp>
+        <p:nvSpPr>
+          <p:cNvPr id="2" name="Title 1"/>
+          <p:cNvSpPr>
+            <a:spLocks noGrp="1"/>
+          </p:cNvSpPr>
+          <p:nvPr>
+            <p:ph type="title"/>
+          </p:nvPr>
+        </p:nvSpPr>
+        <p:spPr/>
+        <p:txBody>
+          <a:bodyPr/>
+          <a:lstStyle/>
+          <a:p>
             <a:pPr lvl="0" indent="0" marL="0">
-              <a:spcBef>
-                <a:spcPts val="3000"/>
-              </a:spcBef>
               <a:buNone/>
             </a:pPr>
             <a:r>
-              <a:rPr b="1"/>
-              <a:t>Tutoring</a:t>
-            </a:r>
-          </a:p>
-          <a:p>
-            <a:pPr lvl="0"/>
-            <a:r>
               <a:rPr/>
-              <a:t>95631 - MACHINE LEARNING AND DATA MINING - 6 cfu (a.a. 23/24)</a:t>
-            </a:r>
-          </a:p>
-          <a:p>
-            <a:pPr lvl="0"/>
-            <a:r>
-              <a:rPr/>
-              <a:t>95631 - MACHINE LEARNING AND DATA MINING - 6 cfu (a.a. 24/25)</a:t>
-            </a:r>
-          </a:p>
-          <a:p>
-            <a:pPr lvl="0"/>
-            <a:r>
-              <a:rPr/>
-              <a:t>95631 - MACHINE LEARNING AND DATA MINING - 6 cfu (a.a. 25/26)</a:t>
-            </a:r>
-          </a:p>
-          <a:p>
-            <a:pPr lvl="0" indent="0" marL="0">
-              <a:spcBef>
-                <a:spcPts val="3000"/>
-              </a:spcBef>
-              <a:buNone/>
-            </a:pPr>
-            <a:r>
-              <a:rPr b="1"/>
-              <a:t>Summer schools</a:t>
-            </a:r>
-          </a:p>
-          <a:p>
-            <a:pPr lvl="0"/>
-            <a:r>
-              <a:rPr/>
-              <a:t>6th ACM Europe Summer School on Data Science, Ioannina (Greece)</a:t>
-            </a:r>
-          </a:p>
-          <a:p>
-            <a:pPr lvl="0" indent="0" marL="0">
-              <a:spcBef>
-                <a:spcPts val="3000"/>
-              </a:spcBef>
-              <a:buNone/>
-            </a:pPr>
-            <a:r>
-              <a:rPr b="1"/>
-              <a:t>Conferences</a:t>
-            </a:r>
-          </a:p>
-          <a:p>
-            <a:pPr lvl="0"/>
-            <a:r>
-              <a:rPr/>
-              <a:t>Project meeting Spoke 3 PNRR Agritech</a:t>
-            </a:r>
-          </a:p>
-          <a:p>
-            <a:pPr lvl="0"/>
-            <a:r>
-              <a:rPr/>
-              <a:t>EDBT/ICDT 2024 Joint Conference</a:t>
-            </a:r>
-          </a:p>
-          <a:p>
-            <a:pPr lvl="0" indent="0" marL="0">
-              <a:spcBef>
-                <a:spcPts val="3000"/>
-              </a:spcBef>
-              <a:buNone/>
-            </a:pPr>
-            <a:r>
-              <a:rPr b="1"/>
-              <a:t>External activities</a:t>
-            </a:r>
-          </a:p>
-          <a:p>
-            <a:pPr lvl="0"/>
-            <a:r>
-              <a:rPr/>
-              <a:t>Teaching Relational Database, 30 hrs, ITS Olivetti (2023/2024)</a:t>
-            </a:r>
-          </a:p>
-          <a:p>
-            <a:pPr lvl="0"/>
-            <a:r>
-              <a:rPr/>
-              <a:t>Teaching NoSQL Database, 30 hrs, ITS Olivetti (2024/2025)</a:t>
-            </a:r>
-          </a:p>
-          <a:p>
-            <a:pPr lvl="0"/>
-            <a:r>
-              <a:rPr/>
-              <a:t>Teaching NoSQL Database, 30 hrs, ITS Olivetti (2025/2026)</a:t>
-            </a:r>
-          </a:p>
-          <a:p>
-            <a:pPr lvl="0"/>
-            <a:r>
-              <a:rPr/>
-              <a:t>Consultancy on Digitalization in Precision Agriculture, iFarming s.r.l.</a:t>
-            </a:r>
-          </a:p>
-          <a:p>
-            <a:pPr lvl="0" indent="0" marL="0">
-              <a:spcBef>
-                <a:spcPts val="3000"/>
-              </a:spcBef>
-              <a:buNone/>
-            </a:pPr>
-            <a:r>
-              <a:rPr b="1"/>
-              <a:t>Bachelor Thesis advisr</a:t>
-            </a:r>
-          </a:p>
-          <a:p>
-            <a:pPr lvl="0"/>
-            <a:r>
-              <a:rPr/>
-              <a:t>Denis Nikaj (Progettazione e prototipazione di un’applicazione web per l’irrigazione di precisione), March 2024.</a:t>
-            </a:r>
-          </a:p>
-          <a:p>
-            <a:pPr lvl="0"/>
-            <a:r>
-              <a:rPr/>
-              <a:t>Davide Speziali (Progettazione e realizzazione di un simulatore per l’irrigazione di precisione), December 2024.</a:t>
-            </a:r>
-          </a:p>
-          <a:p>
-            <a:pPr lvl="0"/>
-            <a:r>
-              <a:rPr/>
-              <a:t>Federico Capponi (Progettazione e prototipazione di un sistema di irrigazione di precisione), July 2025.</a:t>
+              <a:t>Modelling Digital Twin Data</a:t>
             </a:r>
           </a:p>
         </p:txBody>

</xml_diff>

<commit_message>
Deploying to gh-pages from @ ManuelePasini/slides-markdown@d9634c5787cf74e5a585df5b3e55133208104818 🚀
</commit_message>
<xml_diff>
--- a/phd_secondyear.pptx
+++ b/phd_secondyear.pptx
@@ -4265,6 +4265,57 @@
             <a:r>
               <a:rPr/>
               <a:t>Modelling Digital Twin Data</a:t>
+            </a:r>
+          </a:p>
+        </p:txBody>
+      </p:sp>
+      <p:sp>
+        <p:nvSpPr>
+          <p:cNvPr id="3" name="Content Placeholder 2"/>
+          <p:cNvSpPr>
+            <a:spLocks noGrp="1"/>
+          </p:cNvSpPr>
+          <p:nvPr>
+            <p:ph idx="1"/>
+          </p:nvPr>
+        </p:nvSpPr>
+        <p:spPr/>
+        <p:txBody>
+          <a:bodyPr/>
+          <a:lstStyle/>
+          <a:p>
+            <a:pPr lvl="0"/>
+            <a:r>
+              <a:rPr/>
+              <a:t>Highly interconnected entities (e.g., the fruit tree we want to represent and the IoT network describing it) point to graph database management systems (DBMSs) for an efficient storing and querying…</a:t>
+            </a:r>
+          </a:p>
+          <a:p>
+            <a:pPr lvl="1"/>
+            <a:r>
+              <a:rPr/>
+              <a:t>… but what about the volume of such data?</a:t>
+            </a:r>
+          </a:p>
+          <a:p>
+            <a:pPr lvl="0"/>
+            <a:r>
+              <a:rPr/>
+              <a:t>Time-Series DBMSs efficiently handle large volumes of temporal data…</a:t>
+            </a:r>
+          </a:p>
+          <a:p>
+            <a:pPr lvl="1"/>
+            <a:r>
+              <a:rPr/>
+              <a:t>… but they struggle in modeling the complex relationships dynamics between the entities.</a:t>
+            </a:r>
+          </a:p>
+          <a:p>
+            <a:pPr lvl="0"/>
+            <a:r>
+              <a:rPr/>
+              <a:t>What about an hybrid data structure?</a:t>
             </a:r>
           </a:p>
         </p:txBody>

</xml_diff>

<commit_message>
Deploying to gh-pages from @ ManuelePasini/slides-markdown@24c6e05cb4ea52b02d49241132d4c3f5d88f08b3 🚀
</commit_message>
<xml_diff>
--- a/phd_secondyear.pptx
+++ b/phd_secondyear.pptx
@@ -3302,7 +3302,7 @@
             <a:spLocks noGrp="1"/>
           </p:cNvSpPr>
           <p:nvPr>
-            <p:ph idx="1"/>
+            <p:ph idx="1" sz="half"/>
           </p:nvPr>
         </p:nvSpPr>
         <p:spPr/>
@@ -3387,6 +3387,22 @@
               <a:t>EDBT/ICDT 2024 Joint Conference</a:t>
             </a:r>
           </a:p>
+        </p:txBody>
+      </p:sp>
+      <p:sp>
+        <p:nvSpPr>
+          <p:cNvPr id="4" name="Content Placeholder 3"/>
+          <p:cNvSpPr>
+            <a:spLocks noGrp="1"/>
+          </p:cNvSpPr>
+          <p:nvPr>
+            <p:ph idx="2" sz="half"/>
+          </p:nvPr>
+        </p:nvSpPr>
+        <p:spPr/>
+        <p:txBody>
+          <a:bodyPr/>
+          <a:lstStyle/>
           <a:p>
             <a:pPr lvl="0" indent="0" marL="0">
               <a:spcBef>

</xml_diff>

<commit_message>
Deploying to gh-pages from @ ManuelePasini/slides-markdown@36f5ea61e91f0de3fea519a36cb0c2e08ed8103b 🚀
</commit_message>
<xml_diff>
--- a/phd_secondyear.pptx
+++ b/phd_secondyear.pptx
@@ -16,6 +16,7 @@
     <p:sldId id="264" r:id="rId10"/>
     <p:sldId id="265" r:id="rId11"/>
     <p:sldId id="266" r:id="rId12"/>
+    <p:sldId id="267" r:id="rId13"/>
   </p:sldIdLst>
   <p:sldSz cx="9144000" cy="5143500" type="screen16x9"/>
   <p:notesSz cx="6858000" cy="9144000"/>
@@ -3220,7 +3221,7 @@
             </a:pPr>
             <a:r>
               <a:rPr/>
-              <a:t>An Hybryd data structure enabling Digital Twin Data</a:t>
+              <a:t>Modelling Digital Twin Data</a:t>
             </a:r>
           </a:p>
         </p:txBody>
@@ -3243,7 +3244,35 @@
             <a:pPr lvl="0"/>
             <a:r>
               <a:rPr/>
-              <a:t>Workload definition (queries)</a:t>
+              <a:t>Highly interconnected entities (e.g., the fruit tree we want to represent and the IoT network describing it) point to graph database management systems (DBMSs) for an efficient storing and querying…</a:t>
+            </a:r>
+          </a:p>
+          <a:p>
+            <a:pPr lvl="1"/>
+            <a:r>
+              <a:rPr/>
+              <a:t>… but what about the volume of such data?</a:t>
+            </a:r>
+          </a:p>
+          <a:p>
+            <a:pPr lvl="0"/>
+            <a:r>
+              <a:rPr/>
+              <a:t>Time-Series DBMSs efficiently handle large volumes of temporal data…</a:t>
+            </a:r>
+          </a:p>
+          <a:p>
+            <a:pPr lvl="1"/>
+            <a:r>
+              <a:rPr/>
+              <a:t>… but they struggle in modeling the complex relationships dynamics between the entities.</a:t>
+            </a:r>
+          </a:p>
+          <a:p>
+            <a:pPr lvl="0"/>
+            <a:r>
+              <a:rPr/>
+              <a:t>What about an hybrid data structure?</a:t>
             </a:r>
           </a:p>
         </p:txBody>
@@ -3254,6 +3283,76 @@
 </file>
 
 <file path=ppt/slides/slide11.xml><?xml version="1.0" encoding="utf-8"?>
+<p:sld xmlns:a="http://schemas.openxmlformats.org/drawingml/2006/main" xmlns:r="http://schemas.openxmlformats.org/officeDocument/2006/relationships" xmlns:p="http://schemas.openxmlformats.org/presentationml/2006/main">
+  <p:cSld>
+    <p:spTree>
+      <p:nvGrpSpPr>
+        <p:cNvPr id="1" name=""/>
+        <p:cNvGrpSpPr/>
+        <p:nvPr/>
+      </p:nvGrpSpPr>
+      <p:grpSpPr>
+        <a:xfrm>
+          <a:off x="0" y="0"/>
+          <a:ext cx="0" cy="0"/>
+          <a:chOff x="0" y="0"/>
+          <a:chExt cx="0" cy="0"/>
+        </a:xfrm>
+      </p:grpSpPr>
+      <p:sp>
+        <p:nvSpPr>
+          <p:cNvPr id="2" name="Title 1"/>
+          <p:cNvSpPr>
+            <a:spLocks noGrp="1"/>
+          </p:cNvSpPr>
+          <p:nvPr>
+            <p:ph type="title"/>
+          </p:nvPr>
+        </p:nvSpPr>
+        <p:spPr/>
+        <p:txBody>
+          <a:bodyPr/>
+          <a:lstStyle/>
+          <a:p>
+            <a:pPr lvl="0" indent="0" marL="0">
+              <a:buNone/>
+            </a:pPr>
+            <a:r>
+              <a:rPr/>
+              <a:t>An Hybryd data structure enabling Digital Twin Data</a:t>
+            </a:r>
+          </a:p>
+        </p:txBody>
+      </p:sp>
+      <p:sp>
+        <p:nvSpPr>
+          <p:cNvPr id="3" name="Content Placeholder 2"/>
+          <p:cNvSpPr>
+            <a:spLocks noGrp="1"/>
+          </p:cNvSpPr>
+          <p:nvPr>
+            <p:ph idx="1"/>
+          </p:nvPr>
+        </p:nvSpPr>
+        <p:spPr/>
+        <p:txBody>
+          <a:bodyPr/>
+          <a:lstStyle/>
+          <a:p>
+            <a:pPr lvl="0"/>
+            <a:r>
+              <a:rPr/>
+              <a:t>Workload definition (queries)</a:t>
+            </a:r>
+          </a:p>
+        </p:txBody>
+      </p:sp>
+    </p:spTree>
+  </p:cSld>
+</p:sld>
+</file>
+
+<file path=ppt/slides/slide12.xml><?xml version="1.0" encoding="utf-8"?>
 <p:sld xmlns:a="http://schemas.openxmlformats.org/drawingml/2006/main" xmlns:r="http://schemas.openxmlformats.org/officeDocument/2006/relationships" xmlns:p="http://schemas.openxmlformats.org/presentationml/2006/main">
   <p:cSld>
     <p:spTree>
@@ -4043,99 +4142,122 @@
           <a:chExt cx="0" cy="0"/>
         </a:xfrm>
       </p:grpSpPr>
-      <p:sp>
-        <p:nvSpPr>
-          <p:cNvPr id="2" name="Title 1"/>
-          <p:cNvSpPr>
-            <a:spLocks noGrp="1"/>
-          </p:cNvSpPr>
-          <p:nvPr>
-            <p:ph type="title"/>
-          </p:nvPr>
-        </p:nvSpPr>
-        <p:spPr/>
-        <p:txBody>
-          <a:bodyPr/>
-          <a:lstStyle/>
-          <a:p>
-            <a:pPr lvl="0" indent="0" marL="0">
+      <p:pic>
+        <p:nvPicPr>
+          <p:cNvPr descr="https://github.com/ManuelePasini/slides-markdown/blob/master/slides/images/phd2ndyer/dt_agro.png?raw=true" id="0" name="Picture 1"/>
+          <p:cNvPicPr>
+            <a:picLocks noGrp="1" noChangeAspect="1"/>
+          </p:cNvPicPr>
+          <p:nvPr/>
+        </p:nvPicPr>
+        <p:blipFill>
+          <a:blip r:embed="rId2"/>
+          <a:stretch>
+            <a:fillRect/>
+          </a:stretch>
+        </p:blipFill>
+        <p:spPr bwMode="auto">
+          <a:xfrm>
+            <a:off x="457200" y="1295400"/>
+            <a:ext cx="4038600" cy="2692400"/>
+          </a:xfrm>
+          <a:prstGeom prst="rect">
+            <a:avLst/>
+          </a:prstGeom>
+          <a:noFill/>
+          <a:ln w="9525">
+            <a:noFill/>
+            <a:headEnd/>
+            <a:tailEnd/>
+          </a:ln>
+        </p:spPr>
+      </p:pic>
+      <p:sp>
+        <p:nvSpPr>
+          <p:cNvPr id="1" name="TextBox 3"/>
+          <p:cNvSpPr txBox="1"/>
+          <p:nvPr/>
+        </p:nvSpPr>
+        <p:spPr>
+          <a:xfrm>
+            <a:off x="457200" y="4076700"/>
+            <a:ext cx="4038600" cy="508000"/>
+          </a:xfrm>
+          <a:prstGeom prst="rect">
+            <a:avLst/>
+          </a:prstGeom>
+          <a:noFill/>
+        </p:spPr>
+        <p:txBody>
+          <a:bodyPr/>
+          <a:lstStyle/>
+          <a:p>
+            <a:pPr lvl="0" indent="0" marL="0" algn="ctr">
               <a:buNone/>
             </a:pPr>
             <a:r>
               <a:rPr/>
-              <a:t>A Data Platform fostering collaboration between DTs</a:t>
-            </a:r>
-          </a:p>
-        </p:txBody>
-      </p:sp>
-      <p:sp>
-        <p:nvSpPr>
-          <p:cNvPr id="3" name="Content Placeholder 2"/>
-          <p:cNvSpPr>
-            <a:spLocks noGrp="1"/>
-          </p:cNvSpPr>
-          <p:nvPr>
-            <p:ph idx="1"/>
-          </p:nvPr>
-        </p:nvSpPr>
-        <p:spPr/>
-        <p:txBody>
-          <a:bodyPr/>
-          <a:lstStyle/>
-          <a:p>
-            <a:pPr lvl="0"/>
-            <a:r>
-              <a:rPr/>
-              <a:t>Within PNRR Agritech - Spoke 3, building a Data Platform fostering collaboration and integration between research projects…</a:t>
-            </a:r>
-          </a:p>
-          <a:p>
-            <a:pPr lvl="0"/>
-            <a:r>
-              <a:rPr/>
-              <a:t>While defining integration policies and standards…</a:t>
-            </a:r>
-          </a:p>
-          <a:p>
-            <a:pPr lvl="0"/>
-            <a:r>
-              <a:rPr/>
-              <a:t>Some key data requirements emerged:</a:t>
-            </a:r>
-          </a:p>
-          <a:p>
-            <a:pPr lvl="1"/>
-            <a:r>
-              <a:rPr/>
-              <a:t>Heterogeneous data: encompassing structured and unstructured types, including images.</a:t>
-            </a:r>
-          </a:p>
-          <a:p>
-            <a:pPr lvl="1"/>
-            <a:r>
-              <a:rPr/>
-              <a:t>Interconnected data: representing both physical entities and the IoT networks describing them.</a:t>
-            </a:r>
-          </a:p>
-          <a:p>
-            <a:pPr lvl="1"/>
-            <a:r>
-              <a:rPr/>
-              <a:t>Temporal aspects: datasets often exhibit time-series behavior.</a:t>
-            </a:r>
-          </a:p>
-          <a:p>
-            <a:pPr lvl="1"/>
-            <a:r>
-              <a:rPr/>
-              <a:t>Spatial aspects: data are frequently geolocated.</a:t>
-            </a:r>
-          </a:p>
-          <a:p>
-            <a:pPr lvl="0"/>
-            <a:r>
-              <a:rPr b="1"/>
-              <a:t>Currently working on its implementation</a:t>
+              <a:t>Soil moisture distribution within a monitored plant</a:t>
+            </a:r>
+          </a:p>
+        </p:txBody>
+      </p:sp>
+      <p:pic>
+        <p:nvPicPr>
+          <p:cNvPr descr="https://github.com/ManuelePasini/slides-markdown/blob/master/slides/images/phd2ndyer/action_agro_dt.png?raw=true" id="0" name="Picture 1"/>
+          <p:cNvPicPr>
+            <a:picLocks noGrp="1" noChangeAspect="1"/>
+          </p:cNvPicPr>
+          <p:nvPr/>
+        </p:nvPicPr>
+        <p:blipFill>
+          <a:blip r:embed="rId3"/>
+          <a:stretch>
+            <a:fillRect/>
+          </a:stretch>
+        </p:blipFill>
+        <p:spPr bwMode="auto">
+          <a:xfrm>
+            <a:off x="4648200" y="1295400"/>
+            <a:ext cx="4038600" cy="2692400"/>
+          </a:xfrm>
+          <a:prstGeom prst="rect">
+            <a:avLst/>
+          </a:prstGeom>
+          <a:noFill/>
+          <a:ln w="9525">
+            <a:noFill/>
+            <a:headEnd/>
+            <a:tailEnd/>
+          </a:ln>
+        </p:spPr>
+      </p:pic>
+      <p:sp>
+        <p:nvSpPr>
+          <p:cNvPr id="1" name="TextBox 3"/>
+          <p:cNvSpPr txBox="1"/>
+          <p:nvPr/>
+        </p:nvSpPr>
+        <p:spPr>
+          <a:xfrm>
+            <a:off x="4648200" y="4076700"/>
+            <a:ext cx="4038600" cy="508000"/>
+          </a:xfrm>
+          <a:prstGeom prst="rect">
+            <a:avLst/>
+          </a:prstGeom>
+          <a:noFill/>
+        </p:spPr>
+        <p:txBody>
+          <a:bodyPr/>
+          <a:lstStyle/>
+          <a:p>
+            <a:pPr lvl="0" indent="0" marL="0" algn="ctr">
+              <a:buNone/>
+            </a:pPr>
+            <a:r>
+              <a:rPr/>
+              <a:t>Example of controlling action to the physical entity - applying irrigation</a:t>
             </a:r>
           </a:p>
         </p:txBody>
@@ -4182,7 +4304,7 @@
             </a:pPr>
             <a:r>
               <a:rPr/>
-              <a:t>From application-oriented to domain-oriented</a:t>
+              <a:t>A Data Platform fostering collaboration between DTs</a:t>
             </a:r>
           </a:p>
         </p:txBody>
@@ -4205,35 +4327,56 @@
             <a:pPr lvl="0"/>
             <a:r>
               <a:rPr/>
-              <a:t>A DT can be characterized by the data pipelines that collect, process, and generate insights from data.</a:t>
+              <a:t>Within PNRR Agritech - Spoke 3, building a Data Platform fostering collaboration and integration between research projects…</a:t>
             </a:r>
           </a:p>
           <a:p>
             <a:pPr lvl="0"/>
             <a:r>
               <a:rPr/>
-              <a:t>Is it possible, given a data pipeline, to determine the set of a data platform services enibling such pipeline?</a:t>
+              <a:t>While defining integration policies and standards…</a:t>
             </a:r>
           </a:p>
           <a:p>
             <a:pPr lvl="0"/>
             <a:r>
               <a:rPr/>
-              <a:t>Matteo Francia, Matteo Golfarelli, Manuele Pasini - Towards a process-driven design of data platforms. In DOLAP, pages 28–35, 2024.</a:t>
+              <a:t>Some key data requirements emerged:</a:t>
+            </a:r>
+          </a:p>
+          <a:p>
+            <a:pPr lvl="1"/>
+            <a:r>
+              <a:rPr/>
+              <a:t>Heterogeneous data: encompassing structured and unstructured types, including images.</a:t>
+            </a:r>
+          </a:p>
+          <a:p>
+            <a:pPr lvl="1"/>
+            <a:r>
+              <a:rPr/>
+              <a:t>Interconnected data: representing both physical entities and the IoT networks describing them.</a:t>
+            </a:r>
+          </a:p>
+          <a:p>
+            <a:pPr lvl="1"/>
+            <a:r>
+              <a:rPr/>
+              <a:t>Temporal aspects: datasets often exhibit time-series behavior.</a:t>
+            </a:r>
+          </a:p>
+          <a:p>
+            <a:pPr lvl="1"/>
+            <a:r>
+              <a:rPr/>
+              <a:t>Spatial aspects: data are frequently geolocated.</a:t>
             </a:r>
           </a:p>
           <a:p>
             <a:pPr lvl="0"/>
             <a:r>
-              <a:rPr/>
-              <a:t>Matteo Francia, Matteo Golfarelli, Manuele Pasini - Process-Driven Design of Cloud Data Platforms, Information Systems journal, Manuscript Number: INFOSYS-D-24-00444</a:t>
-            </a:r>
-          </a:p>
-          <a:p>
-            <a:pPr lvl="0"/>
-            <a:r>
               <a:rPr b="1"/>
-              <a:t>But something was missing..</a:t>
+              <a:t>Currently working on its implementation</a:t>
             </a:r>
           </a:p>
         </p:txBody>
@@ -4280,7 +4423,7 @@
             </a:pPr>
             <a:r>
               <a:rPr/>
-              <a:t>Modelling Digital Twin Data</a:t>
+              <a:t>From application-oriented to domain-oriented</a:t>
             </a:r>
           </a:p>
         </p:txBody>
@@ -4303,35 +4446,35 @@
             <a:pPr lvl="0"/>
             <a:r>
               <a:rPr/>
-              <a:t>Highly interconnected entities (e.g., the fruit tree we want to represent and the IoT network describing it) point to graph database management systems (DBMSs) for an efficient storing and querying…</a:t>
-            </a:r>
-          </a:p>
-          <a:p>
-            <a:pPr lvl="1"/>
-            <a:r>
-              <a:rPr/>
-              <a:t>… but what about the volume of such data?</a:t>
+              <a:t>A DT can be characterized by the data pipelines that collect, process, and generate insights from data.</a:t>
             </a:r>
           </a:p>
           <a:p>
             <a:pPr lvl="0"/>
             <a:r>
               <a:rPr/>
-              <a:t>Time-Series DBMSs efficiently handle large volumes of temporal data…</a:t>
-            </a:r>
-          </a:p>
-          <a:p>
-            <a:pPr lvl="1"/>
-            <a:r>
-              <a:rPr/>
-              <a:t>… but they struggle in modeling the complex relationships dynamics between the entities.</a:t>
+              <a:t>Is it possible, given a data pipeline, to determine the set of a data platform services enibling such pipeline?</a:t>
             </a:r>
           </a:p>
           <a:p>
             <a:pPr lvl="0"/>
             <a:r>
               <a:rPr/>
-              <a:t>What about an hybrid data structure?</a:t>
+              <a:t>Matteo Francia, Matteo Golfarelli, Manuele Pasini - Towards a process-driven design of data platforms. In DOLAP, pages 28–35, 2024.</a:t>
+            </a:r>
+          </a:p>
+          <a:p>
+            <a:pPr lvl="0"/>
+            <a:r>
+              <a:rPr/>
+              <a:t>Matteo Francia, Matteo Golfarelli, Manuele Pasini - Process-Driven Design of Cloud Data Platforms, Information Systems journal, Manuscript Number: INFOSYS-D-24-00444</a:t>
+            </a:r>
+          </a:p>
+          <a:p>
+            <a:pPr lvl="0"/>
+            <a:r>
+              <a:rPr b="1"/>
+              <a:t>But something was missing..</a:t>
             </a:r>
           </a:p>
         </p:txBody>

</xml_diff>

<commit_message>
Deploying to gh-pages from @ ManuelePasini/slides-markdown@b950d47afd7dcc149c006621d99a6cba72f559dd 🚀
</commit_message>
<xml_diff>
--- a/phd_secondyear.pptx
+++ b/phd_secondyear.pptx
@@ -4144,7 +4144,7 @@
       </p:grpSpPr>
       <p:pic>
         <p:nvPicPr>
-          <p:cNvPr descr="https://github.com/ManuelePasini/slides-markdown/blob/master/slides/images/phd2ndyer/dt_agro.png?raw=true" id="0" name="Picture 1"/>
+          <p:cNvPr descr="https://github.com/ManuelePasini/slides-markdown/blob/master/slides/images/phd2ndyear/dt_agro.png?raw=true" id="0" name="Picture 1"/>
           <p:cNvPicPr>
             <a:picLocks noGrp="1" noChangeAspect="1"/>
           </p:cNvPicPr>
@@ -4158,8 +4158,8 @@
         </p:blipFill>
         <p:spPr bwMode="auto">
           <a:xfrm>
-            <a:off x="457200" y="1295400"/>
-            <a:ext cx="4038600" cy="2692400"/>
+            <a:off x="457200" y="1701800"/>
+            <a:ext cx="4038600" cy="1879600"/>
           </a:xfrm>
           <a:prstGeom prst="rect">
             <a:avLst/>
@@ -4204,7 +4204,7 @@
       </p:sp>
       <p:pic>
         <p:nvPicPr>
-          <p:cNvPr descr="https://github.com/ManuelePasini/slides-markdown/blob/master/slides/images/phd2ndyer/action_agro_dt.png?raw=true" id="0" name="Picture 1"/>
+          <p:cNvPr descr="https://github.com/ManuelePasini/slides-markdown/blob/master/slides/images/phd2ndyear/action_agro_dt.png?raw=true" id="0" name="Picture 1"/>
           <p:cNvPicPr>
             <a:picLocks noGrp="1" noChangeAspect="1"/>
           </p:cNvPicPr>
@@ -4218,8 +4218,8 @@
         </p:blipFill>
         <p:spPr bwMode="auto">
           <a:xfrm>
-            <a:off x="4648200" y="1295400"/>
-            <a:ext cx="4038600" cy="2692400"/>
+            <a:off x="4648200" y="1270000"/>
+            <a:ext cx="4038600" cy="2730500"/>
           </a:xfrm>
           <a:prstGeom prst="rect">
             <a:avLst/>

</xml_diff>

<commit_message>
Deploying to gh-pages from @ ManuelePasini/slides-markdown@ea93dfae6a2fb843e3be02f99dc7ad9cd9c78573 🚀
</commit_message>
<xml_diff>
--- a/phd_secondyear.pptx
+++ b/phd_secondyear.pptx
@@ -4327,56 +4327,133 @@
             <a:pPr lvl="0"/>
             <a:r>
               <a:rPr/>
-              <a:t>Within PNRR Agritech - Spoke 3, building a Data Platform fostering collaboration and integration between research projects…</a:t>
+              <a:t>Within PNRR Agritech – Spoke 3, the focus is on developing a Data Platform to foster collaboration and integration across research projects.</a:t>
             </a:r>
           </a:p>
           <a:p>
             <a:pPr lvl="0"/>
             <a:r>
               <a:rPr/>
-              <a:t>While defining integration policies and standards…</a:t>
-            </a:r>
-          </a:p>
+              <a:t>In defining integration policies and standards, several data requirements were identified:</a:t>
+            </a:r>
+          </a:p>
+          <a:p>
+            <a:pPr lvl="0" indent="0" marL="0">
+              <a:buNone/>
+            </a:pPr>
+            <a:r>
+              <a:rPr/>
+              <a:t>Heterogeneous data: covering both structured and unstructured formats, including images.</a:t>
+            </a:r>
+          </a:p>
+          <a:p>
+            <a:pPr lvl="0" indent="0" marL="0">
+              <a:buNone/>
+            </a:pPr>
+            <a:r>
+              <a:rPr/>
+              <a:t>Interconnected data: capturing physical entities together with the IoT networks describing them.</a:t>
+            </a:r>
+          </a:p>
+          <a:p>
+            <a:pPr lvl="0" indent="0" marL="0">
+              <a:buNone/>
+            </a:pPr>
+            <a:r>
+              <a:rPr/>
+              <a:t>Temporal aspects: many datasets display time-series characteristics.</a:t>
+            </a:r>
+          </a:p>
+          <a:p>
+            <a:pPr lvl="0" indent="0" marL="0">
+              <a:buNone/>
+            </a:pPr>
+            <a:r>
+              <a:rPr/>
+              <a:t>Spatial aspects: data are often geo-referenced.</a:t>
+            </a:r>
+          </a:p>
+        </p:txBody>
+      </p:sp>
+      <p:pic>
+        <p:nvPicPr>
+          <p:cNvPr descr="https://github.com/ManuelePasini/slides-markdown/blob/master/slides/images/phd2ndyear/agriplatform.png?raw=true" id="0" name="Picture 1"/>
+          <p:cNvPicPr>
+            <a:picLocks noGrp="1" noChangeAspect="1"/>
+          </p:cNvPicPr>
+          <p:nvPr/>
+        </p:nvPicPr>
+        <p:blipFill>
+          <a:blip r:embed="rId2"/>
+          <a:stretch>
+            <a:fillRect/>
+          </a:stretch>
+        </p:blipFill>
+        <p:spPr bwMode="auto">
+          <a:xfrm>
+            <a:off x="457200" y="1231900"/>
+            <a:ext cx="8229600" cy="2806700"/>
+          </a:xfrm>
+          <a:prstGeom prst="rect">
+            <a:avLst/>
+          </a:prstGeom>
+          <a:noFill/>
+          <a:ln w="9525">
+            <a:noFill/>
+            <a:headEnd/>
+            <a:tailEnd/>
+          </a:ln>
+        </p:spPr>
+      </p:pic>
+      <p:sp>
+        <p:nvSpPr>
+          <p:cNvPr id="1" name="TextBox 3"/>
+          <p:cNvSpPr txBox="1"/>
+          <p:nvPr/>
+        </p:nvSpPr>
+        <p:spPr>
+          <a:xfrm>
+            <a:off x="457200" y="4076700"/>
+            <a:ext cx="8229600" cy="508000"/>
+          </a:xfrm>
+          <a:prstGeom prst="rect">
+            <a:avLst/>
+          </a:prstGeom>
+          <a:noFill/>
+        </p:spPr>
+        <p:txBody>
+          <a:bodyPr/>
+          <a:lstStyle/>
+          <a:p>
+            <a:pPr lvl="0" indent="0" marL="0" algn="ctr">
+              <a:buNone/>
+            </a:pPr>
+            <a:r>
+              <a:rPr/>
+              <a:t>Excerpt of the Agricolture Data Platform</a:t>
+            </a:r>
+          </a:p>
+        </p:txBody>
+      </p:sp>
+      <p:sp>
+        <p:nvSpPr>
+          <p:cNvPr id="3" name="Content Placeholder 2"/>
+          <p:cNvSpPr>
+            <a:spLocks noGrp="1"/>
+          </p:cNvSpPr>
+          <p:nvPr>
+            <p:ph idx="1"/>
+          </p:nvPr>
+        </p:nvSpPr>
+        <p:spPr/>
+        <p:txBody>
+          <a:bodyPr/>
+          <a:lstStyle/>
           <a:p>
             <a:pPr lvl="0"/>
             <a:r>
-              <a:rPr/>
-              <a:t>Some key data requirements emerged:</a:t>
-            </a:r>
-          </a:p>
-          <a:p>
-            <a:pPr lvl="1"/>
-            <a:r>
-              <a:rPr/>
-              <a:t>Heterogeneous data: encompassing structured and unstructured types, including images.</a:t>
-            </a:r>
-          </a:p>
-          <a:p>
-            <a:pPr lvl="1"/>
-            <a:r>
-              <a:rPr/>
-              <a:t>Interconnected data: representing both physical entities and the IoT networks describing them.</a:t>
-            </a:r>
-          </a:p>
-          <a:p>
-            <a:pPr lvl="1"/>
-            <a:r>
-              <a:rPr/>
-              <a:t>Temporal aspects: datasets often exhibit time-series behavior.</a:t>
-            </a:r>
-          </a:p>
-          <a:p>
-            <a:pPr lvl="1"/>
-            <a:r>
-              <a:rPr/>
-              <a:t>Spatial aspects: data are frequently geolocated.</a:t>
-            </a:r>
-          </a:p>
-          <a:p>
-            <a:pPr lvl="0"/>
-            <a:r>
               <a:rPr b="1"/>
-              <a:t>Currently working on its implementation</a:t>
+              <a:t>Currently working on its evolution</a:t>
             </a:r>
           </a:p>
         </p:txBody>
@@ -4443,31 +4520,56 @@
           <a:bodyPr/>
           <a:lstStyle/>
           <a:p>
-            <a:pPr lvl="0"/>
-            <a:r>
-              <a:rPr/>
-              <a:t>A DT can be characterized by the data pipelines that collect, process, and generate insights from data.</a:t>
-            </a:r>
-          </a:p>
-          <a:p>
-            <a:pPr lvl="0"/>
-            <a:r>
-              <a:rPr/>
-              <a:t>Is it possible, given a data pipeline, to determine the set of a data platform services enibling such pipeline?</a:t>
-            </a:r>
-          </a:p>
-          <a:p>
-            <a:pPr lvl="0"/>
-            <a:r>
-              <a:rPr/>
-              <a:t>Matteo Francia, Matteo Golfarelli, Manuele Pasini - Towards a process-driven design of data platforms. In DOLAP, pages 28–35, 2024.</a:t>
-            </a:r>
-          </a:p>
-          <a:p>
-            <a:pPr lvl="0"/>
-            <a:r>
-              <a:rPr/>
-              <a:t>Matteo Francia, Matteo Golfarelli, Manuele Pasini - Process-Driven Design of Cloud Data Platforms, Information Systems journal, Manuscript Number: INFOSYS-D-24-00444</a:t>
+            <a:pPr lvl="0" indent="0" marL="0">
+              <a:buNone/>
+            </a:pPr>
+            <a:r>
+              <a:rPr b="1"/>
+              <a:t>Takeaway from previous phase</a:t>
+            </a:r>
+            <a:r>
+              <a:rPr/>
+              <a:t>: a Digital Twin (DT) can be represented through data pipelines that collect, process, and transform data into insights.</a:t>
+            </a:r>
+          </a:p>
+          <a:p>
+            <a:pPr lvl="0" indent="0" marL="0">
+              <a:buNone/>
+            </a:pPr>
+            <a:r>
+              <a:rPr b="1"/>
+              <a:t>Open question</a:t>
+            </a:r>
+            <a:r>
+              <a:rPr/>
+              <a:t>: given a data pipeline, can we identify the set of data platform services required to support it?</a:t>
+            </a:r>
+          </a:p>
+          <a:p>
+            <a:pPr lvl="0" indent="0" marL="0">
+              <a:buNone/>
+            </a:pPr>
+            <a:r>
+              <a:rPr/>
+              <a:t>References:</a:t>
+            </a:r>
+          </a:p>
+          <a:p>
+            <a:pPr lvl="0" indent="0" marL="0">
+              <a:buNone/>
+            </a:pPr>
+            <a:r>
+              <a:rPr/>
+              <a:t>Matteo Francia, Matteo Golfarelli, Manuele Pasini — Towards a Process-Driven Design of Data Platforms. In DOLAP, pp. 28–35, 2024.</a:t>
+            </a:r>
+          </a:p>
+          <a:p>
+            <a:pPr lvl="0" indent="0" marL="0">
+              <a:buNone/>
+            </a:pPr>
+            <a:r>
+              <a:rPr/>
+              <a:t>Matteo Francia, Matteo Golfarelli, Manuele Pasini — Process-Driven Design of Cloud Data Platforms. Information Systems Journal, Manuscript No. INFOSYS-D-24-00444.</a:t>
             </a:r>
           </a:p>
           <a:p>

</xml_diff>

<commit_message>
Deploying to gh-pages from @ ManuelePasini/slides-markdown@6791756cf85268f8e97f50eb8f34336f1440c116 🚀
</commit_message>
<xml_diff>
--- a/phd_secondyear.pptx
+++ b/phd_secondyear.pptx
@@ -3272,6 +3272,13 @@
             <a:pPr lvl="0"/>
             <a:r>
               <a:rPr/>
+              <a:t>Even the previous Data Platform Design tended to different storage solutions for different DTs…</a:t>
+            </a:r>
+          </a:p>
+          <a:p>
+            <a:pPr lvl="0"/>
+            <a:r>
+              <a:rPr b="1"/>
               <a:t>What about an hybrid data structure?</a:t>
             </a:r>
           </a:p>
@@ -4115,7 +4122,17 @@
             <a:pPr lvl="0"/>
             <a:r>
               <a:rPr/>
-              <a:t>Scientific Article submitted to Computer and Electronics in Agriculture (September 2025).</a:t>
+              <a:t>Paper submitted to </a:t>
+            </a:r>
+            <a:r>
+              <a:rPr>
+                <a:hlinkClick r:id="rId2"/>
+              </a:rPr>
+              <a:t>Computer and Electronics in Agriculture</a:t>
+            </a:r>
+            <a:r>
+              <a:rPr/>
+              <a:t> (September 2025).</a:t>
             </a:r>
           </a:p>
         </p:txBody>
@@ -4338,36 +4355,28 @@
             </a:r>
           </a:p>
           <a:p>
-            <a:pPr lvl="0" indent="0" marL="0">
-              <a:buNone/>
-            </a:pPr>
+            <a:pPr lvl="1"/>
             <a:r>
               <a:rPr/>
               <a:t>Heterogeneous data: covering both structured and unstructured formats, including images.</a:t>
             </a:r>
           </a:p>
           <a:p>
-            <a:pPr lvl="0" indent="0" marL="0">
-              <a:buNone/>
-            </a:pPr>
+            <a:pPr lvl="1"/>
             <a:r>
               <a:rPr/>
               <a:t>Interconnected data: capturing physical entities together with the IoT networks describing them.</a:t>
             </a:r>
           </a:p>
           <a:p>
-            <a:pPr lvl="0" indent="0" marL="0">
-              <a:buNone/>
-            </a:pPr>
+            <a:pPr lvl="1"/>
             <a:r>
               <a:rPr/>
               <a:t>Temporal aspects: many datasets display time-series characteristics.</a:t>
             </a:r>
           </a:p>
           <a:p>
-            <a:pPr lvl="0" indent="0" marL="0">
-              <a:buNone/>
-            </a:pPr>
+            <a:pPr lvl="1"/>
             <a:r>
               <a:rPr/>
               <a:t>Spatial aspects: data are often geo-referenced.</a:t>
@@ -4524,12 +4533,8 @@
               <a:buNone/>
             </a:pPr>
             <a:r>
-              <a:rPr b="1"/>
-              <a:t>Takeaway from previous phase</a:t>
-            </a:r>
-            <a:r>
-              <a:rPr/>
-              <a:t>: a Digital Twin (DT) can be represented through data pipelines that collect, process, and transform data into insights.</a:t>
+              <a:rPr/>
+              <a:t>Takeaway from previous phase : a Digital Twin (DT) can be represented through data pipelines that collect, process, and transform data into insights.</a:t>
             </a:r>
           </a:p>
           <a:p>
@@ -4575,7 +4580,7 @@
           <a:p>
             <a:pPr lvl="0"/>
             <a:r>
-              <a:rPr b="1"/>
+              <a:rPr/>
               <a:t>But something was missing..</a:t>
             </a:r>
           </a:p>

</xml_diff>

<commit_message>
Deploying to gh-pages from @ ManuelePasini/slides-markdown@f5fae1f3b0ed191ee569420719190098e2cb2f7c 🚀
</commit_message>
<xml_diff>
--- a/phd_secondyear.pptx
+++ b/phd_secondyear.pptx
@@ -3244,14 +3244,14 @@
             <a:pPr lvl="0"/>
             <a:r>
               <a:rPr/>
-              <a:t>Highly interconnected entities (e.g., the fruit tree we want to represent and the IoT network describing it) point to graph database management systems (DBMSs) for an efficient storing and querying…</a:t>
+              <a:t>Highly interconnected entities (e.g., a fruit tree and the IoT network describing it) naturally suggest the use of graph DBMSs for efficient storage and querying…</a:t>
             </a:r>
           </a:p>
           <a:p>
             <a:pPr lvl="1"/>
             <a:r>
               <a:rPr/>
-              <a:t>… but what about the volume of such data?</a:t>
+              <a:t>… yet, they cannot cope with the volume of such data</a:t>
             </a:r>
           </a:p>
           <a:p>
@@ -3265,14 +3265,14 @@
             <a:pPr lvl="1"/>
             <a:r>
               <a:rPr/>
-              <a:t>… but they struggle in modeling the complex relationships dynamics between the entities.</a:t>
+              <a:t>… but fall short in capturing the complex dynamics of relationships among entities.</a:t>
             </a:r>
           </a:p>
           <a:p>
             <a:pPr lvl="0"/>
             <a:r>
               <a:rPr/>
-              <a:t>Even the previous Data Platform Design tended to different storage solutions for different DTs…</a:t>
+              <a:t>Even the previous Data Platform Design often suggested multiple storage technologies, tailored to the needs of different DTs…</a:t>
             </a:r>
           </a:p>
           <a:p>
@@ -3349,7 +3349,110 @@
             <a:pPr lvl="0"/>
             <a:r>
               <a:rPr/>
-              <a:t>Workload definition (queries)</a:t>
+              <a:t>Combining the strength of Graph and Time-Series DBMS</a:t>
+            </a:r>
+          </a:p>
+        </p:txBody>
+      </p:sp>
+      <p:pic>
+        <p:nvPicPr>
+          <p:cNvPr descr="https://raw.githubusercontent.com/ManuelePasini/slides-markdown/refs/heads/master/slides/images/ioanninaSlides/dt_graph.svg" id="0" name="Picture 1"/>
+          <p:cNvPicPr>
+            <a:picLocks noGrp="1" noChangeAspect="1"/>
+          </p:cNvPicPr>
+          <p:nvPr/>
+        </p:nvPicPr>
+        <p:blipFill>
+          <a:blip r:embed="rId2"/>
+          <a:stretch>
+            <a:fillRect/>
+          </a:stretch>
+        </p:blipFill>
+        <p:spPr bwMode="auto">
+          <a:xfrm>
+            <a:off x="2413000" y="1193800"/>
+            <a:ext cx="4318000" cy="2882900"/>
+          </a:xfrm>
+          <a:prstGeom prst="rect">
+            <a:avLst/>
+          </a:prstGeom>
+          <a:noFill/>
+          <a:ln w="9525">
+            <a:noFill/>
+            <a:headEnd/>
+            <a:tailEnd/>
+          </a:ln>
+        </p:spPr>
+      </p:pic>
+      <p:sp>
+        <p:nvSpPr>
+          <p:cNvPr id="1" name="TextBox 3"/>
+          <p:cNvSpPr txBox="1"/>
+          <p:nvPr/>
+        </p:nvSpPr>
+        <p:spPr>
+          <a:xfrm>
+            <a:off x="457200" y="4076700"/>
+            <a:ext cx="8229600" cy="508000"/>
+          </a:xfrm>
+          <a:prstGeom prst="rect">
+            <a:avLst/>
+          </a:prstGeom>
+          <a:noFill/>
+        </p:spPr>
+        <p:txBody>
+          <a:bodyPr/>
+          <a:lstStyle/>
+          <a:p>
+            <a:pPr lvl="0" indent="0" marL="0" algn="ctr">
+              <a:buNone/>
+            </a:pPr>
+            <a:r>
+              <a:rPr/>
+              <a:t>Graph+TimeSeries Hybrid data model</a:t>
+            </a:r>
+          </a:p>
+        </p:txBody>
+      </p:sp>
+      <p:sp>
+        <p:nvSpPr>
+          <p:cNvPr id="3" name="Content Placeholder 2"/>
+          <p:cNvSpPr>
+            <a:spLocks noGrp="1"/>
+          </p:cNvSpPr>
+          <p:nvPr>
+            <p:ph idx="1"/>
+          </p:nvPr>
+        </p:nvSpPr>
+        <p:spPr/>
+        <p:txBody>
+          <a:bodyPr/>
+          <a:lstStyle/>
+          <a:p>
+            <a:pPr lvl="0"/>
+            <a:r>
+              <a:rPr/>
+              <a:t>A query workload representative of typical DT applications has been defined.</a:t>
+            </a:r>
+          </a:p>
+          <a:p>
+            <a:pPr lvl="0"/>
+            <a:r>
+              <a:rPr/>
+              <a:t>The data structure has been implemented and evaluated against state-of-the-art techinques.</a:t>
+            </a:r>
+          </a:p>
+          <a:p>
+            <a:pPr lvl="0"/>
+            <a:r>
+              <a:rPr/>
+              <a:t>The paper is curently in writing and to be submitted to </a:t>
+            </a:r>
+            <a:r>
+              <a:rPr>
+                <a:hlinkClick r:id="rId3"/>
+              </a:rPr>
+              <a:t>VLDB 2026</a:t>
             </a:r>
           </a:p>
         </p:txBody>

</xml_diff>

<commit_message>
Deploying to gh-pages from @ ManuelePasini/slides-markdown@9476b76d664bb827ea2804dca3a40bc89b92caf2 🚀
</commit_message>
<xml_diff>
--- a/phd_secondyear.pptx
+++ b/phd_secondyear.pptx
@@ -17,6 +17,7 @@
     <p:sldId id="265" r:id="rId11"/>
     <p:sldId id="266" r:id="rId12"/>
     <p:sldId id="267" r:id="rId13"/>
+    <p:sldId id="268" r:id="rId14"/>
   </p:sldIdLst>
   <p:sldSz cx="9144000" cy="5143500" type="screen16x9"/>
   <p:notesSz cx="6858000" cy="9144000"/>
@@ -3499,7 +3500,54 @@
             </a:pPr>
             <a:r>
               <a:rPr/>
-              <a:t>External activities</a:t>
+              <a:t>Other publications</a:t>
+            </a:r>
+          </a:p>
+        </p:txBody>
+      </p:sp>
+    </p:spTree>
+  </p:cSld>
+</p:sld>
+</file>
+
+<file path=ppt/slides/slide13.xml><?xml version="1.0" encoding="utf-8"?>
+<p:sld xmlns:a="http://schemas.openxmlformats.org/drawingml/2006/main" xmlns:r="http://schemas.openxmlformats.org/officeDocument/2006/relationships" xmlns:p="http://schemas.openxmlformats.org/presentationml/2006/main">
+  <p:cSld>
+    <p:spTree>
+      <p:nvGrpSpPr>
+        <p:cNvPr id="1" name=""/>
+        <p:cNvGrpSpPr/>
+        <p:nvPr/>
+      </p:nvGrpSpPr>
+      <p:grpSpPr>
+        <a:xfrm>
+          <a:off x="0" y="0"/>
+          <a:ext cx="0" cy="0"/>
+          <a:chOff x="0" y="0"/>
+          <a:chExt cx="0" cy="0"/>
+        </a:xfrm>
+      </p:grpSpPr>
+      <p:sp>
+        <p:nvSpPr>
+          <p:cNvPr id="2" name="Title 1"/>
+          <p:cNvSpPr>
+            <a:spLocks noGrp="1"/>
+          </p:cNvSpPr>
+          <p:nvPr>
+            <p:ph type="title"/>
+          </p:nvPr>
+        </p:nvSpPr>
+        <p:spPr/>
+        <p:txBody>
+          <a:bodyPr/>
+          <a:lstStyle/>
+          <a:p>
+            <a:pPr lvl="0" indent="0" marL="0">
+              <a:buNone/>
+            </a:pPr>
+            <a:r>
+              <a:rPr/>
+              <a:t>Other activities</a:t>
             </a:r>
           </a:p>
         </p:txBody>
@@ -4447,7 +4495,7 @@
             <a:pPr lvl="0"/>
             <a:r>
               <a:rPr/>
-              <a:t>Within PNRR Agritech – Spoke 3, the focus is on developing a Data Platform to foster collaboration and integration across research projects.</a:t>
+              <a:t>Within PNRR Agritech – Spoke 3, a Data Platform fostering collaboration and integration across research projects has been implemented.</a:t>
             </a:r>
           </a:p>
           <a:p>

</xml_diff>

<commit_message>
Deploying to gh-pages from @ ManuelePasini/slides-markdown@efda6d4d81b1d49fbf04116f04d2950a38b97318 🚀
</commit_message>
<xml_diff>
--- a/phd_secondyear.pptx
+++ b/phd_secondyear.pptx
@@ -3279,6 +3279,13 @@
           <a:p>
             <a:pPr lvl="0"/>
             <a:r>
+              <a:rPr/>
+              <a:t>Yet, no multi-store solution has achieved broad adoption in the literature.</a:t>
+            </a:r>
+          </a:p>
+          <a:p>
+            <a:pPr lvl="0"/>
+            <a:r>
               <a:rPr b="1"/>
               <a:t>What about an hybrid data structure?</a:t>
             </a:r>
@@ -3350,7 +3357,7 @@
             <a:pPr lvl="0"/>
             <a:r>
               <a:rPr/>
-              <a:t>Combining the strength of Graph and Time-Series DBMS</a:t>
+              <a:t>Combining the strength of Graph and Time-Series DBMS with a novel, hybrid data structure.</a:t>
             </a:r>
           </a:p>
         </p:txBody>
@@ -3440,7 +3447,7 @@
             <a:pPr lvl="0"/>
             <a:r>
               <a:rPr/>
-              <a:t>The data structure has been implemented and evaluated against state-of-the-art techinques.</a:t>
+              <a:t>The data structure has been implemented in Kotlin and evaluated against state-of-the-art techinques with promising results.</a:t>
             </a:r>
           </a:p>
           <a:p>
@@ -3814,7 +3821,7 @@
             <a:pPr lvl="0"/>
             <a:r>
               <a:rPr/>
-              <a:t>3 components: phyisical model, virtual model, communication services</a:t>
+              <a:t>4 components: phyisical model, virtual model, communication services and the data</a:t>
             </a:r>
           </a:p>
         </p:txBody>
@@ -4680,6 +4687,13 @@
           <a:bodyPr/>
           <a:lstStyle/>
           <a:p>
+            <a:pPr lvl="0"/>
+            <a:r>
+              <a:rPr/>
+              <a:t>Can we abstract from application-level solutions to domain-level solutions? (e.g. from having a platform to support a DT application, to having a platform to support Agricolture Digital Twins)</a:t>
+            </a:r>
+          </a:p>
+          <a:p>
             <a:pPr lvl="0" indent="0" marL="0">
               <a:buNone/>
             </a:pPr>
@@ -4694,7 +4708,7 @@
             </a:pPr>
             <a:r>
               <a:rPr b="1"/>
-              <a:t>Open question</a:t>
+              <a:t>Research question</a:t>
             </a:r>
             <a:r>
               <a:rPr/>

</xml_diff>

<commit_message>
Deploying to gh-pages from @ ManuelePasini/slides-markdown@537631bfd9dad359489d0ab2eafc0218503b5856 🚀
</commit_message>
<xml_diff>
--- a/phd_secondyear.pptx
+++ b/phd_secondyear.pptx
@@ -4690,7 +4690,15 @@
             <a:pPr lvl="0"/>
             <a:r>
               <a:rPr/>
-              <a:t>Can we abstract from application-level solutions to domain-level solutions? (e.g. from having a platform to support a DT application, to having a platform to support Agricolture Digital Twins)</a:t>
+              <a:t>*</a:t>
+            </a:r>
+            <a:r>
+              <a:rPr b="1"/>
+              <a:t>Research question 1.</a:t>
+            </a:r>
+            <a:r>
+              <a:rPr/>
+              <a:t>Can we abstract from application-level solutions to domain-level solutions?</a:t>
             </a:r>
           </a:p>
           <a:p>
@@ -4708,7 +4716,7 @@
             </a:pPr>
             <a:r>
               <a:rPr b="1"/>
-              <a:t>Research question</a:t>
+              <a:t>Research question 2.</a:t>
             </a:r>
             <a:r>
               <a:rPr/>

</xml_diff>

<commit_message>
Deploying to gh-pages from @ ManuelePasini/slides-markdown@7a7c388b7544a723336c95d5a3295a6a2b05864f 🚀
</commit_message>
<xml_diff>
--- a/phd_secondyear.pptx
+++ b/phd_secondyear.pptx
@@ -4689,16 +4689,12 @@
           <a:p>
             <a:pPr lvl="0"/>
             <a:r>
-              <a:rPr/>
-              <a:t>*</a:t>
-            </a:r>
-            <a:r>
               <a:rPr b="1"/>
               <a:t>Research question 1.</a:t>
             </a:r>
             <a:r>
               <a:rPr/>
-              <a:t>Can we abstract from application-level solutions to domain-level solutions?</a:t>
+              <a:t> Can we abstract from application-level solutions to domain-level solutions?</a:t>
             </a:r>
           </a:p>
           <a:p>

</xml_diff>

<commit_message>
Deploying to gh-pages from @ ManuelePasini/slides-markdown@a42615541bc16e43c42a4474ef40ab391b2486af 🚀
</commit_message>
<xml_diff>
--- a/phd_secondyear.pptx
+++ b/phd_secondyear.pptx
@@ -4558,8 +4558,8 @@
         </p:blipFill>
         <p:spPr bwMode="auto">
           <a:xfrm>
-            <a:off x="457200" y="1231900"/>
-            <a:ext cx="8229600" cy="2806700"/>
+            <a:off x="457200" y="1422400"/>
+            <a:ext cx="8229600" cy="2425700"/>
           </a:xfrm>
           <a:prstGeom prst="rect">
             <a:avLst/>

</xml_diff>

<commit_message>
Deploying to gh-pages from @ ManuelePasini/slides-markdown@165595821f4d57dab84865ba088f7ff52d83c962 🚀
</commit_message>
<xml_diff>
--- a/phd_secondyear.pptx
+++ b/phd_secondyear.pptx
@@ -4558,8 +4558,8 @@
         </p:blipFill>
         <p:spPr bwMode="auto">
           <a:xfrm>
-            <a:off x="457200" y="1422400"/>
-            <a:ext cx="8229600" cy="2425700"/>
+            <a:off x="457200" y="1485900"/>
+            <a:ext cx="8229600" cy="2298700"/>
           </a:xfrm>
           <a:prstGeom prst="rect">
             <a:avLst/>

</xml_diff>

<commit_message>
Deploying to gh-pages from @ ManuelePasini/slides-markdown@065960fa5c29d863b97c8dbcaf1655f848d16be0 🚀
</commit_message>
<xml_diff>
--- a/phd_secondyear.pptx
+++ b/phd_secondyear.pptx
@@ -4502,7 +4502,17 @@
             <a:pPr lvl="0"/>
             <a:r>
               <a:rPr/>
-              <a:t>Within PNRR Agritech – Spoke 3, a Data Platform fostering collaboration and integration across research projects has been implemented.</a:t>
+              <a:t>Within PNRR </a:t>
+            </a:r>
+            <a:r>
+              <a:rPr>
+                <a:hlinkClick r:id="rId2"/>
+              </a:rPr>
+              <a:t>Agritech</a:t>
+            </a:r>
+            <a:r>
+              <a:rPr/>
+              <a:t>, a data platform fostering collaboration and integration across research projects has been implemented.</a:t>
             </a:r>
           </a:p>
           <a:p>
@@ -4551,15 +4561,15 @@
           <p:nvPr/>
         </p:nvPicPr>
         <p:blipFill>
-          <a:blip r:embed="rId2"/>
+          <a:blip r:embed="rId3"/>
           <a:stretch>
             <a:fillRect/>
           </a:stretch>
         </p:blipFill>
         <p:spPr bwMode="auto">
           <a:xfrm>
-            <a:off x="457200" y="1485900"/>
-            <a:ext cx="8229600" cy="2298700"/>
+            <a:off x="2082800" y="1193800"/>
+            <a:ext cx="4965700" cy="2882900"/>
           </a:xfrm>
           <a:prstGeom prst="rect">
             <a:avLst/>

</xml_diff>

<commit_message>
Deploying to gh-pages from @ ManuelePasini/slides-markdown@93f61098b1dc919e9653d6bcba328f09fffebcf8 🚀
</commit_message>
<xml_diff>
--- a/phd_secondyear.pptx
+++ b/phd_secondyear.pptx
@@ -3440,21 +3440,21 @@
             <a:pPr lvl="0"/>
             <a:r>
               <a:rPr/>
-              <a:t>A query workload representative of typical DT applications has been defined.</a:t>
+              <a:t>A representative query workload has been designed, capturing the core of Digital Twin applications by integrating IoT, Time-Series, and Graph queries.</a:t>
             </a:r>
           </a:p>
           <a:p>
             <a:pPr lvl="0"/>
             <a:r>
               <a:rPr/>
-              <a:t>The data structure has been implemented in Kotlin and evaluated against state-of-the-art techinques with promising results.</a:t>
+              <a:t>The data structure has been implemented in Kotlin and benchmarked against state-of-the-art techniques, showing promising performance gains.</a:t>
             </a:r>
           </a:p>
           <a:p>
             <a:pPr lvl="0"/>
             <a:r>
               <a:rPr/>
-              <a:t>The paper is curently in writing and to be submitted to </a:t>
+              <a:t>The paper is curently under writing and to be submitted to </a:t>
             </a:r>
             <a:r>
               <a:rPr>

</xml_diff>

<commit_message>
Deploying to gh-pages from @ ManuelePasini/slides-markdown@1d6987f6fc9c0c63ce09faa705d307b029802cfd 🚀
</commit_message>
<xml_diff>
--- a/phd_secondyear.pptx
+++ b/phd_secondyear.pptx
@@ -18,6 +18,7 @@
     <p:sldId id="266" r:id="rId12"/>
     <p:sldId id="267" r:id="rId13"/>
     <p:sldId id="268" r:id="rId14"/>
+    <p:sldId id="269" r:id="rId15"/>
   </p:sldIdLst>
   <p:sldSz cx="9144000" cy="5143500" type="screen16x9"/>
   <p:notesSz cx="6858000" cy="9144000"/>
@@ -3222,7 +3223,7 @@
             </a:pPr>
             <a:r>
               <a:rPr/>
-              <a:t>Modelling Digital Twin Data</a:t>
+              <a:t>From application-oriented to domain-oriented</a:t>
             </a:r>
           </a:p>
         </p:txBody>
@@ -3244,50 +3245,66 @@
           <a:p>
             <a:pPr lvl="0"/>
             <a:r>
-              <a:rPr/>
-              <a:t>Highly interconnected entities (e.g., a fruit tree and the IoT network describing it) naturally suggest the use of graph DBMSs for efficient storage and querying…</a:t>
-            </a:r>
-          </a:p>
-          <a:p>
-            <a:pPr lvl="1"/>
-            <a:r>
-              <a:rPr/>
-              <a:t>… yet, they cannot cope with the volume of such data</a:t>
+              <a:rPr b="1"/>
+              <a:t>Research question 1.</a:t>
+            </a:r>
+            <a:r>
+              <a:rPr/>
+              <a:t> Can we abstract from application-level solutions to domain-level solutions?</a:t>
+            </a:r>
+          </a:p>
+          <a:p>
+            <a:pPr lvl="0" indent="0" marL="0">
+              <a:buNone/>
+            </a:pPr>
+            <a:r>
+              <a:rPr/>
+              <a:t>Takeaway from previous phase : a Digital Twin (DT) can be represented through data pipelines that collect, process, and transform data into insights.</a:t>
             </a:r>
           </a:p>
           <a:p>
             <a:pPr lvl="0"/>
             <a:r>
-              <a:rPr/>
-              <a:t>Time-Series DBMSs efficiently handle large volumes of temporal data…</a:t>
-            </a:r>
-          </a:p>
-          <a:p>
-            <a:pPr lvl="1"/>
-            <a:r>
-              <a:rPr/>
-              <a:t>… but fall short in capturing the complex dynamics of relationships among entities.</a:t>
+              <a:rPr b="1"/>
+              <a:t>Research question 2.</a:t>
+            </a:r>
+            <a:r>
+              <a:rPr/>
+              <a:t>: given a data pipeline, can we identify the set of data platform services required to support it?</a:t>
+            </a:r>
+          </a:p>
+          <a:p>
+            <a:pPr lvl="0" indent="0" marL="0">
+              <a:buNone/>
+            </a:pPr>
+            <a:r>
+              <a:rPr/>
+              <a:t>References:</a:t>
+            </a:r>
+          </a:p>
+          <a:p>
+            <a:pPr lvl="0" indent="0" marL="0">
+              <a:buNone/>
+            </a:pPr>
+            <a:r>
+              <a:rPr/>
+              <a:t>Matteo Francia, Matteo Golfarelli, Manuele Pasini — Towards a Process-Driven Design of Data Platforms. In DOLAP, pp. 28–35, 2024.</a:t>
+            </a:r>
+          </a:p>
+          <a:p>
+            <a:pPr lvl="0" indent="0" marL="0">
+              <a:buNone/>
+            </a:pPr>
+            <a:r>
+              <a:rPr/>
+              <a:t>Matteo Francia, Matteo Golfarelli, Manuele Pasini — Process-Driven Design of Cloud Data Platforms. Information Systems Journal, Manuscript No. INFOSYS-D-24-00444.</a:t>
             </a:r>
           </a:p>
           <a:p>
             <a:pPr lvl="0"/>
             <a:r>
               <a:rPr/>
-              <a:t>Even the previous Data Platform Design often suggested multiple storage technologies, tailored to the needs of different DTs…</a:t>
-            </a:r>
-          </a:p>
-          <a:p>
-            <a:pPr lvl="0"/>
-            <a:r>
-              <a:rPr/>
-              <a:t>Yet, no multi-store solution has achieved broad adoption in the literature.</a:t>
-            </a:r>
-          </a:p>
-          <a:p>
-            <a:pPr lvl="0"/>
-            <a:r>
-              <a:rPr b="1"/>
-              <a:t>What about an hybrid data structure?</a:t>
+              <a:t>But something was missing..</a:t>
             </a:r>
           </a:p>
         </p:txBody>
@@ -3298,6 +3315,118 @@
 </file>
 
 <file path=ppt/slides/slide11.xml><?xml version="1.0" encoding="utf-8"?>
+<p:sld xmlns:a="http://schemas.openxmlformats.org/drawingml/2006/main" xmlns:r="http://schemas.openxmlformats.org/officeDocument/2006/relationships" xmlns:p="http://schemas.openxmlformats.org/presentationml/2006/main">
+  <p:cSld>
+    <p:spTree>
+      <p:nvGrpSpPr>
+        <p:cNvPr id="1" name=""/>
+        <p:cNvGrpSpPr/>
+        <p:nvPr/>
+      </p:nvGrpSpPr>
+      <p:grpSpPr>
+        <a:xfrm>
+          <a:off x="0" y="0"/>
+          <a:ext cx="0" cy="0"/>
+          <a:chOff x="0" y="0"/>
+          <a:chExt cx="0" cy="0"/>
+        </a:xfrm>
+      </p:grpSpPr>
+      <p:sp>
+        <p:nvSpPr>
+          <p:cNvPr id="2" name="Title 1"/>
+          <p:cNvSpPr>
+            <a:spLocks noGrp="1"/>
+          </p:cNvSpPr>
+          <p:nvPr>
+            <p:ph type="title"/>
+          </p:nvPr>
+        </p:nvSpPr>
+        <p:spPr/>
+        <p:txBody>
+          <a:bodyPr/>
+          <a:lstStyle/>
+          <a:p>
+            <a:pPr lvl="0" indent="0" marL="0">
+              <a:buNone/>
+            </a:pPr>
+            <a:r>
+              <a:rPr/>
+              <a:t>Modelling Digital Twin Data</a:t>
+            </a:r>
+          </a:p>
+        </p:txBody>
+      </p:sp>
+      <p:sp>
+        <p:nvSpPr>
+          <p:cNvPr id="3" name="Content Placeholder 2"/>
+          <p:cNvSpPr>
+            <a:spLocks noGrp="1"/>
+          </p:cNvSpPr>
+          <p:nvPr>
+            <p:ph idx="1"/>
+          </p:nvPr>
+        </p:nvSpPr>
+        <p:spPr/>
+        <p:txBody>
+          <a:bodyPr/>
+          <a:lstStyle/>
+          <a:p>
+            <a:pPr lvl="0"/>
+            <a:r>
+              <a:rPr/>
+              <a:t>Highly interconnected entities (e.g., a fruit tree and the IoT network describing it) naturally suggest the use of graph DBMSs for efficient storage and querying…</a:t>
+            </a:r>
+          </a:p>
+          <a:p>
+            <a:pPr lvl="1"/>
+            <a:r>
+              <a:rPr/>
+              <a:t>… yet, they cannot cope with the volume of such data</a:t>
+            </a:r>
+          </a:p>
+          <a:p>
+            <a:pPr lvl="0"/>
+            <a:r>
+              <a:rPr/>
+              <a:t>Time-Series DBMSs efficiently handle large volumes of temporal data…</a:t>
+            </a:r>
+          </a:p>
+          <a:p>
+            <a:pPr lvl="1"/>
+            <a:r>
+              <a:rPr/>
+              <a:t>… but fall short in capturing the complex dynamics of relationships among entities.</a:t>
+            </a:r>
+          </a:p>
+          <a:p>
+            <a:pPr lvl="0"/>
+            <a:r>
+              <a:rPr/>
+              <a:t>Even the previous Data Platform Design often suggested multiple storage technologies, tailored to the needs of different DTs…</a:t>
+            </a:r>
+          </a:p>
+          <a:p>
+            <a:pPr lvl="0"/>
+            <a:r>
+              <a:rPr/>
+              <a:t>Yet, no multi-store solution has achieved broad adoption in the literature.</a:t>
+            </a:r>
+          </a:p>
+          <a:p>
+            <a:pPr lvl="0"/>
+            <a:r>
+              <a:rPr b="1"/>
+              <a:t>What about an hybrid data structure?</a:t>
+            </a:r>
+          </a:p>
+        </p:txBody>
+      </p:sp>
+    </p:spTree>
+  </p:cSld>
+</p:sld>
+</file>
+
+<file path=ppt/slides/slide12.xml><?xml version="1.0" encoding="utf-8"?>
 <p:sld xmlns:a="http://schemas.openxmlformats.org/drawingml/2006/main" xmlns:r="http://schemas.openxmlformats.org/officeDocument/2006/relationships" xmlns:p="http://schemas.openxmlformats.org/presentationml/2006/main">
   <p:cSld>
     <p:spTree>
@@ -3470,7 +3599,7 @@
 </p:sld>
 </file>
 
-<file path=ppt/slides/slide12.xml><?xml version="1.0" encoding="utf-8"?>
+<file path=ppt/slides/slide13.xml><?xml version="1.0" encoding="utf-8"?>
 <p:sld xmlns:a="http://schemas.openxmlformats.org/drawingml/2006/main" xmlns:r="http://schemas.openxmlformats.org/officeDocument/2006/relationships" xmlns:p="http://schemas.openxmlformats.org/presentationml/2006/main">
   <p:cSld>
     <p:spTree>
@@ -3517,7 +3646,7 @@
 </p:sld>
 </file>
 
-<file path=ppt/slides/slide13.xml><?xml version="1.0" encoding="utf-8"?>
+<file path=ppt/slides/slide14.xml><?xml version="1.0" encoding="utf-8"?>
 <p:sld xmlns:a="http://schemas.openxmlformats.org/drawingml/2006/main" xmlns:r="http://schemas.openxmlformats.org/officeDocument/2006/relationships" xmlns:p="http://schemas.openxmlformats.org/presentationml/2006/main">
   <p:cSld>
     <p:spTree>
@@ -4552,89 +4681,6 @@
           </a:p>
         </p:txBody>
       </p:sp>
-      <p:pic>
-        <p:nvPicPr>
-          <p:cNvPr descr="https://github.com/ManuelePasini/slides-markdown/blob/master/slides/images/phd2ndyear/agriplatform.png?raw=true" id="0" name="Picture 1"/>
-          <p:cNvPicPr>
-            <a:picLocks noGrp="1" noChangeAspect="1"/>
-          </p:cNvPicPr>
-          <p:nvPr/>
-        </p:nvPicPr>
-        <p:blipFill>
-          <a:blip r:embed="rId3"/>
-          <a:stretch>
-            <a:fillRect/>
-          </a:stretch>
-        </p:blipFill>
-        <p:spPr bwMode="auto">
-          <a:xfrm>
-            <a:off x="2082800" y="1193800"/>
-            <a:ext cx="4965700" cy="2882900"/>
-          </a:xfrm>
-          <a:prstGeom prst="rect">
-            <a:avLst/>
-          </a:prstGeom>
-          <a:noFill/>
-          <a:ln w="9525">
-            <a:noFill/>
-            <a:headEnd/>
-            <a:tailEnd/>
-          </a:ln>
-        </p:spPr>
-      </p:pic>
-      <p:sp>
-        <p:nvSpPr>
-          <p:cNvPr id="1" name="TextBox 3"/>
-          <p:cNvSpPr txBox="1"/>
-          <p:nvPr/>
-        </p:nvSpPr>
-        <p:spPr>
-          <a:xfrm>
-            <a:off x="457200" y="4076700"/>
-            <a:ext cx="8229600" cy="508000"/>
-          </a:xfrm>
-          <a:prstGeom prst="rect">
-            <a:avLst/>
-          </a:prstGeom>
-          <a:noFill/>
-        </p:spPr>
-        <p:txBody>
-          <a:bodyPr/>
-          <a:lstStyle/>
-          <a:p>
-            <a:pPr lvl="0" indent="0" marL="0" algn="ctr">
-              <a:buNone/>
-            </a:pPr>
-            <a:r>
-              <a:rPr/>
-              <a:t>Excerpt of the Agricolture Data Platform</a:t>
-            </a:r>
-          </a:p>
-        </p:txBody>
-      </p:sp>
-      <p:sp>
-        <p:nvSpPr>
-          <p:cNvPr id="3" name="Content Placeholder 2"/>
-          <p:cNvSpPr>
-            <a:spLocks noGrp="1"/>
-          </p:cNvSpPr>
-          <p:nvPr>
-            <p:ph idx="1"/>
-          </p:nvPr>
-        </p:nvSpPr>
-        <p:spPr/>
-        <p:txBody>
-          <a:bodyPr/>
-          <a:lstStyle/>
-          <a:p>
-            <a:pPr lvl="0"/>
-            <a:r>
-              <a:rPr b="1"/>
-              <a:t>Currently working on its evolution</a:t>
-            </a:r>
-          </a:p>
-        </p:txBody>
-      </p:sp>
     </p:spTree>
   </p:cSld>
 </p:sld>
@@ -4657,39 +4703,74 @@
           <a:chExt cx="0" cy="0"/>
         </a:xfrm>
       </p:grpSpPr>
-      <p:sp>
-        <p:nvSpPr>
-          <p:cNvPr id="2" name="Title 1"/>
-          <p:cNvSpPr>
-            <a:spLocks noGrp="1"/>
-          </p:cNvSpPr>
-          <p:nvPr>
-            <p:ph type="title"/>
-          </p:nvPr>
-        </p:nvSpPr>
-        <p:spPr/>
-        <p:txBody>
-          <a:bodyPr/>
-          <a:lstStyle/>
-          <a:p>
-            <a:pPr lvl="0" indent="0" marL="0">
+      <p:pic>
+        <p:nvPicPr>
+          <p:cNvPr descr="https://github.com/ManuelePasini/slides-markdown/blob/master/slides/images/phd2ndyear/agriplatform.png?raw=true" id="0" name="Picture 1"/>
+          <p:cNvPicPr>
+            <a:picLocks noGrp="1" noChangeAspect="1"/>
+          </p:cNvPicPr>
+          <p:nvPr/>
+        </p:nvPicPr>
+        <p:blipFill>
+          <a:blip r:embed="rId2"/>
+          <a:stretch>
+            <a:fillRect/>
+          </a:stretch>
+        </p:blipFill>
+        <p:spPr bwMode="auto">
+          <a:xfrm>
+            <a:off x="457200" y="1460500"/>
+            <a:ext cx="4038600" cy="2349500"/>
+          </a:xfrm>
+          <a:prstGeom prst="rect">
+            <a:avLst/>
+          </a:prstGeom>
+          <a:noFill/>
+          <a:ln w="9525">
+            <a:noFill/>
+            <a:headEnd/>
+            <a:tailEnd/>
+          </a:ln>
+        </p:spPr>
+      </p:pic>
+      <p:sp>
+        <p:nvSpPr>
+          <p:cNvPr id="1" name="TextBox 3"/>
+          <p:cNvSpPr txBox="1"/>
+          <p:nvPr/>
+        </p:nvSpPr>
+        <p:spPr>
+          <a:xfrm>
+            <a:off x="457200" y="4076700"/>
+            <a:ext cx="4038600" cy="508000"/>
+          </a:xfrm>
+          <a:prstGeom prst="rect">
+            <a:avLst/>
+          </a:prstGeom>
+          <a:noFill/>
+        </p:spPr>
+        <p:txBody>
+          <a:bodyPr/>
+          <a:lstStyle/>
+          <a:p>
+            <a:pPr lvl="0" indent="0" marL="0" algn="ctr">
               <a:buNone/>
             </a:pPr>
             <a:r>
               <a:rPr/>
-              <a:t>From application-oriented to domain-oriented</a:t>
-            </a:r>
-          </a:p>
-        </p:txBody>
-      </p:sp>
-      <p:sp>
-        <p:nvSpPr>
-          <p:cNvPr id="3" name="Content Placeholder 2"/>
-          <p:cNvSpPr>
-            <a:spLocks noGrp="1"/>
-          </p:cNvSpPr>
-          <p:nvPr>
-            <p:ph idx="1"/>
+              <a:t>Excerpt of the Agricolture Data Platform</a:t>
+            </a:r>
+          </a:p>
+        </p:txBody>
+      </p:sp>
+      <p:sp>
+        <p:nvSpPr>
+          <p:cNvPr id="4" name="Content Placeholder 3"/>
+          <p:cNvSpPr>
+            <a:spLocks noGrp="1"/>
+          </p:cNvSpPr>
+          <p:nvPr>
+            <p:ph idx="2" sz="half"/>
           </p:nvPr>
         </p:nvSpPr>
         <p:spPr/>
@@ -4700,67 +4781,11 @@
             <a:pPr lvl="0"/>
             <a:r>
               <a:rPr b="1"/>
-              <a:t>Research question 1.</a:t>
-            </a:r>
-            <a:r>
-              <a:rPr/>
-              <a:t> Can we abstract from application-level solutions to domain-level solutions?</a:t>
-            </a:r>
-          </a:p>
-          <a:p>
-            <a:pPr lvl="0" indent="0" marL="0">
-              <a:buNone/>
-            </a:pPr>
-            <a:r>
-              <a:rPr/>
-              <a:t>Takeaway from previous phase : a Digital Twin (DT) can be represented through data pipelines that collect, process, and transform data into insights.</a:t>
-            </a:r>
-          </a:p>
-          <a:p>
-            <a:pPr lvl="0" indent="0" marL="0">
-              <a:buNone/>
-            </a:pPr>
-            <a:r>
-              <a:rPr b="1"/>
-              <a:t>Research question 2.</a:t>
-            </a:r>
-            <a:r>
-              <a:rPr/>
-              <a:t>: given a data pipeline, can we identify the set of data platform services required to support it?</a:t>
-            </a:r>
-          </a:p>
-          <a:p>
-            <a:pPr lvl="0" indent="0" marL="0">
-              <a:buNone/>
-            </a:pPr>
-            <a:r>
-              <a:rPr/>
-              <a:t>References:</a:t>
-            </a:r>
-          </a:p>
-          <a:p>
-            <a:pPr lvl="0" indent="0" marL="0">
-              <a:buNone/>
-            </a:pPr>
-            <a:r>
-              <a:rPr/>
-              <a:t>Matteo Francia, Matteo Golfarelli, Manuele Pasini — Towards a Process-Driven Design of Data Platforms. In DOLAP, pp. 28–35, 2024.</a:t>
-            </a:r>
-          </a:p>
-          <a:p>
-            <a:pPr lvl="0" indent="0" marL="0">
-              <a:buNone/>
-            </a:pPr>
-            <a:r>
-              <a:rPr/>
-              <a:t>Matteo Francia, Matteo Golfarelli, Manuele Pasini — Process-Driven Design of Cloud Data Platforms. Information Systems Journal, Manuscript No. INFOSYS-D-24-00444.</a:t>
-            </a:r>
-          </a:p>
-          <a:p>
-            <a:pPr lvl="0"/>
-            <a:r>
-              <a:rPr/>
-              <a:t>But something was missing..</a:t>
+              <a:t>Currently working on its evolution</a:t>
+            </a:r>
+            <a:r>
+              <a:rPr/>
+              <a:t>: supporting and sharing data processes (e.g., donwload ESA images)</a:t>
             </a:r>
           </a:p>
         </p:txBody>

</xml_diff>

<commit_message>
Deploying to gh-pages from @ ManuelePasini/slides-markdown@3771cf6c02a5490ab8e3f82699d6bc483bcc4c5c 🚀
</commit_message>
<xml_diff>
--- a/phd_secondyear.pptx
+++ b/phd_secondyear.pptx
@@ -18,7 +18,6 @@
     <p:sldId id="266" r:id="rId12"/>
     <p:sldId id="267" r:id="rId13"/>
     <p:sldId id="268" r:id="rId14"/>
-    <p:sldId id="269" r:id="rId15"/>
   </p:sldIdLst>
   <p:sldSz cx="9144000" cy="5143500" type="screen16x9"/>
   <p:notesSz cx="6858000" cy="9144000"/>
@@ -3636,53 +3635,6 @@
             </a:pPr>
             <a:r>
               <a:rPr/>
-              <a:t>Other publications</a:t>
-            </a:r>
-          </a:p>
-        </p:txBody>
-      </p:sp>
-    </p:spTree>
-  </p:cSld>
-</p:sld>
-</file>
-
-<file path=ppt/slides/slide14.xml><?xml version="1.0" encoding="utf-8"?>
-<p:sld xmlns:a="http://schemas.openxmlformats.org/drawingml/2006/main" xmlns:r="http://schemas.openxmlformats.org/officeDocument/2006/relationships" xmlns:p="http://schemas.openxmlformats.org/presentationml/2006/main">
-  <p:cSld>
-    <p:spTree>
-      <p:nvGrpSpPr>
-        <p:cNvPr id="1" name=""/>
-        <p:cNvGrpSpPr/>
-        <p:nvPr/>
-      </p:nvGrpSpPr>
-      <p:grpSpPr>
-        <a:xfrm>
-          <a:off x="0" y="0"/>
-          <a:ext cx="0" cy="0"/>
-          <a:chOff x="0" y="0"/>
-          <a:chExt cx="0" cy="0"/>
-        </a:xfrm>
-      </p:grpSpPr>
-      <p:sp>
-        <p:nvSpPr>
-          <p:cNvPr id="2" name="Title 1"/>
-          <p:cNvSpPr>
-            <a:spLocks noGrp="1"/>
-          </p:cNvSpPr>
-          <p:nvPr>
-            <p:ph type="title"/>
-          </p:nvPr>
-        </p:nvSpPr>
-        <p:spPr/>
-        <p:txBody>
-          <a:bodyPr/>
-          <a:lstStyle/>
-          <a:p>
-            <a:pPr lvl="0" indent="0" marL="0">
-              <a:buNone/>
-            </a:pPr>
-            <a:r>
-              <a:rPr/>
               <a:t>Other activities</a:t>
             </a:r>
           </a:p>
@@ -3752,6 +3704,20 @@
             <a:r>
               <a:rPr/>
               <a:t>6th ACM Europe Summer School on Data Science, Ioannina (Greece)</a:t>
+            </a:r>
+          </a:p>
+          <a:p>
+            <a:pPr lvl="1"/>
+            <a:r>
+              <a:rPr/>
+              <a:t>Graph foundatons and Graph Data Science</a:t>
+            </a:r>
+          </a:p>
+          <a:p>
+            <a:pPr lvl="1"/>
+            <a:r>
+              <a:rPr/>
+              <a:t>IoT Edge Computing</a:t>
             </a:r>
           </a:p>
           <a:p>

</xml_diff>

<commit_message>
Deploying to gh-pages from @ ManuelePasini/slides-markdown@e3419f14f943152593c7504bd6d2b7f9dfd9975d 🚀
</commit_message>
<xml_diff>
--- a/phd_secondyear.pptx
+++ b/phd_secondyear.pptx
@@ -3736,13 +3736,6 @@
             <a:pPr lvl="0"/>
             <a:r>
               <a:rPr/>
-              <a:t>Project meeting Spoke 3 PNRR Agritech</a:t>
-            </a:r>
-          </a:p>
-          <a:p>
-            <a:pPr lvl="0"/>
-            <a:r>
-              <a:rPr/>
               <a:t>EDBT/ICDT 2024 Joint Conference</a:t>
             </a:r>
           </a:p>
@@ -4361,25 +4354,41 @@
             <a:pPr lvl="0"/>
             <a:r>
               <a:rPr/>
-              <a:t>Five year ongoing project (also in PNRR - Spoke 9) in precision irrigation of orchards</a:t>
-            </a:r>
-          </a:p>
-          <a:p>
-            <a:pPr lvl="0"/>
-            <a:r>
-              <a:rPr/>
-              <a:t>Demo available at https://big.csr.unibo.it/projects/smarter/</a:t>
-            </a:r>
-          </a:p>
-          <a:p>
-            <a:pPr lvl="0"/>
-            <a:r>
-              <a:rPr/>
-              <a:t>Paper submitted to </a:t>
+              <a:t>Five year ongoing project (within PNRR - </a:t>
             </a:r>
             <a:r>
               <a:rPr>
                 <a:hlinkClick r:id="rId2"/>
+              </a:rPr>
+              <a:t>Agritech</a:t>
+            </a:r>
+            <a:r>
+              <a:rPr/>
+              <a:t> Spoke 9) in precision irrigation of fruit orchards</a:t>
+            </a:r>
+          </a:p>
+          <a:p>
+            <a:pPr lvl="0"/>
+            <a:r>
+              <a:rPr/>
+              <a:t>Demo available at </a:t>
+            </a:r>
+            <a:r>
+              <a:rPr>
+                <a:hlinkClick r:id="rId3"/>
+              </a:rPr>
+              <a:t>this link</a:t>
+            </a:r>
+          </a:p>
+          <a:p>
+            <a:pPr lvl="0"/>
+            <a:r>
+              <a:rPr/>
+              <a:t>Paper submitted to </a:t>
+            </a:r>
+            <a:r>
+              <a:rPr>
+                <a:hlinkClick r:id="rId4"/>
               </a:rPr>
               <a:t>Computer and Electronics in Agriculture</a:t>
             </a:r>
@@ -4597,17 +4606,7 @@
             <a:pPr lvl="0"/>
             <a:r>
               <a:rPr/>
-              <a:t>Within PNRR </a:t>
-            </a:r>
-            <a:r>
-              <a:rPr>
-                <a:hlinkClick r:id="rId2"/>
-              </a:rPr>
-              <a:t>Agritech</a:t>
-            </a:r>
-            <a:r>
-              <a:rPr/>
-              <a:t>, a data platform fostering collaboration and integration across research projects has been implemented.</a:t>
+              <a:t>Within Agritech - Spoke 3, a data platform fostering collaboration and integration across research projects has been implemented.</a:t>
             </a:r>
           </a:p>
           <a:p>

</xml_diff>

<commit_message>
Deploying to gh-pages from @ ManuelePasini/slides-markdown@c06742df205ff4de8de14f0c3e83a4e6fa8afc8f 🚀
</commit_message>
<xml_diff>
--- a/phd_secondyear.pptx
+++ b/phd_secondyear.pptx
@@ -4606,7 +4606,7 @@
             <a:pPr lvl="0"/>
             <a:r>
               <a:rPr/>
-              <a:t>Within Agritech - Spoke 3, a data platform fostering collaboration and integration across research projects has been implemented.</a:t>
+              <a:t>Within Agritech - Spoke 3, a data platform fostering integration across research projects has been implemented.</a:t>
             </a:r>
           </a:p>
           <a:p>
@@ -4745,12 +4745,36 @@
           <a:p>
             <a:pPr lvl="0"/>
             <a:r>
+              <a:rPr/>
+              <a:t>General purpose: supporting heterogeneous data through heterogeneous storage systems;</a:t>
+            </a:r>
+          </a:p>
+          <a:p>
+            <a:pPr lvl="0"/>
+            <a:r>
+              <a:rPr/>
+              <a:t>Interoperable: allows data integration and sharing between stakeholders through common data models (e.g., </a:t>
+            </a:r>
+            <a:r>
+              <a:rPr>
+                <a:hlinkClick r:id="rId3"/>
+              </a:rPr>
+              <a:t>FIWARE</a:t>
+            </a:r>
+            <a:r>
+              <a:rPr/>
+              <a:t>);</a:t>
+            </a:r>
+          </a:p>
+          <a:p>
+            <a:pPr lvl="0"/>
+            <a:r>
               <a:rPr b="1"/>
               <a:t>Currently working on its evolution</a:t>
             </a:r>
             <a:r>
               <a:rPr/>
-              <a:t>: supporting and sharing data processes (e.g., donwload ESA images)</a:t>
+              <a:t>: supporting and sharing data processes (e.g., donwload ESA images) and fruition applications.</a:t>
             </a:r>
           </a:p>
         </p:txBody>

</xml_diff>

<commit_message>
Deploying to gh-pages from @ ManuelePasini/slides-markdown@3a61c3098fed7ce8fb84956b2e925c8e36aa282c 🚀
</commit_message>
<xml_diff>
--- a/phd_secondyear.pptx
+++ b/phd_secondyear.pptx
@@ -3249,7 +3249,7 @@
             </a:r>
             <a:r>
               <a:rPr/>
-              <a:t> Can we abstract from application-level solutions to domain-level solutions?</a:t>
+              <a:t> Can we abstract from application-level solutions to general purpose (e.g., domain-level) solutions?</a:t>
             </a:r>
           </a:p>
           <a:p>
@@ -3258,7 +3258,7 @@
             </a:pPr>
             <a:r>
               <a:rPr/>
-              <a:t>Takeaway from previous phase : a Digital Twin (DT) can be represented through data pipelines that collect, process, and transform data into insights.</a:t>
+              <a:t>Takeaway from previous phase : a Digital Twin (DT) can be represented through data pipelines that collect, process, and exploit such data.</a:t>
             </a:r>
           </a:p>
           <a:p>
@@ -3373,7 +3373,7 @@
             <a:pPr lvl="0"/>
             <a:r>
               <a:rPr/>
-              <a:t>Highly interconnected entities (e.g., a fruit tree and the IoT network describing it) naturally suggest the use of graph DBMSs for efficient storage and querying…</a:t>
+              <a:t>Highly interconnected entities (e.g., a fruit tree and the IoT network describing it) naturally suggest the use of graph data layout for efficient storage and querying…</a:t>
             </a:r>
           </a:p>
           <a:p>
@@ -3387,7 +3387,7 @@
             <a:pPr lvl="0"/>
             <a:r>
               <a:rPr/>
-              <a:t>Time-Series DBMSs efficiently handle large volumes of temporal data…</a:t>
+              <a:t>Time-Series storage systems efficiently handle large volumes of temporal data…</a:t>
             </a:r>
           </a:p>
           <a:p>
@@ -3408,7 +3408,7 @@
             <a:pPr lvl="0"/>
             <a:r>
               <a:rPr/>
-              <a:t>Yet, no multi-store solution has achieved broad adoption in the literature.</a:t>
+              <a:t>Yet, no multi-store solution has yet achieved broad adoption in the literature.</a:t>
             </a:r>
           </a:p>
           <a:p>
@@ -3485,7 +3485,7 @@
             <a:pPr lvl="0"/>
             <a:r>
               <a:rPr/>
-              <a:t>Combining the strength of Graph and Time-Series DBMS with a novel, hybrid data structure.</a:t>
+              <a:t>Combining the strength of Graph and Time-Series data layouts with a novel, hybrid data structure.</a:t>
             </a:r>
           </a:p>
         </p:txBody>

</xml_diff>

<commit_message>
Deploying to gh-pages from @ ManuelePasini/slides-markdown@c83419018bf121d959ad7e9fb6667ea7a821e2b0 🚀
</commit_message>
<xml_diff>
--- a/phd_secondyear.pptx
+++ b/phd_secondyear.pptx
@@ -4128,14 +4128,14 @@
             <a:pPr lvl="0"/>
             <a:r>
               <a:rPr/>
-              <a:t>… Still left unconsidered in most research papers.</a:t>
+              <a:t>… Still left unconsidered in most research papers</a:t>
             </a:r>
           </a:p>
           <a:p>
             <a:pPr lvl="0"/>
             <a:r>
               <a:rPr/>
-              <a:t>… However, some standard models are emerging</a:t>
+              <a:t>… but some standard models are emerging</a:t>
             </a:r>
           </a:p>
           <a:p>
@@ -4229,62 +4229,32 @@
           </a:p>
         </p:txBody>
       </p:sp>
-      <p:pic>
-        <p:nvPicPr>
-          <p:cNvPr descr="https://github.com/ManuelePasini/slides-markdown/blob/master/slides/images/dt/digital_model.png?raw=true" id="0" name="Picture 1"/>
-          <p:cNvPicPr>
-            <a:picLocks noGrp="1" noChangeAspect="1"/>
-          </p:cNvPicPr>
-          <p:nvPr/>
-        </p:nvPicPr>
-        <p:blipFill>
-          <a:blip r:embed="rId3"/>
-          <a:stretch>
-            <a:fillRect/>
-          </a:stretch>
-        </p:blipFill>
-        <p:spPr bwMode="auto">
-          <a:xfrm>
-            <a:off x="4648200" y="1511300"/>
-            <a:ext cx="4038600" cy="2247900"/>
-          </a:xfrm>
-          <a:prstGeom prst="rect">
-            <a:avLst/>
-          </a:prstGeom>
-          <a:noFill/>
-          <a:ln w="9525">
-            <a:noFill/>
-            <a:headEnd/>
-            <a:tailEnd/>
-          </a:ln>
-        </p:spPr>
-      </p:pic>
-      <p:sp>
-        <p:nvSpPr>
-          <p:cNvPr id="1" name="TextBox 3"/>
-          <p:cNvSpPr txBox="1"/>
-          <p:nvPr/>
-        </p:nvSpPr>
-        <p:spPr>
-          <a:xfrm>
-            <a:off x="4648200" y="4076700"/>
-            <a:ext cx="4038600" cy="508000"/>
-          </a:xfrm>
-          <a:prstGeom prst="rect">
-            <a:avLst/>
-          </a:prstGeom>
-          <a:noFill/>
-        </p:spPr>
-        <p:txBody>
-          <a:bodyPr/>
-          <a:lstStyle/>
-          <a:p>
-            <a:pPr lvl="0" indent="0" marL="0" algn="ctr">
-              <a:buNone/>
-            </a:pPr>
-            <a:r>
-              <a:rPr/>
-              <a:t>Virtual Entity architecture (Fei, Tao, 2020)</a:t>
+      <p:sp>
+        <p:nvSpPr>
+          <p:cNvPr id="4" name="Content Placeholder 3"/>
+          <p:cNvSpPr>
+            <a:spLocks noGrp="1"/>
+          </p:cNvSpPr>
+          <p:nvPr>
+            <p:ph idx="2" sz="half"/>
+          </p:nvPr>
+        </p:nvSpPr>
+        <p:spPr/>
+        <p:txBody>
+          <a:bodyPr/>
+          <a:lstStyle/>
+          <a:p>
+            <a:pPr lvl="0"/>
+            <a:r>
+              <a:rPr/>
+              <a:t>However…</a:t>
+            </a:r>
+          </a:p>
+          <a:p>
+            <a:pPr lvl="1"/>
+            <a:r>
+              <a:rPr/>
+              <a:t>Each solution is independent, in both data models and storage systems: → No interoperability between different DTs and their data; → limiting the capabilities of DTs</a:t>
             </a:r>
           </a:p>
         </p:txBody>

</xml_diff>

<commit_message>
Deploying to gh-pages from @ ManuelePasini/slides-markdown@4b8595ba66a1b4639c8161c1196362dff92233ad 🚀
</commit_message>
<xml_diff>
--- a/phd_secondyear.pptx
+++ b/phd_secondyear.pptx
@@ -4254,7 +4254,11 @@
             <a:pPr lvl="1"/>
             <a:r>
               <a:rPr/>
-              <a:t>Each solution is independent, in both data models and storage systems: → No interoperability between different DTs and their data; → limiting the capabilities of DTs</a:t>
+              <a:t>Each solution is independent, in both data models and storage systems: → No interoperability between different DTs and their data; → limiting the capabilities of DTs → </a:t>
+            </a:r>
+            <a:r>
+              <a:rPr b="1"/>
+              <a:t>need to standardize DTs to facilitate integration</a:t>
             </a:r>
           </a:p>
         </p:txBody>

</xml_diff>

<commit_message>
Deploying to gh-pages from @ ManuelePasini/slides-markdown@9a36b708d276510dc060418d9ea4dd1256970149 🚀
</commit_message>
<xml_diff>
--- a/phd_secondyear.pptx
+++ b/phd_secondyear.pptx
@@ -4254,8 +4254,25 @@
             <a:pPr lvl="1"/>
             <a:r>
               <a:rPr/>
-              <a:t>Each solution is independent, in both data models and storage systems: → No interoperability between different DTs and their data; → limiting the capabilities of DTs → </a:t>
-            </a:r>
+              <a:t>Each solution is independent, in both data models and storage systems:</a:t>
+            </a:r>
+          </a:p>
+          <a:p>
+            <a:pPr lvl="2"/>
+            <a:r>
+              <a:rPr/>
+              <a:t>No interoperability between different DTs and their data;</a:t>
+            </a:r>
+          </a:p>
+          <a:p>
+            <a:pPr lvl="2"/>
+            <a:r>
+              <a:rPr/>
+              <a:t>limiting the capabilities of DTs</a:t>
+            </a:r>
+          </a:p>
+          <a:p>
+            <a:pPr lvl="2"/>
             <a:r>
               <a:rPr b="1"/>
               <a:t>need to standardize DTs to facilitate integration</a:t>

</xml_diff>

<commit_message>
Deploying to gh-pages from @ ManuelePasini/slides-markdown@14dd3b5e4d473da80a139fdf4897cc129331fb5d 🚀
</commit_message>
<xml_diff>
--- a/phd_secondyear.pptx
+++ b/phd_secondyear.pptx
@@ -3249,7 +3249,7 @@
             </a:r>
             <a:r>
               <a:rPr/>
-              <a:t> Can we abstract from application-level solutions to general purpose (e.g., domain-level) solutions?</a:t>
+              <a:t> Can we abstract from application-level platform solutions to general purpose (e.g., domain-level) platform solutions?</a:t>
             </a:r>
           </a:p>
           <a:p>
@@ -3401,7 +3401,7 @@
             <a:pPr lvl="0"/>
             <a:r>
               <a:rPr/>
-              <a:t>Even the previous Data Platform Design often suggested multiple storage technologies, tailored to the needs of different DTs…</a:t>
+              <a:t>Even the mentioned Data Platform Design methodology often suggested multiple storage technologies, tailored to the needs of different DTs…</a:t>
             </a:r>
           </a:p>
           <a:p>

</xml_diff>

<commit_message>
Deploying to gh-pages from @ ManuelePasini/slides-markdown@e9389450db456f3adf7933bbf01bcba8e82ecd4b 🚀
</commit_message>
<xml_diff>
--- a/phd_secondyear.pptx
+++ b/phd_secondyear.pptx
@@ -3242,23 +3242,21 @@
           <a:bodyPr/>
           <a:lstStyle/>
           <a:p>
-            <a:pPr lvl="0"/>
-            <a:r>
-              <a:rPr b="1"/>
-              <a:t>Research question 1.</a:t>
-            </a:r>
-            <a:r>
-              <a:rPr/>
-              <a:t> Can we abstract from application-level platform solutions to general purpose (e.g., domain-level) platform solutions?</a:t>
-            </a:r>
-          </a:p>
-          <a:p>
             <a:pPr lvl="0" indent="0" marL="0">
               <a:buNone/>
             </a:pPr>
             <a:r>
               <a:rPr/>
-              <a:t>Takeaway from previous phase : a Digital Twin (DT) can be represented through data pipelines that collect, process, and exploit such data.</a:t>
+              <a:t>an we move from application-level DT platforms to domain-level platforms?</a:t>
+            </a:r>
+          </a:p>
+          <a:p>
+            <a:pPr lvl="0" indent="0" marL="0">
+              <a:buNone/>
+            </a:pPr>
+            <a:r>
+              <a:rPr/>
+              <a:t>Takeaway: a DT can be represented as a data pipeline that collects, processes, and exploits data.</a:t>
             </a:r>
           </a:p>
           <a:p>
@@ -3303,7 +3301,7 @@
             <a:pPr lvl="0"/>
             <a:r>
               <a:rPr/>
-              <a:t>But something was missing..</a:t>
+              <a:t>But an issue emerged…: pipelines of different DTs entail different data models &amp; storage systems, yet they share some of the same recurrent requirements….</a:t>
             </a:r>
           </a:p>
         </p:txBody>
@@ -3373,35 +3371,35 @@
             <a:pPr lvl="0"/>
             <a:r>
               <a:rPr/>
-              <a:t>Highly interconnected entities (e.g., a fruit tree and the IoT network describing it) naturally suggest the use of graph data layout for efficient storage and querying…</a:t>
+              <a:t>DT data involve highly interconnected entitie (e.g., a fruit tree and the IoT network describing it) naturally suggest the use of graph data layout for efficient storage and querying…</a:t>
             </a:r>
           </a:p>
           <a:p>
             <a:pPr lvl="1"/>
             <a:r>
               <a:rPr/>
-              <a:t>… yet, they cannot cope with the volume of such data</a:t>
+              <a:t>… yet, they struggle with such volume of data</a:t>
             </a:r>
           </a:p>
           <a:p>
             <a:pPr lvl="0"/>
             <a:r>
               <a:rPr/>
-              <a:t>Time-Series storage systems efficiently handle large volumes of temporal data…</a:t>
+              <a:t>Time-Series storage systems efficiently manage large volumes of temporal data…</a:t>
             </a:r>
           </a:p>
           <a:p>
             <a:pPr lvl="1"/>
             <a:r>
               <a:rPr/>
-              <a:t>… but fall short in capturing the complex dynamics of relationships among entities.</a:t>
+              <a:t>… but fall short in capturing the complex inter-entity dynamics.</a:t>
             </a:r>
           </a:p>
           <a:p>
             <a:pPr lvl="0"/>
             <a:r>
               <a:rPr/>
-              <a:t>Even the mentioned Data Platform Design methodology often suggested multiple storage technologies, tailored to the needs of different DTs…</a:t>
+              <a:t>Even our Data Platform Design methodology repeatedly suggested multi-store architectures tailored to each DT…</a:t>
             </a:r>
           </a:p>
           <a:p>
@@ -4121,28 +4119,21 @@
             <a:pPr lvl="0"/>
             <a:r>
               <a:rPr/>
-              <a:t>While concept of data as a core component is arising..</a:t>
+              <a:t>The role of data as a core component of Digital Twins is increasingly recognized…</a:t>
             </a:r>
           </a:p>
           <a:p>
             <a:pPr lvl="0"/>
             <a:r>
               <a:rPr/>
-              <a:t>… Still left unconsidered in most research papers</a:t>
+              <a:t>… yet it is often overlooked in research contributions.</a:t>
             </a:r>
           </a:p>
           <a:p>
             <a:pPr lvl="0"/>
             <a:r>
               <a:rPr/>
-              <a:t>… but some standard models are emerging</a:t>
-            </a:r>
-          </a:p>
-          <a:p>
-            <a:pPr lvl="0"/>
-            <a:r>
-              <a:rPr/>
-              <a:t>e.g.: Fei Tao, Univ. of Beijing</a:t>
+              <a:t>Some reference models are emerging (e.g., Fei Tao, Univ. of Beijing).</a:t>
             </a:r>
           </a:p>
         </p:txBody>
@@ -4254,28 +4245,28 @@
             <a:pPr lvl="1"/>
             <a:r>
               <a:rPr/>
-              <a:t>Each solution is independent, in both data models and storage systems:</a:t>
-            </a:r>
-          </a:p>
-          <a:p>
-            <a:pPr lvl="2"/>
-            <a:r>
-              <a:rPr/>
-              <a:t>No interoperability between different DTs and their data;</a:t>
-            </a:r>
-          </a:p>
-          <a:p>
-            <a:pPr lvl="2"/>
-            <a:r>
-              <a:rPr/>
-              <a:t>limiting the capabilities of DTs</a:t>
-            </a:r>
-          </a:p>
-          <a:p>
-            <a:pPr lvl="2"/>
+              <a:t>Each solution develops its own data model and storage system;</a:t>
+            </a:r>
+          </a:p>
+          <a:p>
+            <a:pPr lvl="1"/>
+            <a:r>
+              <a:rPr/>
+              <a:t>No interoperability between DTs, even when relying on the same data;</a:t>
+            </a:r>
+          </a:p>
+          <a:p>
+            <a:pPr lvl="1"/>
+            <a:r>
+              <a:rPr/>
+              <a:t>Capabilities of DTs are thus limited;</a:t>
+            </a:r>
+          </a:p>
+          <a:p>
+            <a:pPr lvl="1"/>
             <a:r>
               <a:rPr b="1"/>
-              <a:t>need to standardize DTs to facilitate integration</a:t>
+              <a:t>A standardization effort is required to foster integration.</a:t>
             </a:r>
           </a:p>
         </p:txBody>
@@ -4355,7 +4346,7 @@
             </a:r>
             <a:r>
               <a:rPr/>
-              <a:t> Spoke 9) in precision irrigation of fruit orchards</a:t>
+              <a:t> Spoke 9) on precision irrigation of fruit orchards</a:t>
             </a:r>
           </a:p>
           <a:p>
@@ -4597,21 +4588,21 @@
             <a:pPr lvl="0"/>
             <a:r>
               <a:rPr/>
-              <a:t>Within Agritech - Spoke 3, a data platform fostering integration across research projects has been implemented.</a:t>
+              <a:t>Within Agritech - Spoke 3, a data platform fostering integration across research projects has been developed.</a:t>
             </a:r>
           </a:p>
           <a:p>
             <a:pPr lvl="0"/>
             <a:r>
               <a:rPr/>
-              <a:t>In defining integration policies and standards, several data requirements were identified:</a:t>
+              <a:t>When defining integration policies and standards, several recurrent data requirements were identified:</a:t>
             </a:r>
           </a:p>
           <a:p>
             <a:pPr lvl="1"/>
             <a:r>
               <a:rPr/>
-              <a:t>Heterogeneous data: covering both structured and unstructured formats, including images.</a:t>
+              <a:t>Heterogeneous data: from structured to unstructured (including images).</a:t>
             </a:r>
           </a:p>
           <a:p>
@@ -4625,7 +4616,7 @@
             <a:pPr lvl="1"/>
             <a:r>
               <a:rPr/>
-              <a:t>Temporal aspects: many datasets display time-series characteristics.</a:t>
+              <a:t>Temporal aspects: datasets often evolve as time series.</a:t>
             </a:r>
           </a:p>
           <a:p>
@@ -4744,7 +4735,7 @@
             <a:pPr lvl="0"/>
             <a:r>
               <a:rPr/>
-              <a:t>Interoperable: allows data integration and sharing between stakeholders through common data models (e.g., </a:t>
+              <a:t>Interoperable: Interoperable: integration and sharing via common data models (e.g., </a:t>
             </a:r>
             <a:r>
               <a:rPr>
@@ -4761,11 +4752,11 @@
             <a:pPr lvl="0"/>
             <a:r>
               <a:rPr b="1"/>
-              <a:t>Currently working on its evolution</a:t>
-            </a:r>
-            <a:r>
-              <a:rPr/>
-              <a:t>: supporting and sharing data processes (e.g., donwload ESA images) and fruition applications.</a:t>
+              <a:t>Ongoing work</a:t>
+            </a:r>
+            <a:r>
+              <a:rPr/>
+              <a:t>: supporting and sharing data processes (e.g., donwload ESA images) and applications.</a:t>
             </a:r>
           </a:p>
         </p:txBody>

</xml_diff>

<commit_message>
Deploying to gh-pages from @ ManuelePasini/slides-markdown@6d9201947bd9c4da94fd73cdc45acfa6217ba894 🚀
</commit_message>
<xml_diff>
--- a/phd_secondyear.pptx
+++ b/phd_secondyear.pptx
@@ -3242,12 +3242,14 @@
           <a:bodyPr/>
           <a:lstStyle/>
           <a:p>
-            <a:pPr lvl="0" indent="0" marL="0">
-              <a:buNone/>
-            </a:pPr>
-            <a:r>
-              <a:rPr/>
-              <a:t>an we move from application-level DT platforms to domain-level platforms?</a:t>
+            <a:pPr lvl="0"/>
+            <a:r>
+              <a:rPr b="1"/>
+              <a:t>Research Question 1.</a:t>
+            </a:r>
+            <a:r>
+              <a:rPr/>
+              <a:t>: Can we move from application-level DT platforms to domain-level platforms?</a:t>
             </a:r>
           </a:p>
           <a:p>

</xml_diff>

<commit_message>
Deploying to gh-pages from @ ManuelePasini/slides-markdown@eae4bd6dec6929b50484bc092b207e16beae626f 🚀
</commit_message>
<xml_diff>
--- a/phd_secondyear.pptx
+++ b/phd_secondyear.pptx
@@ -18,6 +18,8 @@
     <p:sldId id="266" r:id="rId12"/>
     <p:sldId id="267" r:id="rId13"/>
     <p:sldId id="268" r:id="rId14"/>
+    <p:sldId id="269" r:id="rId15"/>
+    <p:sldId id="270" r:id="rId16"/>
   </p:sldIdLst>
   <p:sldSz cx="9144000" cy="5143500" type="screen16x9"/>
   <p:notesSz cx="6858000" cy="9144000"/>
@@ -3303,7 +3305,7 @@
             <a:pPr lvl="0"/>
             <a:r>
               <a:rPr/>
-              <a:t>But an issue emerged…: pipelines of different DTs entail different data models &amp; storage systems, yet they share some of the same recurrent requirements….</a:t>
+              <a:t>But an issue emerged: pipelines of different DTs entail different data models &amp; storage systems, yet they share some of the same recurrent requirements….</a:t>
             </a:r>
           </a:p>
         </p:txBody>
@@ -3362,7 +3364,7 @@
             <a:spLocks noGrp="1"/>
           </p:cNvSpPr>
           <p:nvPr>
-            <p:ph idx="1"/>
+            <p:ph idx="1" sz="half"/>
           </p:nvPr>
         </p:nvSpPr>
         <p:spPr/>
@@ -3383,39 +3385,64 @@
               <a:t>… yet, they struggle with such volume of data</a:t>
             </a:r>
           </a:p>
-          <a:p>
-            <a:pPr lvl="0"/>
-            <a:r>
-              <a:rPr/>
-              <a:t>Time-Series storage systems efficiently manage large volumes of temporal data…</a:t>
-            </a:r>
-          </a:p>
-          <a:p>
-            <a:pPr lvl="1"/>
-            <a:r>
-              <a:rPr/>
-              <a:t>… but fall short in capturing the complex inter-entity dynamics.</a:t>
-            </a:r>
-          </a:p>
-          <a:p>
-            <a:pPr lvl="0"/>
-            <a:r>
-              <a:rPr/>
-              <a:t>Even our Data Platform Design methodology repeatedly suggested multi-store architectures tailored to each DT…</a:t>
-            </a:r>
-          </a:p>
-          <a:p>
-            <a:pPr lvl="0"/>
-            <a:r>
-              <a:rPr/>
-              <a:t>Yet, no multi-store solution has yet achieved broad adoption in the literature.</a:t>
-            </a:r>
-          </a:p>
-          <a:p>
-            <a:pPr lvl="0"/>
-            <a:r>
-              <a:rPr b="1"/>
-              <a:t>What about an hybrid data structure?</a:t>
+        </p:txBody>
+      </p:sp>
+      <p:pic>
+        <p:nvPicPr>
+          <p:cNvPr descr="https://github.com/ManuelePasini/slides-markdown/blob/master/slides/images/dt/agrigraph.png?raw=true" id="0" name="Picture 1"/>
+          <p:cNvPicPr>
+            <a:picLocks noGrp="1" noChangeAspect="1"/>
+          </p:cNvPicPr>
+          <p:nvPr/>
+        </p:nvPicPr>
+        <p:blipFill>
+          <a:blip r:embed="rId2"/>
+          <a:stretch>
+            <a:fillRect/>
+          </a:stretch>
+        </p:blipFill>
+        <p:spPr bwMode="auto">
+          <a:xfrm>
+            <a:off x="4648200" y="1295400"/>
+            <a:ext cx="4038600" cy="2692400"/>
+          </a:xfrm>
+          <a:prstGeom prst="rect">
+            <a:avLst/>
+          </a:prstGeom>
+          <a:noFill/>
+          <a:ln w="9525">
+            <a:noFill/>
+            <a:headEnd/>
+            <a:tailEnd/>
+          </a:ln>
+        </p:spPr>
+      </p:pic>
+      <p:sp>
+        <p:nvSpPr>
+          <p:cNvPr id="1" name="TextBox 3"/>
+          <p:cNvSpPr txBox="1"/>
+          <p:nvPr/>
+        </p:nvSpPr>
+        <p:spPr>
+          <a:xfrm>
+            <a:off x="4648200" y="4076700"/>
+            <a:ext cx="4038600" cy="508000"/>
+          </a:xfrm>
+          <a:prstGeom prst="rect">
+            <a:avLst/>
+          </a:prstGeom>
+          <a:noFill/>
+        </p:spPr>
+        <p:txBody>
+          <a:bodyPr/>
+          <a:lstStyle/>
+          <a:p>
+            <a:pPr lvl="0" indent="0" marL="0" algn="ctr">
+              <a:buNone/>
+            </a:pPr>
+            <a:r>
+              <a:rPr/>
+              <a:t>Graph representation of Precision Irrigation DT</a:t>
             </a:r>
           </a:p>
         </p:txBody>
@@ -3426,6 +3453,177 @@
 </file>
 
 <file path=ppt/slides/slide12.xml><?xml version="1.0" encoding="utf-8"?>
+<p:sld xmlns:a="http://schemas.openxmlformats.org/drawingml/2006/main" xmlns:r="http://schemas.openxmlformats.org/officeDocument/2006/relationships" xmlns:p="http://schemas.openxmlformats.org/presentationml/2006/main">
+  <p:cSld>
+    <p:spTree>
+      <p:nvGrpSpPr>
+        <p:cNvPr id="1" name=""/>
+        <p:cNvGrpSpPr/>
+        <p:nvPr/>
+      </p:nvGrpSpPr>
+      <p:grpSpPr>
+        <a:xfrm>
+          <a:off x="0" y="0"/>
+          <a:ext cx="0" cy="0"/>
+          <a:chOff x="0" y="0"/>
+          <a:chExt cx="0" cy="0"/>
+        </a:xfrm>
+      </p:grpSpPr>
+      <p:sp>
+        <p:nvSpPr>
+          <p:cNvPr id="3" name="Content Placeholder 2"/>
+          <p:cNvSpPr>
+            <a:spLocks noGrp="1"/>
+          </p:cNvSpPr>
+          <p:nvPr>
+            <p:ph idx="1" sz="half"/>
+          </p:nvPr>
+        </p:nvSpPr>
+        <p:spPr/>
+        <p:txBody>
+          <a:bodyPr/>
+          <a:lstStyle/>
+          <a:p>
+            <a:pPr lvl="0"/>
+            <a:r>
+              <a:rPr/>
+              <a:t>Time-Series storage systems efficiently manage large volumes of temporal data…</a:t>
+            </a:r>
+          </a:p>
+          <a:p>
+            <a:pPr lvl="1"/>
+            <a:r>
+              <a:rPr/>
+              <a:t>… but fall short in capturing the complex inter-entity dynamics.</a:t>
+            </a:r>
+          </a:p>
+        </p:txBody>
+      </p:sp>
+      <p:pic>
+        <p:nvPicPr>
+          <p:cNvPr descr="https://github.com/ManuelePasini/slides-markdown/blob/master/slides/images/dt/agrits.svg" id="0" name="Picture 1"/>
+          <p:cNvPicPr>
+            <a:picLocks noGrp="1" noChangeAspect="1"/>
+          </p:cNvPicPr>
+          <p:nvPr/>
+        </p:nvPicPr>
+        <p:blipFill>
+          <a:blip r:embed="rId2"/>
+          <a:stretch>
+            <a:fillRect/>
+          </a:stretch>
+        </p:blipFill>
+        <p:spPr bwMode="auto">
+          <a:xfrm>
+            <a:off x="4648200" y="1295400"/>
+            <a:ext cx="4038600" cy="2692400"/>
+          </a:xfrm>
+          <a:prstGeom prst="rect">
+            <a:avLst/>
+          </a:prstGeom>
+          <a:noFill/>
+          <a:ln w="9525">
+            <a:noFill/>
+            <a:headEnd/>
+            <a:tailEnd/>
+          </a:ln>
+        </p:spPr>
+      </p:pic>
+      <p:sp>
+        <p:nvSpPr>
+          <p:cNvPr id="1" name="TextBox 3"/>
+          <p:cNvSpPr txBox="1"/>
+          <p:nvPr/>
+        </p:nvSpPr>
+        <p:spPr>
+          <a:xfrm>
+            <a:off x="4648200" y="4076700"/>
+            <a:ext cx="4038600" cy="508000"/>
+          </a:xfrm>
+          <a:prstGeom prst="rect">
+            <a:avLst/>
+          </a:prstGeom>
+          <a:noFill/>
+        </p:spPr>
+        <p:txBody>
+          <a:bodyPr/>
+          <a:lstStyle/>
+          <a:p>
+            <a:pPr lvl="0" indent="0" marL="0" algn="ctr">
+              <a:buNone/>
+            </a:pPr>
+            <a:r>
+              <a:rPr/>
+              <a:t>Time-Series representation of Precision Irrigation DT</a:t>
+            </a:r>
+          </a:p>
+        </p:txBody>
+      </p:sp>
+    </p:spTree>
+  </p:cSld>
+</p:sld>
+</file>
+
+<file path=ppt/slides/slide13.xml><?xml version="1.0" encoding="utf-8"?>
+<p:sld xmlns:a="http://schemas.openxmlformats.org/drawingml/2006/main" xmlns:r="http://schemas.openxmlformats.org/officeDocument/2006/relationships" xmlns:p="http://schemas.openxmlformats.org/presentationml/2006/main">
+  <p:cSld>
+    <p:spTree>
+      <p:nvGrpSpPr>
+        <p:cNvPr id="1" name=""/>
+        <p:cNvGrpSpPr/>
+        <p:nvPr/>
+      </p:nvGrpSpPr>
+      <p:grpSpPr>
+        <a:xfrm>
+          <a:off x="0" y="0"/>
+          <a:ext cx="0" cy="0"/>
+          <a:chOff x="0" y="0"/>
+          <a:chExt cx="0" cy="0"/>
+        </a:xfrm>
+      </p:grpSpPr>
+      <p:sp>
+        <p:nvSpPr>
+          <p:cNvPr id="3" name="Content Placeholder 2"/>
+          <p:cNvSpPr>
+            <a:spLocks noGrp="1"/>
+          </p:cNvSpPr>
+          <p:nvPr>
+            <p:ph idx="1"/>
+          </p:nvPr>
+        </p:nvSpPr>
+        <p:spPr/>
+        <p:txBody>
+          <a:bodyPr/>
+          <a:lstStyle/>
+          <a:p>
+            <a:pPr lvl="0"/>
+            <a:r>
+              <a:rPr/>
+              <a:t>Even our Data Platform Design methodology repeatedly suggested multi-store architectures tailored to each DT…</a:t>
+            </a:r>
+          </a:p>
+          <a:p>
+            <a:pPr lvl="0"/>
+            <a:r>
+              <a:rPr/>
+              <a:t>Yet, no multi-store solution has yet achieved broad adoption in the literature.</a:t>
+            </a:r>
+          </a:p>
+          <a:p>
+            <a:pPr lvl="0"/>
+            <a:r>
+              <a:rPr b="1"/>
+              <a:t>What about an hybrid data structure?</a:t>
+            </a:r>
+          </a:p>
+        </p:txBody>
+      </p:sp>
+    </p:spTree>
+  </p:cSld>
+</p:sld>
+</file>
+
+<file path=ppt/slides/slide14.xml><?xml version="1.0" encoding="utf-8"?>
 <p:sld xmlns:a="http://schemas.openxmlformats.org/drawingml/2006/main" xmlns:r="http://schemas.openxmlformats.org/officeDocument/2006/relationships" xmlns:p="http://schemas.openxmlformats.org/presentationml/2006/main">
   <p:cSld>
     <p:spTree>
@@ -3598,7 +3796,7 @@
 </p:sld>
 </file>
 
-<file path=ppt/slides/slide13.xml><?xml version="1.0" encoding="utf-8"?>
+<file path=ppt/slides/slide15.xml><?xml version="1.0" encoding="utf-8"?>
 <p:sld xmlns:a="http://schemas.openxmlformats.org/drawingml/2006/main" xmlns:r="http://schemas.openxmlformats.org/officeDocument/2006/relationships" xmlns:p="http://schemas.openxmlformats.org/presentationml/2006/main">
   <p:cSld>
     <p:spTree>

</xml_diff>

<commit_message>
Deploying to gh-pages from @ ManuelePasini/slides-markdown@8e3dd74a76b14e49028660b1ae29aa3463de0d81 🚀
</commit_message>
<xml_diff>
--- a/phd_secondyear.pptx
+++ b/phd_secondyear.pptx
@@ -3389,7 +3389,7 @@
       </p:sp>
       <p:pic>
         <p:nvPicPr>
-          <p:cNvPr descr="https://github.com/ManuelePasini/slides-markdown/blob/master/slides/images/dt/agrigraph.png?raw=true" id="0" name="Picture 1"/>
+          <p:cNvPr descr="https://github.com/ManuelePasini/slides-markdown/blob/master/slides/images/phd2ndyear/agrigraph.png?raw=true" id="0" name="Picture 1"/>
           <p:cNvPicPr>
             <a:picLocks noGrp="1" noChangeAspect="1"/>
           </p:cNvPicPr>
@@ -3403,8 +3403,8 @@
         </p:blipFill>
         <p:spPr bwMode="auto">
           <a:xfrm>
-            <a:off x="4648200" y="1295400"/>
-            <a:ext cx="4038600" cy="2692400"/>
+            <a:off x="5308600" y="1193800"/>
+            <a:ext cx="2717800" cy="2882900"/>
           </a:xfrm>
           <a:prstGeom prst="rect">
             <a:avLst/>
@@ -3501,7 +3501,7 @@
       </p:sp>
       <p:pic>
         <p:nvPicPr>
-          <p:cNvPr descr="https://github.com/ManuelePasini/slides-markdown/blob/master/slides/images/dt/agrits.svg" id="0" name="Picture 1"/>
+          <p:cNvPr descr="https://github.com/ManuelePasini/slides-markdown/blob/master/slides/images/phd2ndyear/agrits.svg" id="0" name="Picture 1"/>
           <p:cNvPicPr>
             <a:picLocks noGrp="1" noChangeAspect="1"/>
           </p:cNvPicPr>

</xml_diff>

<commit_message>
Deploying to gh-pages from @ ManuelePasini/slides-markdown@2b325fad11c32cb9009b6b1c1f2cf7f28f8c9b67 🚀
</commit_message>
<xml_diff>
--- a/phd_secondyear.pptx
+++ b/phd_secondyear.pptx
@@ -3403,8 +3403,8 @@
         </p:blipFill>
         <p:spPr bwMode="auto">
           <a:xfrm>
-            <a:off x="5308600" y="1193800"/>
-            <a:ext cx="2717800" cy="2882900"/>
+            <a:off x="4699000" y="1193800"/>
+            <a:ext cx="3924300" cy="2882900"/>
           </a:xfrm>
           <a:prstGeom prst="rect">
             <a:avLst/>

</xml_diff>

<commit_message>
Deploying to gh-pages from @ ManuelePasini/slides-markdown@35ffa788083751a62052f3090995f780a7dc0bf0 🚀
</commit_message>
<xml_diff>
--- a/phd_secondyear.pptx
+++ b/phd_secondyear.pptx
@@ -19,7 +19,6 @@
     <p:sldId id="267" r:id="rId13"/>
     <p:sldId id="268" r:id="rId14"/>
     <p:sldId id="269" r:id="rId15"/>
-    <p:sldId id="270" r:id="rId16"/>
   </p:sldIdLst>
   <p:sldSz cx="9144000" cy="5143500" type="screen16x9"/>
   <p:notesSz cx="6858000" cy="9144000"/>
@@ -3385,6 +3384,20 @@
               <a:t>… yet, they struggle with such volume of data</a:t>
             </a:r>
           </a:p>
+          <a:p>
+            <a:pPr lvl="0"/>
+            <a:r>
+              <a:rPr/>
+              <a:t>Time-Series storage systems efficiently manage large volumes of temporal data…</a:t>
+            </a:r>
+          </a:p>
+          <a:p>
+            <a:pPr lvl="1"/>
+            <a:r>
+              <a:rPr/>
+              <a:t>… but fall short in capturing the complex inter-entity dynamics.</a:t>
+            </a:r>
+          </a:p>
         </p:txBody>
       </p:sp>
       <p:pic>
@@ -3447,6 +3460,66 @@
           </a:p>
         </p:txBody>
       </p:sp>
+      <p:pic>
+        <p:nvPicPr>
+          <p:cNvPr descr="https://github.com/ManuelePasini/slides-markdown/blob/master/slides/images/phd2ndyear/agrits.svg" id="0" name="Picture 1"/>
+          <p:cNvPicPr>
+            <a:picLocks noGrp="1" noChangeAspect="1"/>
+          </p:cNvPicPr>
+          <p:nvPr/>
+        </p:nvPicPr>
+        <p:blipFill>
+          <a:blip r:embed="rId3"/>
+          <a:stretch>
+            <a:fillRect/>
+          </a:stretch>
+        </p:blipFill>
+        <p:spPr bwMode="auto">
+          <a:xfrm>
+            <a:off x="4648200" y="1295400"/>
+            <a:ext cx="4038600" cy="2692400"/>
+          </a:xfrm>
+          <a:prstGeom prst="rect">
+            <a:avLst/>
+          </a:prstGeom>
+          <a:noFill/>
+          <a:ln w="9525">
+            <a:noFill/>
+            <a:headEnd/>
+            <a:tailEnd/>
+          </a:ln>
+        </p:spPr>
+      </p:pic>
+      <p:sp>
+        <p:nvSpPr>
+          <p:cNvPr id="1" name="TextBox 3"/>
+          <p:cNvSpPr txBox="1"/>
+          <p:nvPr/>
+        </p:nvSpPr>
+        <p:spPr>
+          <a:xfrm>
+            <a:off x="4648200" y="4076700"/>
+            <a:ext cx="4038600" cy="508000"/>
+          </a:xfrm>
+          <a:prstGeom prst="rect">
+            <a:avLst/>
+          </a:prstGeom>
+          <a:noFill/>
+        </p:spPr>
+        <p:txBody>
+          <a:bodyPr/>
+          <a:lstStyle/>
+          <a:p>
+            <a:pPr lvl="0" indent="0" marL="0" algn="ctr">
+              <a:buNone/>
+            </a:pPr>
+            <a:r>
+              <a:rPr/>
+              <a:t>Time-Series representation of Precision Irrigation DT</a:t>
+            </a:r>
+          </a:p>
+        </p:txBody>
+      </p:sp>
     </p:spTree>
   </p:cSld>
 </p:sld>
@@ -3476,7 +3549,7 @@
             <a:spLocks noGrp="1"/>
           </p:cNvSpPr>
           <p:nvPr>
-            <p:ph idx="1" sz="half"/>
+            <p:ph idx="1"/>
           </p:nvPr>
         </p:nvSpPr>
         <p:spPr/>
@@ -3487,74 +3560,21 @@
             <a:pPr lvl="0"/>
             <a:r>
               <a:rPr/>
-              <a:t>Time-Series storage systems efficiently manage large volumes of temporal data…</a:t>
-            </a:r>
-          </a:p>
-          <a:p>
-            <a:pPr lvl="1"/>
-            <a:r>
-              <a:rPr/>
-              <a:t>… but fall short in capturing the complex inter-entity dynamics.</a:t>
-            </a:r>
-          </a:p>
-        </p:txBody>
-      </p:sp>
-      <p:pic>
-        <p:nvPicPr>
-          <p:cNvPr descr="https://github.com/ManuelePasini/slides-markdown/blob/master/slides/images/phd2ndyear/agrits.svg" id="0" name="Picture 1"/>
-          <p:cNvPicPr>
-            <a:picLocks noGrp="1" noChangeAspect="1"/>
-          </p:cNvPicPr>
-          <p:nvPr/>
-        </p:nvPicPr>
-        <p:blipFill>
-          <a:blip r:embed="rId2"/>
-          <a:stretch>
-            <a:fillRect/>
-          </a:stretch>
-        </p:blipFill>
-        <p:spPr bwMode="auto">
-          <a:xfrm>
-            <a:off x="4648200" y="1295400"/>
-            <a:ext cx="4038600" cy="2692400"/>
-          </a:xfrm>
-          <a:prstGeom prst="rect">
-            <a:avLst/>
-          </a:prstGeom>
-          <a:noFill/>
-          <a:ln w="9525">
-            <a:noFill/>
-            <a:headEnd/>
-            <a:tailEnd/>
-          </a:ln>
-        </p:spPr>
-      </p:pic>
-      <p:sp>
-        <p:nvSpPr>
-          <p:cNvPr id="1" name="TextBox 3"/>
-          <p:cNvSpPr txBox="1"/>
-          <p:nvPr/>
-        </p:nvSpPr>
-        <p:spPr>
-          <a:xfrm>
-            <a:off x="4648200" y="4076700"/>
-            <a:ext cx="4038600" cy="508000"/>
-          </a:xfrm>
-          <a:prstGeom prst="rect">
-            <a:avLst/>
-          </a:prstGeom>
-          <a:noFill/>
-        </p:spPr>
-        <p:txBody>
-          <a:bodyPr/>
-          <a:lstStyle/>
-          <a:p>
-            <a:pPr lvl="0" indent="0" marL="0" algn="ctr">
-              <a:buNone/>
-            </a:pPr>
-            <a:r>
-              <a:rPr/>
-              <a:t>Time-Series representation of Precision Irrigation DT</a:t>
+              <a:t>Even our Data Platform Design methodology repeatedly suggested multi-store architectures tailored to each DT…</a:t>
+            </a:r>
+          </a:p>
+          <a:p>
+            <a:pPr lvl="0"/>
+            <a:r>
+              <a:rPr/>
+              <a:t>Yet, no multi-store solution has yet achieved broad adoption in the literature.</a:t>
+            </a:r>
+          </a:p>
+          <a:p>
+            <a:pPr lvl="0"/>
+            <a:r>
+              <a:rPr b="1"/>
+              <a:t>What about an hybrid data structure?</a:t>
             </a:r>
           </a:p>
         </p:txBody>
@@ -3565,65 +3585,6 @@
 </file>
 
 <file path=ppt/slides/slide13.xml><?xml version="1.0" encoding="utf-8"?>
-<p:sld xmlns:a="http://schemas.openxmlformats.org/drawingml/2006/main" xmlns:r="http://schemas.openxmlformats.org/officeDocument/2006/relationships" xmlns:p="http://schemas.openxmlformats.org/presentationml/2006/main">
-  <p:cSld>
-    <p:spTree>
-      <p:nvGrpSpPr>
-        <p:cNvPr id="1" name=""/>
-        <p:cNvGrpSpPr/>
-        <p:nvPr/>
-      </p:nvGrpSpPr>
-      <p:grpSpPr>
-        <a:xfrm>
-          <a:off x="0" y="0"/>
-          <a:ext cx="0" cy="0"/>
-          <a:chOff x="0" y="0"/>
-          <a:chExt cx="0" cy="0"/>
-        </a:xfrm>
-      </p:grpSpPr>
-      <p:sp>
-        <p:nvSpPr>
-          <p:cNvPr id="3" name="Content Placeholder 2"/>
-          <p:cNvSpPr>
-            <a:spLocks noGrp="1"/>
-          </p:cNvSpPr>
-          <p:nvPr>
-            <p:ph idx="1"/>
-          </p:nvPr>
-        </p:nvSpPr>
-        <p:spPr/>
-        <p:txBody>
-          <a:bodyPr/>
-          <a:lstStyle/>
-          <a:p>
-            <a:pPr lvl="0"/>
-            <a:r>
-              <a:rPr/>
-              <a:t>Even our Data Platform Design methodology repeatedly suggested multi-store architectures tailored to each DT…</a:t>
-            </a:r>
-          </a:p>
-          <a:p>
-            <a:pPr lvl="0"/>
-            <a:r>
-              <a:rPr/>
-              <a:t>Yet, no multi-store solution has yet achieved broad adoption in the literature.</a:t>
-            </a:r>
-          </a:p>
-          <a:p>
-            <a:pPr lvl="0"/>
-            <a:r>
-              <a:rPr b="1"/>
-              <a:t>What about an hybrid data structure?</a:t>
-            </a:r>
-          </a:p>
-        </p:txBody>
-      </p:sp>
-    </p:spTree>
-  </p:cSld>
-</p:sld>
-</file>
-
-<file path=ppt/slides/slide14.xml><?xml version="1.0" encoding="utf-8"?>
 <p:sld xmlns:a="http://schemas.openxmlformats.org/drawingml/2006/main" xmlns:r="http://schemas.openxmlformats.org/officeDocument/2006/relationships" xmlns:p="http://schemas.openxmlformats.org/presentationml/2006/main">
   <p:cSld>
     <p:spTree>
@@ -3796,7 +3757,7 @@
 </p:sld>
 </file>
 
-<file path=ppt/slides/slide15.xml><?xml version="1.0" encoding="utf-8"?>
+<file path=ppt/slides/slide14.xml><?xml version="1.0" encoding="utf-8"?>
 <p:sld xmlns:a="http://schemas.openxmlformats.org/drawingml/2006/main" xmlns:r="http://schemas.openxmlformats.org/officeDocument/2006/relationships" xmlns:p="http://schemas.openxmlformats.org/presentationml/2006/main">
   <p:cSld>
     <p:spTree>

</xml_diff>

<commit_message>
Deploying to gh-pages from @ ManuelePasini/slides-markdown@884da49c0ea6f3d26499fb8e368a62eb920652fc 🚀
</commit_message>
<xml_diff>
--- a/phd_secondyear.pptx
+++ b/phd_secondyear.pptx
@@ -3462,7 +3462,7 @@
       </p:sp>
       <p:pic>
         <p:nvPicPr>
-          <p:cNvPr descr="https://github.com/ManuelePasini/slides-markdown/blob/master/slides/images/phd2ndyear/agrits.svg" id="0" name="Picture 1"/>
+          <p:cNvPr descr="https://raw.githubusercontent.com/ManuelePasini/slides-markdown/refs/heads/master/slides/images/phd2ndyear/agrits.svg" id="0" name="Picture 1"/>
           <p:cNvPicPr>
             <a:picLocks noGrp="1" noChangeAspect="1"/>
           </p:cNvPicPr>
@@ -3476,8 +3476,8 @@
         </p:blipFill>
         <p:spPr bwMode="auto">
           <a:xfrm>
-            <a:off x="4648200" y="1295400"/>
-            <a:ext cx="4038600" cy="2692400"/>
+            <a:off x="4648200" y="2019300"/>
+            <a:ext cx="4038600" cy="1231900"/>
           </a:xfrm>
           <a:prstGeom prst="rect">
             <a:avLst/>

</xml_diff>

<commit_message>
Deploying to gh-pages from @ ManuelePasini/slides-markdown@0a172016ad2d0d3bf25785bd983f0cb4527fed07 🚀
</commit_message>
<xml_diff>
--- a/phd_secondyear.pptx
+++ b/phd_secondyear.pptx
@@ -18,7 +18,6 @@
     <p:sldId id="266" r:id="rId12"/>
     <p:sldId id="267" r:id="rId13"/>
     <p:sldId id="268" r:id="rId14"/>
-    <p:sldId id="269" r:id="rId15"/>
   </p:sldIdLst>
   <p:sldSz cx="9144000" cy="5143500" type="screen16x9"/>
   <p:notesSz cx="6858000" cy="9144000"/>
@@ -3398,6 +3397,27 @@
               <a:t>… but fall short in capturing the complex inter-entity dynamics.</a:t>
             </a:r>
           </a:p>
+          <a:p>
+            <a:pPr lvl="0"/>
+            <a:r>
+              <a:rPr/>
+              <a:t>Even the Data Platform Design methodology suggested different architectures tailored to each DT…</a:t>
+            </a:r>
+          </a:p>
+          <a:p>
+            <a:pPr lvl="0"/>
+            <a:r>
+              <a:rPr/>
+              <a:t>Yet, no multi-store solution has yet achieved broad adoption in the literature.</a:t>
+            </a:r>
+          </a:p>
+          <a:p>
+            <a:pPr lvl="0"/>
+            <a:r>
+              <a:rPr b="1"/>
+              <a:t>What about an hybrid data structure?</a:t>
+            </a:r>
+          </a:p>
         </p:txBody>
       </p:sp>
       <p:pic>
@@ -3544,65 +3564,6 @@
       </p:grpSpPr>
       <p:sp>
         <p:nvSpPr>
-          <p:cNvPr id="3" name="Content Placeholder 2"/>
-          <p:cNvSpPr>
-            <a:spLocks noGrp="1"/>
-          </p:cNvSpPr>
-          <p:nvPr>
-            <p:ph idx="1"/>
-          </p:nvPr>
-        </p:nvSpPr>
-        <p:spPr/>
-        <p:txBody>
-          <a:bodyPr/>
-          <a:lstStyle/>
-          <a:p>
-            <a:pPr lvl="0"/>
-            <a:r>
-              <a:rPr/>
-              <a:t>Even our Data Platform Design methodology repeatedly suggested multi-store architectures tailored to each DT…</a:t>
-            </a:r>
-          </a:p>
-          <a:p>
-            <a:pPr lvl="0"/>
-            <a:r>
-              <a:rPr/>
-              <a:t>Yet, no multi-store solution has yet achieved broad adoption in the literature.</a:t>
-            </a:r>
-          </a:p>
-          <a:p>
-            <a:pPr lvl="0"/>
-            <a:r>
-              <a:rPr b="1"/>
-              <a:t>What about an hybrid data structure?</a:t>
-            </a:r>
-          </a:p>
-        </p:txBody>
-      </p:sp>
-    </p:spTree>
-  </p:cSld>
-</p:sld>
-</file>
-
-<file path=ppt/slides/slide13.xml><?xml version="1.0" encoding="utf-8"?>
-<p:sld xmlns:a="http://schemas.openxmlformats.org/drawingml/2006/main" xmlns:r="http://schemas.openxmlformats.org/officeDocument/2006/relationships" xmlns:p="http://schemas.openxmlformats.org/presentationml/2006/main">
-  <p:cSld>
-    <p:spTree>
-      <p:nvGrpSpPr>
-        <p:cNvPr id="1" name=""/>
-        <p:cNvGrpSpPr/>
-        <p:nvPr/>
-      </p:nvGrpSpPr>
-      <p:grpSpPr>
-        <a:xfrm>
-          <a:off x="0" y="0"/>
-          <a:ext cx="0" cy="0"/>
-          <a:chOff x="0" y="0"/>
-          <a:chExt cx="0" cy="0"/>
-        </a:xfrm>
-      </p:grpSpPr>
-      <p:sp>
-        <p:nvSpPr>
           <p:cNvPr id="2" name="Title 1"/>
           <p:cNvSpPr>
             <a:spLocks noGrp="1"/>
@@ -3757,7 +3718,7 @@
 </p:sld>
 </file>
 
-<file path=ppt/slides/slide14.xml><?xml version="1.0" encoding="utf-8"?>
+<file path=ppt/slides/slide13.xml><?xml version="1.0" encoding="utf-8"?>
 <p:sld xmlns:a="http://schemas.openxmlformats.org/drawingml/2006/main" xmlns:r="http://schemas.openxmlformats.org/officeDocument/2006/relationships" xmlns:p="http://schemas.openxmlformats.org/presentationml/2006/main">
   <p:cSld>
     <p:spTree>

</xml_diff>

<commit_message>
Deploying to gh-pages from @ ManuelePasini/slides-markdown@b9ef35fabe0a6a4071bee7081c096ca5c66d4bc4 🚀
</commit_message>
<xml_diff>
--- a/phd_secondyear.pptx
+++ b/phd_secondyear.pptx
@@ -3790,21 +3790,21 @@
             <a:pPr lvl="0"/>
             <a:r>
               <a:rPr/>
-              <a:t>95631 - MACHINE LEARNING AND DATA MINING - 6 cfu (a.a. 23/24)</a:t>
+              <a:t>95631 - MACHINE LEARNING AND DATA MINING - 6 cfu (2023/2024)</a:t>
             </a:r>
           </a:p>
           <a:p>
             <a:pPr lvl="0"/>
             <a:r>
               <a:rPr/>
-              <a:t>95631 - MACHINE LEARNING AND DATA MINING - 6 cfu (a.a. 24/25)</a:t>
+              <a:t>95631 - MACHINE LEARNING AND DATA MINING - 6 cfu (2024/2025)</a:t>
             </a:r>
           </a:p>
           <a:p>
             <a:pPr lvl="0"/>
             <a:r>
               <a:rPr/>
-              <a:t>95631 - MACHINE LEARNING AND DATA MINING - 6 cfu (a.a. 25/26)</a:t>
+              <a:t>95631 - MACHINE LEARNING AND DATA MINING - 6 cfu (2025/2026)</a:t>
             </a:r>
           </a:p>
           <a:p>
@@ -3857,6 +3857,13 @@
             <a:r>
               <a:rPr/>
               <a:t>EDBT/ICDT 2024 Joint Conference</a:t>
+            </a:r>
+          </a:p>
+          <a:p>
+            <a:pPr lvl="0"/>
+            <a:r>
+              <a:rPr/>
+              <a:t>SEBD 2024, 2025</a:t>
             </a:r>
           </a:p>
         </p:txBody>

</xml_diff>

<commit_message>
Deploying to gh-pages from @ ManuelePasini/slides-markdown@4bef97bac5b4378247c0ddbaac95b954f9137d29 🚀
</commit_message>
<xml_diff>
--- a/phd_secondyear.pptx
+++ b/phd_secondyear.pptx
@@ -4396,6 +4396,13 @@
             <a:r>
               <a:rPr b="1"/>
               <a:t>A standardization effort is required to foster integration.</a:t>
+            </a:r>
+          </a:p>
+          <a:p>
+            <a:pPr lvl="1"/>
+            <a:r>
+              <a:rPr b="1"/>
+              <a:t>Standardization should begin at the data layer</a:t>
             </a:r>
           </a:p>
         </p:txBody>

</xml_diff>

<commit_message>
Deploying to gh-pages from @ ManuelePasini/slides-markdown@f97082016cf8e19b52b57b05371814f8412bc849 🚀
</commit_message>
<xml_diff>
--- a/phd_secondyear.pptx
+++ b/phd_secondyear.pptx
@@ -18,6 +18,9 @@
     <p:sldId id="266" r:id="rId12"/>
     <p:sldId id="267" r:id="rId13"/>
     <p:sldId id="268" r:id="rId14"/>
+    <p:sldId id="269" r:id="rId15"/>
+    <p:sldId id="270" r:id="rId16"/>
+    <p:sldId id="271" r:id="rId17"/>
   </p:sldIdLst>
   <p:sldSz cx="9144000" cy="5143500" type="screen16x9"/>
   <p:notesSz cx="6858000" cy="9144000"/>
@@ -3202,39 +3205,74 @@
           <a:chExt cx="0" cy="0"/>
         </a:xfrm>
       </p:grpSpPr>
-      <p:sp>
-        <p:nvSpPr>
-          <p:cNvPr id="2" name="Title 1"/>
-          <p:cNvSpPr>
-            <a:spLocks noGrp="1"/>
-          </p:cNvSpPr>
-          <p:nvPr>
-            <p:ph type="title"/>
-          </p:nvPr>
-        </p:nvSpPr>
-        <p:spPr/>
-        <p:txBody>
-          <a:bodyPr/>
-          <a:lstStyle/>
-          <a:p>
-            <a:pPr lvl="0" indent="0" marL="0">
+      <p:pic>
+        <p:nvPicPr>
+          <p:cNvPr descr="https://github.com/ManuelePasini/slides-markdown/blob/master/slides/images/phd2ndyear/agriplatform.png?raw=true" id="0" name="Picture 1"/>
+          <p:cNvPicPr>
+            <a:picLocks noGrp="1" noChangeAspect="1"/>
+          </p:cNvPicPr>
+          <p:nvPr/>
+        </p:nvPicPr>
+        <p:blipFill>
+          <a:blip r:embed="rId2"/>
+          <a:stretch>
+            <a:fillRect/>
+          </a:stretch>
+        </p:blipFill>
+        <p:spPr bwMode="auto">
+          <a:xfrm>
+            <a:off x="457200" y="1460500"/>
+            <a:ext cx="4038600" cy="2349500"/>
+          </a:xfrm>
+          <a:prstGeom prst="rect">
+            <a:avLst/>
+          </a:prstGeom>
+          <a:noFill/>
+          <a:ln w="9525">
+            <a:noFill/>
+            <a:headEnd/>
+            <a:tailEnd/>
+          </a:ln>
+        </p:spPr>
+      </p:pic>
+      <p:sp>
+        <p:nvSpPr>
+          <p:cNvPr id="1" name="TextBox 3"/>
+          <p:cNvSpPr txBox="1"/>
+          <p:nvPr/>
+        </p:nvSpPr>
+        <p:spPr>
+          <a:xfrm>
+            <a:off x="457200" y="4076700"/>
+            <a:ext cx="4038600" cy="508000"/>
+          </a:xfrm>
+          <a:prstGeom prst="rect">
+            <a:avLst/>
+          </a:prstGeom>
+          <a:noFill/>
+        </p:spPr>
+        <p:txBody>
+          <a:bodyPr/>
+          <a:lstStyle/>
+          <a:p>
+            <a:pPr lvl="0" indent="0" marL="0" algn="ctr">
               <a:buNone/>
             </a:pPr>
             <a:r>
               <a:rPr/>
-              <a:t>From application-oriented to domain-oriented</a:t>
-            </a:r>
-          </a:p>
-        </p:txBody>
-      </p:sp>
-      <p:sp>
-        <p:nvSpPr>
-          <p:cNvPr id="3" name="Content Placeholder 2"/>
-          <p:cNvSpPr>
-            <a:spLocks noGrp="1"/>
-          </p:cNvSpPr>
-          <p:nvPr>
-            <p:ph idx="1"/>
+              <a:t>Excerpt of the Agricolture Data Platform</a:t>
+            </a:r>
+          </a:p>
+        </p:txBody>
+      </p:sp>
+      <p:sp>
+        <p:nvSpPr>
+          <p:cNvPr id="4" name="Content Placeholder 3"/>
+          <p:cNvSpPr>
+            <a:spLocks noGrp="1"/>
+          </p:cNvSpPr>
+          <p:nvPr>
+            <p:ph idx="2" sz="half"/>
           </p:nvPr>
         </p:nvSpPr>
         <p:spPr/>
@@ -3244,66 +3282,36 @@
           <a:p>
             <a:pPr lvl="0"/>
             <a:r>
+              <a:rPr/>
+              <a:t>General purpose: supporting heterogeneous data through heterogeneous storage systems;</a:t>
+            </a:r>
+          </a:p>
+          <a:p>
+            <a:pPr lvl="0"/>
+            <a:r>
+              <a:rPr/>
+              <a:t>Interoperable: Interoperable: integration and sharing via common data models (e.g., </a:t>
+            </a:r>
+            <a:r>
+              <a:rPr>
+                <a:hlinkClick r:id="rId3"/>
+              </a:rPr>
+              <a:t>FIWARE</a:t>
+            </a:r>
+            <a:r>
+              <a:rPr/>
+              <a:t>);</a:t>
+            </a:r>
+          </a:p>
+          <a:p>
+            <a:pPr lvl="0"/>
+            <a:r>
               <a:rPr b="1"/>
-              <a:t>Research Question 1.</a:t>
-            </a:r>
-            <a:r>
-              <a:rPr/>
-              <a:t>: Can we move from application-level DT platforms to domain-level platforms?</a:t>
-            </a:r>
-          </a:p>
-          <a:p>
-            <a:pPr lvl="0" indent="0" marL="0">
-              <a:buNone/>
-            </a:pPr>
-            <a:r>
-              <a:rPr/>
-              <a:t>Takeaway: a DT can be represented as a data pipeline that collects, processes, and exploits data.</a:t>
-            </a:r>
-          </a:p>
-          <a:p>
-            <a:pPr lvl="0"/>
-            <a:r>
-              <a:rPr b="1"/>
-              <a:t>Research question 2.</a:t>
-            </a:r>
-            <a:r>
-              <a:rPr/>
-              <a:t>: given a data pipeline, can we identify the set of data platform services required to support it?</a:t>
-            </a:r>
-          </a:p>
-          <a:p>
-            <a:pPr lvl="0" indent="0" marL="0">
-              <a:buNone/>
-            </a:pPr>
-            <a:r>
-              <a:rPr/>
-              <a:t>References:</a:t>
-            </a:r>
-          </a:p>
-          <a:p>
-            <a:pPr lvl="0" indent="0" marL="0">
-              <a:buNone/>
-            </a:pPr>
-            <a:r>
-              <a:rPr/>
-              <a:t>Matteo Francia, Matteo Golfarelli, Manuele Pasini — Towards a Process-Driven Design of Data Platforms. In DOLAP, pp. 28–35, 2024.</a:t>
-            </a:r>
-          </a:p>
-          <a:p>
-            <a:pPr lvl="0" indent="0" marL="0">
-              <a:buNone/>
-            </a:pPr>
-            <a:r>
-              <a:rPr/>
-              <a:t>Matteo Francia, Matteo Golfarelli, Manuele Pasini — Process-Driven Design of Cloud Data Platforms. Information Systems Journal, Manuscript No. INFOSYS-D-24-00444.</a:t>
-            </a:r>
-          </a:p>
-          <a:p>
-            <a:pPr lvl="0"/>
-            <a:r>
-              <a:rPr/>
-              <a:t>But an issue emerged: pipelines of different DTs entail different data models &amp; storage systems, yet they share some of the same recurrent requirements….</a:t>
+              <a:t>Ongoing work</a:t>
+            </a:r>
+            <a:r>
+              <a:rPr/>
+              <a:t>: supporting and sharing data processes (e.g., donwload ESA images) and applications.</a:t>
             </a:r>
           </a:p>
         </p:txBody>
@@ -3314,6 +3322,134 @@
 </file>
 
 <file path=ppt/slides/slide11.xml><?xml version="1.0" encoding="utf-8"?>
+<p:sld xmlns:a="http://schemas.openxmlformats.org/drawingml/2006/main" xmlns:r="http://schemas.openxmlformats.org/officeDocument/2006/relationships" xmlns:p="http://schemas.openxmlformats.org/presentationml/2006/main">
+  <p:cSld>
+    <p:spTree>
+      <p:nvGrpSpPr>
+        <p:cNvPr id="1" name=""/>
+        <p:cNvGrpSpPr/>
+        <p:nvPr/>
+      </p:nvGrpSpPr>
+      <p:grpSpPr>
+        <a:xfrm>
+          <a:off x="0" y="0"/>
+          <a:ext cx="0" cy="0"/>
+          <a:chOff x="0" y="0"/>
+          <a:chExt cx="0" cy="0"/>
+        </a:xfrm>
+      </p:grpSpPr>
+      <p:sp>
+        <p:nvSpPr>
+          <p:cNvPr id="2" name="Title 1"/>
+          <p:cNvSpPr>
+            <a:spLocks noGrp="1"/>
+          </p:cNvSpPr>
+          <p:nvPr>
+            <p:ph type="title"/>
+          </p:nvPr>
+        </p:nvSpPr>
+        <p:spPr/>
+        <p:txBody>
+          <a:bodyPr/>
+          <a:lstStyle/>
+          <a:p>
+            <a:pPr lvl="0" indent="0" marL="0">
+              <a:buNone/>
+            </a:pPr>
+            <a:r>
+              <a:rPr/>
+              <a:t>From application-oriented to domain-oriented</a:t>
+            </a:r>
+          </a:p>
+        </p:txBody>
+      </p:sp>
+      <p:sp>
+        <p:nvSpPr>
+          <p:cNvPr id="3" name="Content Placeholder 2"/>
+          <p:cNvSpPr>
+            <a:spLocks noGrp="1"/>
+          </p:cNvSpPr>
+          <p:nvPr>
+            <p:ph idx="1"/>
+          </p:nvPr>
+        </p:nvSpPr>
+        <p:spPr/>
+        <p:txBody>
+          <a:bodyPr/>
+          <a:lstStyle/>
+          <a:p>
+            <a:pPr lvl="0"/>
+            <a:r>
+              <a:rPr b="1"/>
+              <a:t>Research Question 1.</a:t>
+            </a:r>
+            <a:r>
+              <a:rPr/>
+              <a:t>: Can we move from application-level DT platforms to domain-level platforms?</a:t>
+            </a:r>
+          </a:p>
+          <a:p>
+            <a:pPr lvl="0" indent="0" marL="0">
+              <a:buNone/>
+            </a:pPr>
+            <a:r>
+              <a:rPr/>
+              <a:t>Takeaway: a DT can be represented as a data pipeline that collects, processes, and exploits data.</a:t>
+            </a:r>
+          </a:p>
+          <a:p>
+            <a:pPr lvl="0"/>
+            <a:r>
+              <a:rPr b="1"/>
+              <a:t>Research question 2.</a:t>
+            </a:r>
+            <a:r>
+              <a:rPr/>
+              <a:t>: given a data pipeline, can we identify the set of data platform services required to support it?</a:t>
+            </a:r>
+          </a:p>
+          <a:p>
+            <a:pPr lvl="0" indent="0" marL="0">
+              <a:buNone/>
+            </a:pPr>
+            <a:r>
+              <a:rPr/>
+              <a:t>References:</a:t>
+            </a:r>
+          </a:p>
+          <a:p>
+            <a:pPr lvl="0" indent="0" marL="0">
+              <a:buNone/>
+            </a:pPr>
+            <a:r>
+              <a:rPr/>
+              <a:t>Matteo Francia, Matteo Golfarelli, Manuele Pasini — Towards a Process-Driven Design of Data Platforms. In DOLAP, pp. 28–35, 2024.</a:t>
+            </a:r>
+          </a:p>
+          <a:p>
+            <a:pPr lvl="0" indent="0" marL="0">
+              <a:buNone/>
+            </a:pPr>
+            <a:r>
+              <a:rPr/>
+              <a:t>Matteo Francia, Matteo Golfarelli, Manuele Pasini — Process-Driven Design of Cloud Data Platforms. Information Systems Journal, Manuscript No. INFOSYS-D-24-00444.</a:t>
+            </a:r>
+          </a:p>
+          <a:p>
+            <a:pPr lvl="0"/>
+            <a:r>
+              <a:rPr/>
+              <a:t>But an issue emerged: pipelines of different DTs entail different data models &amp; storage systems, yet they share some of the same recurrent requirements….</a:t>
+            </a:r>
+          </a:p>
+        </p:txBody>
+      </p:sp>
+    </p:spTree>
+  </p:cSld>
+</p:sld>
+</file>
+
+<file path=ppt/slides/slide12.xml><?xml version="1.0" encoding="utf-8"?>
 <p:sld xmlns:a="http://schemas.openxmlformats.org/drawingml/2006/main" xmlns:r="http://schemas.openxmlformats.org/officeDocument/2006/relationships" xmlns:p="http://schemas.openxmlformats.org/presentationml/2006/main">
   <p:cSld>
     <p:spTree>
@@ -3545,7 +3681,7 @@
 </p:sld>
 </file>
 
-<file path=ppt/slides/slide12.xml><?xml version="1.0" encoding="utf-8"?>
+<file path=ppt/slides/slide13.xml><?xml version="1.0" encoding="utf-8"?>
 <p:sld xmlns:a="http://schemas.openxmlformats.org/drawingml/2006/main" xmlns:r="http://schemas.openxmlformats.org/officeDocument/2006/relationships" xmlns:p="http://schemas.openxmlformats.org/presentationml/2006/main">
   <p:cSld>
     <p:spTree>
@@ -3610,6 +3746,28 @@
           </a:p>
         </p:txBody>
       </p:sp>
+    </p:spTree>
+  </p:cSld>
+</p:sld>
+</file>
+
+<file path=ppt/slides/slide14.xml><?xml version="1.0" encoding="utf-8"?>
+<p:sld xmlns:a="http://schemas.openxmlformats.org/drawingml/2006/main" xmlns:r="http://schemas.openxmlformats.org/officeDocument/2006/relationships" xmlns:p="http://schemas.openxmlformats.org/presentationml/2006/main">
+  <p:cSld>
+    <p:spTree>
+      <p:nvGrpSpPr>
+        <p:cNvPr id="1" name=""/>
+        <p:cNvGrpSpPr/>
+        <p:nvPr/>
+      </p:nvGrpSpPr>
+      <p:grpSpPr>
+        <a:xfrm>
+          <a:off x="0" y="0"/>
+          <a:ext cx="0" cy="0"/>
+          <a:chOff x="0" y="0"/>
+          <a:chExt cx="0" cy="0"/>
+        </a:xfrm>
+      </p:grpSpPr>
       <p:pic>
         <p:nvPicPr>
           <p:cNvPr descr="https://raw.githubusercontent.com/ManuelePasini/slides-markdown/refs/heads/master/slides/images/ioanninaSlides/dt_graph.svg" id="0" name="Picture 1"/>
@@ -3626,8 +3784,8 @@
         </p:blipFill>
         <p:spPr bwMode="auto">
           <a:xfrm>
-            <a:off x="2413000" y="1193800"/>
-            <a:ext cx="4318000" cy="2882900"/>
+            <a:off x="457200" y="1295400"/>
+            <a:ext cx="4038600" cy="2692400"/>
           </a:xfrm>
           <a:prstGeom prst="rect">
             <a:avLst/>
@@ -3649,7 +3807,7 @@
         <p:spPr>
           <a:xfrm>
             <a:off x="457200" y="4076700"/>
-            <a:ext cx="8229600" cy="508000"/>
+            <a:ext cx="4038600" cy="508000"/>
           </a:xfrm>
           <a:prstGeom prst="rect">
             <a:avLst/>
@@ -3672,12 +3830,12 @@
       </p:sp>
       <p:sp>
         <p:nvSpPr>
-          <p:cNvPr id="3" name="Content Placeholder 2"/>
-          <p:cNvSpPr>
-            <a:spLocks noGrp="1"/>
-          </p:cNvSpPr>
-          <p:nvPr>
-            <p:ph idx="1"/>
+          <p:cNvPr id="4" name="Content Placeholder 3"/>
+          <p:cNvSpPr>
+            <a:spLocks noGrp="1"/>
+          </p:cNvSpPr>
+          <p:nvPr>
+            <p:ph idx="2" sz="half"/>
           </p:nvPr>
         </p:nvSpPr>
         <p:spPr/>
@@ -3718,7 +3876,61 @@
 </p:sld>
 </file>
 
-<file path=ppt/slides/slide13.xml><?xml version="1.0" encoding="utf-8"?>
+<file path=ppt/slides/slide15.xml><?xml version="1.0" encoding="utf-8"?>
+<p:sld xmlns:a="http://schemas.openxmlformats.org/drawingml/2006/main" xmlns:r="http://schemas.openxmlformats.org/officeDocument/2006/relationships" xmlns:p="http://schemas.openxmlformats.org/presentationml/2006/main">
+  <p:cSld>
+    <p:spTree>
+      <p:nvGrpSpPr>
+        <p:cNvPr id="1" name=""/>
+        <p:cNvGrpSpPr/>
+        <p:nvPr/>
+      </p:nvGrpSpPr>
+      <p:grpSpPr>
+        <a:xfrm>
+          <a:off x="0" y="0"/>
+          <a:ext cx="0" cy="0"/>
+          <a:chOff x="0" y="0"/>
+          <a:chExt cx="0" cy="0"/>
+        </a:xfrm>
+      </p:grpSpPr>
+      <p:sp>
+        <p:nvSpPr>
+          <p:cNvPr id="3" name="Content Placeholder 2"/>
+          <p:cNvSpPr>
+            <a:spLocks noGrp="1"/>
+          </p:cNvSpPr>
+          <p:nvPr>
+            <p:ph idx="1"/>
+          </p:nvPr>
+        </p:nvSpPr>
+        <p:spPr/>
+        <p:txBody>
+          <a:bodyPr/>
+          <a:lstStyle/>
+          <a:p>
+            <a:pPr lvl="0" indent="0" marL="0">
+              <a:buNone/>
+            </a:pPr>
+            <a:r>
+              <a:rPr b="1"/>
+              <a:t>Ongoing and future Works</a:t>
+            </a:r>
+          </a:p>
+          <a:p>
+            <a:pPr lvl="0"/>
+            <a:r>
+              <a:rPr/>
+              <a:t>Efficient querying: The semantic capabilities of Large Language Models (LLMs) make them a compelling solution for managing the inherent complexity of transparent querying in hybrid storage environments.</a:t>
+            </a:r>
+          </a:p>
+        </p:txBody>
+      </p:sp>
+    </p:spTree>
+  </p:cSld>
+</p:sld>
+</file>
+
+<file path=ppt/slides/slide16.xml><?xml version="1.0" encoding="utf-8"?>
 <p:sld xmlns:a="http://schemas.openxmlformats.org/drawingml/2006/main" xmlns:r="http://schemas.openxmlformats.org/officeDocument/2006/relationships" xmlns:p="http://schemas.openxmlformats.org/presentationml/2006/main">
   <p:cSld>
     <p:spTree>
@@ -4683,12 +4895,12 @@
       </p:grpSpPr>
       <p:sp>
         <p:nvSpPr>
-          <p:cNvPr id="2" name="Title 1"/>
-          <p:cNvSpPr>
-            <a:spLocks noGrp="1"/>
-          </p:cNvSpPr>
-          <p:nvPr>
-            <p:ph type="title"/>
+          <p:cNvPr id="3" name="Content Placeholder 2"/>
+          <p:cNvSpPr>
+            <a:spLocks noGrp="1"/>
+          </p:cNvSpPr>
+          <p:nvPr>
+            <p:ph idx="1"/>
           </p:nvPr>
         </p:nvSpPr>
         <p:spPr/>
@@ -4700,66 +4912,22 @@
               <a:buNone/>
             </a:pPr>
             <a:r>
-              <a:rPr/>
-              <a:t>A Data Platform fostering collaboration between DTs</a:t>
-            </a:r>
-          </a:p>
-        </p:txBody>
-      </p:sp>
-      <p:sp>
-        <p:nvSpPr>
-          <p:cNvPr id="3" name="Content Placeholder 2"/>
-          <p:cNvSpPr>
-            <a:spLocks noGrp="1"/>
-          </p:cNvSpPr>
-          <p:nvPr>
-            <p:ph idx="1"/>
-          </p:nvPr>
-        </p:nvSpPr>
-        <p:spPr/>
-        <p:txBody>
-          <a:bodyPr/>
-          <a:lstStyle/>
-          <a:p>
-            <a:pPr lvl="0"/>
-            <a:r>
-              <a:rPr/>
-              <a:t>Within Agritech - Spoke 3, a data platform fostering integration across research projects has been developed.</a:t>
-            </a:r>
-          </a:p>
-          <a:p>
-            <a:pPr lvl="0"/>
-            <a:r>
-              <a:rPr/>
-              <a:t>When defining integration policies and standards, several recurrent data requirements were identified:</a:t>
-            </a:r>
-          </a:p>
-          <a:p>
-            <a:pPr lvl="1"/>
-            <a:r>
-              <a:rPr/>
-              <a:t>Heterogeneous data: from structured to unstructured (including images).</a:t>
-            </a:r>
-          </a:p>
-          <a:p>
-            <a:pPr lvl="1"/>
-            <a:r>
-              <a:rPr/>
-              <a:t>Interconnected data: capturing physical entities together with the IoT networks describing them.</a:t>
-            </a:r>
-          </a:p>
-          <a:p>
-            <a:pPr lvl="1"/>
-            <a:r>
-              <a:rPr/>
-              <a:t>Temporal aspects: datasets often evolve as time series.</a:t>
-            </a:r>
-          </a:p>
-          <a:p>
-            <a:pPr lvl="1"/>
-            <a:r>
-              <a:rPr/>
-              <a:t>Spatial aspects: data are often geo-referenced.</a:t>
+              <a:rPr b="1"/>
+              <a:t>Ongoing work</a:t>
+            </a:r>
+            <a:r>
+              <a:rPr/>
+              <a:t>: </a:t>
+            </a:r>
+            <a:r>
+              <a:rPr>
+                <a:hlinkClick r:id="rId2"/>
+              </a:rPr>
+              <a:t>ZESPRI</a:t>
+            </a:r>
+            <a:r>
+              <a:rPr/>
+              <a:t>, the world’s largest kiwifruit producer, has decided to undertake large-scale experimental implementation of the system for the 2026 irrigation season.</a:t>
             </a:r>
           </a:p>
         </p:txBody>
@@ -4786,74 +4954,39 @@
           <a:chExt cx="0" cy="0"/>
         </a:xfrm>
       </p:grpSpPr>
-      <p:pic>
-        <p:nvPicPr>
-          <p:cNvPr descr="https://github.com/ManuelePasini/slides-markdown/blob/master/slides/images/phd2ndyear/agriplatform.png?raw=true" id="0" name="Picture 1"/>
-          <p:cNvPicPr>
-            <a:picLocks noGrp="1" noChangeAspect="1"/>
-          </p:cNvPicPr>
-          <p:nvPr/>
-        </p:nvPicPr>
-        <p:blipFill>
-          <a:blip r:embed="rId2"/>
-          <a:stretch>
-            <a:fillRect/>
-          </a:stretch>
-        </p:blipFill>
-        <p:spPr bwMode="auto">
-          <a:xfrm>
-            <a:off x="457200" y="1460500"/>
-            <a:ext cx="4038600" cy="2349500"/>
-          </a:xfrm>
-          <a:prstGeom prst="rect">
-            <a:avLst/>
-          </a:prstGeom>
-          <a:noFill/>
-          <a:ln w="9525">
-            <a:noFill/>
-            <a:headEnd/>
-            <a:tailEnd/>
-          </a:ln>
-        </p:spPr>
-      </p:pic>
-      <p:sp>
-        <p:nvSpPr>
-          <p:cNvPr id="1" name="TextBox 3"/>
-          <p:cNvSpPr txBox="1"/>
-          <p:nvPr/>
-        </p:nvSpPr>
-        <p:spPr>
-          <a:xfrm>
-            <a:off x="457200" y="4076700"/>
-            <a:ext cx="4038600" cy="508000"/>
-          </a:xfrm>
-          <a:prstGeom prst="rect">
-            <a:avLst/>
-          </a:prstGeom>
-          <a:noFill/>
-        </p:spPr>
-        <p:txBody>
-          <a:bodyPr/>
-          <a:lstStyle/>
-          <a:p>
-            <a:pPr lvl="0" indent="0" marL="0" algn="ctr">
+      <p:sp>
+        <p:nvSpPr>
+          <p:cNvPr id="2" name="Title 1"/>
+          <p:cNvSpPr>
+            <a:spLocks noGrp="1"/>
+          </p:cNvSpPr>
+          <p:nvPr>
+            <p:ph type="title"/>
+          </p:nvPr>
+        </p:nvSpPr>
+        <p:spPr/>
+        <p:txBody>
+          <a:bodyPr/>
+          <a:lstStyle/>
+          <a:p>
+            <a:pPr lvl="0" indent="0" marL="0">
               <a:buNone/>
             </a:pPr>
             <a:r>
               <a:rPr/>
-              <a:t>Excerpt of the Agricolture Data Platform</a:t>
-            </a:r>
-          </a:p>
-        </p:txBody>
-      </p:sp>
-      <p:sp>
-        <p:nvSpPr>
-          <p:cNvPr id="4" name="Content Placeholder 3"/>
-          <p:cNvSpPr>
-            <a:spLocks noGrp="1"/>
-          </p:cNvSpPr>
-          <p:nvPr>
-            <p:ph idx="2" sz="half"/>
+              <a:t>A Data Platform fostering collaboration between DTs</a:t>
+            </a:r>
+          </a:p>
+        </p:txBody>
+      </p:sp>
+      <p:sp>
+        <p:nvSpPr>
+          <p:cNvPr id="3" name="Content Placeholder 2"/>
+          <p:cNvSpPr>
+            <a:spLocks noGrp="1"/>
+          </p:cNvSpPr>
+          <p:nvPr>
+            <p:ph idx="1"/>
           </p:nvPr>
         </p:nvSpPr>
         <p:spPr/>
@@ -4864,35 +4997,42 @@
             <a:pPr lvl="0"/>
             <a:r>
               <a:rPr/>
-              <a:t>General purpose: supporting heterogeneous data through heterogeneous storage systems;</a:t>
+              <a:t>Within Agritech - Spoke 3, a data platform fostering integration across research projects has been developed.</a:t>
             </a:r>
           </a:p>
           <a:p>
             <a:pPr lvl="0"/>
             <a:r>
               <a:rPr/>
-              <a:t>Interoperable: Interoperable: integration and sharing via common data models (e.g., </a:t>
-            </a:r>
-            <a:r>
-              <a:rPr>
-                <a:hlinkClick r:id="rId3"/>
-              </a:rPr>
-              <a:t>FIWARE</a:t>
-            </a:r>
-            <a:r>
-              <a:rPr/>
-              <a:t>);</a:t>
-            </a:r>
-          </a:p>
-          <a:p>
-            <a:pPr lvl="0"/>
-            <a:r>
-              <a:rPr b="1"/>
-              <a:t>Ongoing work</a:t>
-            </a:r>
-            <a:r>
-              <a:rPr/>
-              <a:t>: supporting and sharing data processes (e.g., donwload ESA images) and applications.</a:t>
+              <a:t>When defining integration policies and standards, several recurrent data requirements were identified:</a:t>
+            </a:r>
+          </a:p>
+          <a:p>
+            <a:pPr lvl="1"/>
+            <a:r>
+              <a:rPr/>
+              <a:t>Heterogeneous data: from structured to unstructured (including images).</a:t>
+            </a:r>
+          </a:p>
+          <a:p>
+            <a:pPr lvl="1"/>
+            <a:r>
+              <a:rPr/>
+              <a:t>Interconnected data: capturing physical entities together with the IoT networks describing them.</a:t>
+            </a:r>
+          </a:p>
+          <a:p>
+            <a:pPr lvl="1"/>
+            <a:r>
+              <a:rPr/>
+              <a:t>Temporal aspects: datasets often evolve as time series.</a:t>
+            </a:r>
+          </a:p>
+          <a:p>
+            <a:pPr lvl="1"/>
+            <a:r>
+              <a:rPr/>
+              <a:t>Spatial aspects: data are often geo-referenced.</a:t>
             </a:r>
           </a:p>
         </p:txBody>

</xml_diff>

<commit_message>
Deploying to gh-pages from @ ManuelePasini/slides-markdown@6185ed64a835f1e57e1b2d3604b48d4cec946c33 🚀
</commit_message>
<xml_diff>
--- a/phd_secondyear.pptx
+++ b/phd_secondyear.pptx
@@ -20,7 +20,6 @@
     <p:sldId id="268" r:id="rId14"/>
     <p:sldId id="269" r:id="rId15"/>
     <p:sldId id="270" r:id="rId16"/>
-    <p:sldId id="271" r:id="rId17"/>
   </p:sldIdLst>
   <p:sldSz cx="9144000" cy="5143500" type="screen16x9"/>
   <p:notesSz cx="6858000" cy="9144000"/>
@@ -3163,12 +3162,7 @@
             <p:ph type="title"/>
           </p:nvPr>
         </p:nvSpPr>
-        <p:spPr>
-          <a:xfrm>
-            <a:off x="722313" y="3305176"/>
-            <a:ext cx="7772400" cy="1021556"/>
-          </a:xfrm>
-        </p:spPr>
+        <p:spPr/>
         <p:txBody>
           <a:bodyPr/>
           <a:lstStyle/>
@@ -3178,7 +3172,77 @@
             </a:pPr>
             <a:r>
               <a:rPr/>
-              <a:t>2nd Year Ph.D. Seminar</a:t>
+              <a:t>Architectures and Methods for Digital Twin Platforms</a:t>
+            </a:r>
+          </a:p>
+        </p:txBody>
+      </p:sp>
+      <p:sp>
+        <p:nvSpPr>
+          <p:cNvPr id="3" name="Content Placeholder 2"/>
+          <p:cNvSpPr>
+            <a:spLocks noGrp="1"/>
+          </p:cNvSpPr>
+          <p:nvPr>
+            <p:ph idx="1"/>
+          </p:nvPr>
+        </p:nvSpPr>
+        <p:spPr/>
+        <p:txBody>
+          <a:bodyPr/>
+          <a:lstStyle/>
+          <a:p>
+            <a:pPr lvl="0"/>
+            <a:r>
+              <a:rPr/>
+              <a:t>Manuele Pasini - Ph.D. Student</a:t>
+            </a:r>
+          </a:p>
+          <a:p>
+            <a:pPr lvl="1"/>
+            <a:r>
+              <a:rPr/>
+              <a:t>Business Intelligence Group (B.I.G.)</a:t>
+            </a:r>
+          </a:p>
+          <a:p>
+            <a:pPr lvl="1"/>
+            <a:r>
+              <a:rPr/>
+              <a:t>Supervisor: Prof. Matteo Golfarelli</a:t>
+            </a:r>
+          </a:p>
+          <a:p>
+            <a:pPr lvl="0" indent="0" marL="0">
+              <a:spcBef>
+                <a:spcPts val="3000"/>
+              </a:spcBef>
+              <a:buNone/>
+            </a:pPr>
+            <a:r>
+              <a:rPr b="1"/>
+              <a:t>Introduction to Digital Twins</a:t>
+            </a:r>
+          </a:p>
+          <a:p>
+            <a:pPr lvl="0"/>
+            <a:r>
+              <a:rPr/>
+              <a:t>Differences between digital shadow, digital model, Digital Twin (DT)</a:t>
+            </a:r>
+          </a:p>
+          <a:p>
+            <a:pPr lvl="0"/>
+            <a:r>
+              <a:rPr/>
+              <a:t>Still a buzzword, but enclosing on a definition…</a:t>
+            </a:r>
+          </a:p>
+          <a:p>
+            <a:pPr lvl="0"/>
+            <a:r>
+              <a:rPr/>
+              <a:t>4 components: phyisical model, virtual model, communication services and the data</a:t>
             </a:r>
           </a:p>
         </p:txBody>
@@ -3189,6 +3253,1481 @@
 </file>
 
 <file path=ppt/slides/slide10.xml><?xml version="1.0" encoding="utf-8"?>
+<p:sld xmlns:a="http://schemas.openxmlformats.org/drawingml/2006/main" xmlns:r="http://schemas.openxmlformats.org/officeDocument/2006/relationships" xmlns:p="http://schemas.openxmlformats.org/presentationml/2006/main">
+  <p:cSld>
+    <p:spTree>
+      <p:nvGrpSpPr>
+        <p:cNvPr id="1" name=""/>
+        <p:cNvGrpSpPr/>
+        <p:nvPr/>
+      </p:nvGrpSpPr>
+      <p:grpSpPr>
+        <a:xfrm>
+          <a:off x="0" y="0"/>
+          <a:ext cx="0" cy="0"/>
+          <a:chOff x="0" y="0"/>
+          <a:chExt cx="0" cy="0"/>
+        </a:xfrm>
+      </p:grpSpPr>
+      <p:sp>
+        <p:nvSpPr>
+          <p:cNvPr id="3" name="Content Placeholder 2"/>
+          <p:cNvSpPr>
+            <a:spLocks noGrp="1"/>
+          </p:cNvSpPr>
+          <p:nvPr>
+            <p:ph idx="1" sz="half"/>
+          </p:nvPr>
+        </p:nvSpPr>
+        <p:spPr/>
+        <p:txBody>
+          <a:bodyPr/>
+          <a:lstStyle/>
+          <a:p>
+            <a:pPr lvl="0"/>
+            <a:r>
+              <a:rPr/>
+              <a:t>DT data involve highly interconnected entitieS (e.g., a fruit tree and the IoT network describing it), suggesting the use of graph data layout for efficient storage and querying…</a:t>
+            </a:r>
+          </a:p>
+          <a:p>
+            <a:pPr lvl="1"/>
+            <a:r>
+              <a:rPr/>
+              <a:t>… yet, they struggle with such volume of data</a:t>
+            </a:r>
+          </a:p>
+          <a:p>
+            <a:pPr lvl="0"/>
+            <a:r>
+              <a:rPr/>
+              <a:t>Time-Series storage systems efficiently manage large volumes of temporal data…</a:t>
+            </a:r>
+          </a:p>
+          <a:p>
+            <a:pPr lvl="1"/>
+            <a:r>
+              <a:rPr/>
+              <a:t>… but fall short in capturing the complex inter-entity dynamics.</a:t>
+            </a:r>
+          </a:p>
+          <a:p>
+            <a:pPr lvl="0"/>
+            <a:r>
+              <a:rPr/>
+              <a:t>Even the Data Platform Design methodology suggested different architectures tailored to each DT…</a:t>
+            </a:r>
+          </a:p>
+          <a:p>
+            <a:pPr lvl="0"/>
+            <a:r>
+              <a:rPr/>
+              <a:t>Yet, no multi-store solution has yet achieved broad adoption in the literature.</a:t>
+            </a:r>
+          </a:p>
+          <a:p>
+            <a:pPr lvl="0"/>
+            <a:r>
+              <a:rPr b="1"/>
+              <a:t>What about an hybrid data structure?</a:t>
+            </a:r>
+          </a:p>
+        </p:txBody>
+      </p:sp>
+      <p:pic>
+        <p:nvPicPr>
+          <p:cNvPr descr="https://github.com/ManuelePasini/slides-markdown/blob/master/slides/images/phd2ndyear/agrigraph.png?raw=true" id="0" name="Picture 1"/>
+          <p:cNvPicPr>
+            <a:picLocks noGrp="1" noChangeAspect="1"/>
+          </p:cNvPicPr>
+          <p:nvPr/>
+        </p:nvPicPr>
+        <p:blipFill>
+          <a:blip r:embed="rId2"/>
+          <a:stretch>
+            <a:fillRect/>
+          </a:stretch>
+        </p:blipFill>
+        <p:spPr bwMode="auto">
+          <a:xfrm>
+            <a:off x="4699000" y="1193800"/>
+            <a:ext cx="3924300" cy="2882900"/>
+          </a:xfrm>
+          <a:prstGeom prst="rect">
+            <a:avLst/>
+          </a:prstGeom>
+          <a:noFill/>
+          <a:ln w="9525">
+            <a:noFill/>
+            <a:headEnd/>
+            <a:tailEnd/>
+          </a:ln>
+        </p:spPr>
+      </p:pic>
+      <p:sp>
+        <p:nvSpPr>
+          <p:cNvPr id="1" name="TextBox 3"/>
+          <p:cNvSpPr txBox="1"/>
+          <p:nvPr/>
+        </p:nvSpPr>
+        <p:spPr>
+          <a:xfrm>
+            <a:off x="4648200" y="4076700"/>
+            <a:ext cx="4038600" cy="508000"/>
+          </a:xfrm>
+          <a:prstGeom prst="rect">
+            <a:avLst/>
+          </a:prstGeom>
+          <a:noFill/>
+        </p:spPr>
+        <p:txBody>
+          <a:bodyPr/>
+          <a:lstStyle/>
+          <a:p>
+            <a:pPr lvl="0" indent="0" marL="0" algn="ctr">
+              <a:buNone/>
+            </a:pPr>
+            <a:r>
+              <a:rPr/>
+              <a:t>Graph representation of Precision Irrigation DT</a:t>
+            </a:r>
+          </a:p>
+        </p:txBody>
+      </p:sp>
+      <p:pic>
+        <p:nvPicPr>
+          <p:cNvPr descr="https://raw.githubusercontent.com/ManuelePasini/slides-markdown/refs/heads/master/slides/images/phd2ndyear/agrits.svg" id="0" name="Picture 1"/>
+          <p:cNvPicPr>
+            <a:picLocks noGrp="1" noChangeAspect="1"/>
+          </p:cNvPicPr>
+          <p:nvPr/>
+        </p:nvPicPr>
+        <p:blipFill>
+          <a:blip r:embed="rId3"/>
+          <a:stretch>
+            <a:fillRect/>
+          </a:stretch>
+        </p:blipFill>
+        <p:spPr bwMode="auto">
+          <a:xfrm>
+            <a:off x="4648200" y="2019300"/>
+            <a:ext cx="4038600" cy="1231900"/>
+          </a:xfrm>
+          <a:prstGeom prst="rect">
+            <a:avLst/>
+          </a:prstGeom>
+          <a:noFill/>
+          <a:ln w="9525">
+            <a:noFill/>
+            <a:headEnd/>
+            <a:tailEnd/>
+          </a:ln>
+        </p:spPr>
+      </p:pic>
+      <p:sp>
+        <p:nvSpPr>
+          <p:cNvPr id="1" name="TextBox 3"/>
+          <p:cNvSpPr txBox="1"/>
+          <p:nvPr/>
+        </p:nvSpPr>
+        <p:spPr>
+          <a:xfrm>
+            <a:off x="4648200" y="4076700"/>
+            <a:ext cx="4038600" cy="508000"/>
+          </a:xfrm>
+          <a:prstGeom prst="rect">
+            <a:avLst/>
+          </a:prstGeom>
+          <a:noFill/>
+        </p:spPr>
+        <p:txBody>
+          <a:bodyPr/>
+          <a:lstStyle/>
+          <a:p>
+            <a:pPr lvl="0" indent="0" marL="0" algn="ctr">
+              <a:buNone/>
+            </a:pPr>
+            <a:r>
+              <a:rPr/>
+              <a:t>Time-Series representation of Precision Irrigation DT</a:t>
+            </a:r>
+          </a:p>
+        </p:txBody>
+      </p:sp>
+    </p:spTree>
+  </p:cSld>
+</p:sld>
+</file>
+
+<file path=ppt/slides/slide11.xml><?xml version="1.0" encoding="utf-8"?>
+<p:sld xmlns:a="http://schemas.openxmlformats.org/drawingml/2006/main" xmlns:r="http://schemas.openxmlformats.org/officeDocument/2006/relationships" xmlns:p="http://schemas.openxmlformats.org/presentationml/2006/main">
+  <p:cSld>
+    <p:spTree>
+      <p:nvGrpSpPr>
+        <p:cNvPr id="1" name=""/>
+        <p:cNvGrpSpPr/>
+        <p:nvPr/>
+      </p:nvGrpSpPr>
+      <p:grpSpPr>
+        <a:xfrm>
+          <a:off x="0" y="0"/>
+          <a:ext cx="0" cy="0"/>
+          <a:chOff x="0" y="0"/>
+          <a:chExt cx="0" cy="0"/>
+        </a:xfrm>
+      </p:grpSpPr>
+      <p:sp>
+        <p:nvSpPr>
+          <p:cNvPr id="3" name="Content Placeholder 2"/>
+          <p:cNvSpPr>
+            <a:spLocks noGrp="1"/>
+          </p:cNvSpPr>
+          <p:nvPr>
+            <p:ph idx="1"/>
+          </p:nvPr>
+        </p:nvSpPr>
+        <p:spPr/>
+        <p:txBody>
+          <a:bodyPr/>
+          <a:lstStyle/>
+          <a:p>
+            <a:pPr lvl="0" indent="0" marL="0">
+              <a:spcBef>
+                <a:spcPts val="3000"/>
+              </a:spcBef>
+              <a:buNone/>
+            </a:pPr>
+            <a:r>
+              <a:rPr b="1"/>
+              <a:t>An Hybryd data structure enabling Digital Twin Data</a:t>
+            </a:r>
+          </a:p>
+          <a:p>
+            <a:pPr lvl="0"/>
+            <a:r>
+              <a:rPr/>
+              <a:t>Combining the strength of Graph and Time-Series data layouts with a novel, hybrid data structure.</a:t>
+            </a:r>
+          </a:p>
+        </p:txBody>
+      </p:sp>
+    </p:spTree>
+  </p:cSld>
+</p:sld>
+</file>
+
+<file path=ppt/slides/slide12.xml><?xml version="1.0" encoding="utf-8"?>
+<p:sld xmlns:a="http://schemas.openxmlformats.org/drawingml/2006/main" xmlns:r="http://schemas.openxmlformats.org/officeDocument/2006/relationships" xmlns:p="http://schemas.openxmlformats.org/presentationml/2006/main">
+  <p:cSld>
+    <p:spTree>
+      <p:nvGrpSpPr>
+        <p:cNvPr id="1" name=""/>
+        <p:cNvGrpSpPr/>
+        <p:nvPr/>
+      </p:nvGrpSpPr>
+      <p:grpSpPr>
+        <a:xfrm>
+          <a:off x="0" y="0"/>
+          <a:ext cx="0" cy="0"/>
+          <a:chOff x="0" y="0"/>
+          <a:chExt cx="0" cy="0"/>
+        </a:xfrm>
+      </p:grpSpPr>
+      <p:pic>
+        <p:nvPicPr>
+          <p:cNvPr descr="https://raw.githubusercontent.com/ManuelePasini/slides-markdown/refs/heads/master/slides/images/ioanninaSlides/dt_graph.svg" id="0" name="Picture 1"/>
+          <p:cNvPicPr>
+            <a:picLocks noGrp="1" noChangeAspect="1"/>
+          </p:cNvPicPr>
+          <p:nvPr/>
+        </p:nvPicPr>
+        <p:blipFill>
+          <a:blip r:embed="rId2"/>
+          <a:stretch>
+            <a:fillRect/>
+          </a:stretch>
+        </p:blipFill>
+        <p:spPr bwMode="auto">
+          <a:xfrm>
+            <a:off x="457200" y="1295400"/>
+            <a:ext cx="4038600" cy="2692400"/>
+          </a:xfrm>
+          <a:prstGeom prst="rect">
+            <a:avLst/>
+          </a:prstGeom>
+          <a:noFill/>
+          <a:ln w="9525">
+            <a:noFill/>
+            <a:headEnd/>
+            <a:tailEnd/>
+          </a:ln>
+        </p:spPr>
+      </p:pic>
+      <p:sp>
+        <p:nvSpPr>
+          <p:cNvPr id="1" name="TextBox 3"/>
+          <p:cNvSpPr txBox="1"/>
+          <p:nvPr/>
+        </p:nvSpPr>
+        <p:spPr>
+          <a:xfrm>
+            <a:off x="457200" y="4076700"/>
+            <a:ext cx="4038600" cy="508000"/>
+          </a:xfrm>
+          <a:prstGeom prst="rect">
+            <a:avLst/>
+          </a:prstGeom>
+          <a:noFill/>
+        </p:spPr>
+        <p:txBody>
+          <a:bodyPr/>
+          <a:lstStyle/>
+          <a:p>
+            <a:pPr lvl="0" indent="0" marL="0" algn="ctr">
+              <a:buNone/>
+            </a:pPr>
+            <a:r>
+              <a:rPr/>
+              <a:t>Graph+TimeSeries Hybrid data model</a:t>
+            </a:r>
+          </a:p>
+        </p:txBody>
+      </p:sp>
+      <p:sp>
+        <p:nvSpPr>
+          <p:cNvPr id="4" name="Content Placeholder 3"/>
+          <p:cNvSpPr>
+            <a:spLocks noGrp="1"/>
+          </p:cNvSpPr>
+          <p:nvPr>
+            <p:ph idx="2" sz="half"/>
+          </p:nvPr>
+        </p:nvSpPr>
+        <p:spPr/>
+        <p:txBody>
+          <a:bodyPr/>
+          <a:lstStyle/>
+          <a:p>
+            <a:pPr lvl="0"/>
+            <a:r>
+              <a:rPr/>
+              <a:t>A representative query workload has been designed, capturing the core of Digital Twin applications by integrating IoT, Time-Series, and Graph queries.</a:t>
+            </a:r>
+          </a:p>
+          <a:p>
+            <a:pPr lvl="0"/>
+            <a:r>
+              <a:rPr/>
+              <a:t>The data structure has been implemented in Kotlin and benchmarked against state-of-the-art techniques, showing promising performance gains.</a:t>
+            </a:r>
+          </a:p>
+          <a:p>
+            <a:pPr lvl="0"/>
+            <a:r>
+              <a:rPr/>
+              <a:t>The paper is curently under writing and to be submitted to </a:t>
+            </a:r>
+            <a:r>
+              <a:rPr>
+                <a:hlinkClick r:id="rId3"/>
+              </a:rPr>
+              <a:t>VLDB 2026</a:t>
+            </a:r>
+          </a:p>
+        </p:txBody>
+      </p:sp>
+    </p:spTree>
+  </p:cSld>
+</p:sld>
+</file>
+
+<file path=ppt/slides/slide13.xml><?xml version="1.0" encoding="utf-8"?>
+<p:sld xmlns:a="http://schemas.openxmlformats.org/drawingml/2006/main" xmlns:r="http://schemas.openxmlformats.org/officeDocument/2006/relationships" xmlns:p="http://schemas.openxmlformats.org/presentationml/2006/main">
+  <p:cSld>
+    <p:spTree>
+      <p:nvGrpSpPr>
+        <p:cNvPr id="1" name=""/>
+        <p:cNvGrpSpPr/>
+        <p:nvPr/>
+      </p:nvGrpSpPr>
+      <p:grpSpPr>
+        <a:xfrm>
+          <a:off x="0" y="0"/>
+          <a:ext cx="0" cy="0"/>
+          <a:chOff x="0" y="0"/>
+          <a:chExt cx="0" cy="0"/>
+        </a:xfrm>
+      </p:grpSpPr>
+      <p:sp>
+        <p:nvSpPr>
+          <p:cNvPr id="3" name="Content Placeholder 2"/>
+          <p:cNvSpPr>
+            <a:spLocks noGrp="1"/>
+          </p:cNvSpPr>
+          <p:nvPr>
+            <p:ph idx="1"/>
+          </p:nvPr>
+        </p:nvSpPr>
+        <p:spPr/>
+        <p:txBody>
+          <a:bodyPr/>
+          <a:lstStyle/>
+          <a:p>
+            <a:pPr lvl="0" indent="0" marL="0">
+              <a:buNone/>
+            </a:pPr>
+            <a:r>
+              <a:rPr b="1"/>
+              <a:t>Future Works</a:t>
+            </a:r>
+          </a:p>
+          <a:p>
+            <a:pPr lvl="0"/>
+            <a:r>
+              <a:rPr/>
+              <a:t>Efficient querying: The semantic capabilities of Large Language Models (LLMs) make them a compelling solution for managing the inherent complexity of transparent querying in hybrid storage environments.</a:t>
+            </a:r>
+          </a:p>
+          <a:p>
+            <a:pPr lvl="0" indent="0" marL="0">
+              <a:spcBef>
+                <a:spcPts val="3000"/>
+              </a:spcBef>
+              <a:buNone/>
+            </a:pPr>
+            <a:r>
+              <a:rPr b="1"/>
+              <a:t>Other activities</a:t>
+            </a:r>
+          </a:p>
+        </p:txBody>
+      </p:sp>
+    </p:spTree>
+  </p:cSld>
+</p:sld>
+</file>
+
+<file path=ppt/slides/slide14.xml><?xml version="1.0" encoding="utf-8"?>
+<p:sld xmlns:a="http://schemas.openxmlformats.org/drawingml/2006/main" xmlns:r="http://schemas.openxmlformats.org/officeDocument/2006/relationships" xmlns:p="http://schemas.openxmlformats.org/presentationml/2006/main">
+  <p:cSld>
+    <p:spTree>
+      <p:nvGrpSpPr>
+        <p:cNvPr id="1" name=""/>
+        <p:cNvGrpSpPr/>
+        <p:nvPr/>
+      </p:nvGrpSpPr>
+      <p:grpSpPr>
+        <a:xfrm>
+          <a:off x="0" y="0"/>
+          <a:ext cx="0" cy="0"/>
+          <a:chOff x="0" y="0"/>
+          <a:chExt cx="0" cy="0"/>
+        </a:xfrm>
+      </p:grpSpPr>
+      <p:sp>
+        <p:nvSpPr>
+          <p:cNvPr id="3" name="Content Placeholder 2"/>
+          <p:cNvSpPr>
+            <a:spLocks noGrp="1"/>
+          </p:cNvSpPr>
+          <p:nvPr>
+            <p:ph idx="1" sz="half"/>
+          </p:nvPr>
+        </p:nvSpPr>
+        <p:spPr/>
+        <p:txBody>
+          <a:bodyPr/>
+          <a:lstStyle/>
+          <a:p>
+            <a:pPr lvl="0" indent="0" marL="0">
+              <a:spcBef>
+                <a:spcPts val="3000"/>
+              </a:spcBef>
+              <a:buNone/>
+            </a:pPr>
+            <a:r>
+              <a:rPr b="1"/>
+              <a:t>Tutoring</a:t>
+            </a:r>
+          </a:p>
+          <a:p>
+            <a:pPr lvl="0"/>
+            <a:r>
+              <a:rPr/>
+              <a:t>95631 - MACHINE LEARNING AND DATA MINING - 6 cfu (2023/2024)</a:t>
+            </a:r>
+          </a:p>
+          <a:p>
+            <a:pPr lvl="0"/>
+            <a:r>
+              <a:rPr/>
+              <a:t>95631 - MACHINE LEARNING AND DATA MINING - 6 cfu (2024/2025)</a:t>
+            </a:r>
+          </a:p>
+          <a:p>
+            <a:pPr lvl="0"/>
+            <a:r>
+              <a:rPr/>
+              <a:t>95631 - MACHINE LEARNING AND DATA MINING - 6 cfu (2025/2026)</a:t>
+            </a:r>
+          </a:p>
+          <a:p>
+            <a:pPr lvl="0" indent="0" marL="0">
+              <a:spcBef>
+                <a:spcPts val="3000"/>
+              </a:spcBef>
+              <a:buNone/>
+            </a:pPr>
+            <a:r>
+              <a:rPr b="1"/>
+              <a:t>Summer schools</a:t>
+            </a:r>
+          </a:p>
+          <a:p>
+            <a:pPr lvl="0"/>
+            <a:r>
+              <a:rPr/>
+              <a:t>6th ACM Europe Summer School on Data Science, Ioannina (Greece)</a:t>
+            </a:r>
+          </a:p>
+          <a:p>
+            <a:pPr lvl="1"/>
+            <a:r>
+              <a:rPr/>
+              <a:t>Graph foundatons and Graph Data Science</a:t>
+            </a:r>
+          </a:p>
+          <a:p>
+            <a:pPr lvl="1"/>
+            <a:r>
+              <a:rPr/>
+              <a:t>IoT Edge Computing</a:t>
+            </a:r>
+          </a:p>
+          <a:p>
+            <a:pPr lvl="0" indent="0" marL="0">
+              <a:spcBef>
+                <a:spcPts val="3000"/>
+              </a:spcBef>
+              <a:buNone/>
+            </a:pPr>
+            <a:r>
+              <a:rPr b="1"/>
+              <a:t>Conferences</a:t>
+            </a:r>
+          </a:p>
+          <a:p>
+            <a:pPr lvl="0"/>
+            <a:r>
+              <a:rPr/>
+              <a:t>EDBT/ICDT 2024 Joint Conference</a:t>
+            </a:r>
+          </a:p>
+          <a:p>
+            <a:pPr lvl="0"/>
+            <a:r>
+              <a:rPr/>
+              <a:t>SEBD 2024, 2025</a:t>
+            </a:r>
+          </a:p>
+        </p:txBody>
+      </p:sp>
+      <p:sp>
+        <p:nvSpPr>
+          <p:cNvPr id="4" name="Content Placeholder 3"/>
+          <p:cNvSpPr>
+            <a:spLocks noGrp="1"/>
+          </p:cNvSpPr>
+          <p:nvPr>
+            <p:ph idx="2" sz="half"/>
+          </p:nvPr>
+        </p:nvSpPr>
+        <p:spPr/>
+        <p:txBody>
+          <a:bodyPr/>
+          <a:lstStyle/>
+          <a:p>
+            <a:pPr lvl="0" indent="0" marL="0">
+              <a:spcBef>
+                <a:spcPts val="3000"/>
+              </a:spcBef>
+              <a:buNone/>
+            </a:pPr>
+            <a:r>
+              <a:rPr b="1"/>
+              <a:t>External activities</a:t>
+            </a:r>
+          </a:p>
+          <a:p>
+            <a:pPr lvl="0"/>
+            <a:r>
+              <a:rPr/>
+              <a:t>Teaching Relational Database, 30 hrs, ITS Olivetti (2023/2024)</a:t>
+            </a:r>
+          </a:p>
+          <a:p>
+            <a:pPr lvl="0"/>
+            <a:r>
+              <a:rPr/>
+              <a:t>Teaching NoSQL Database, 30 hrs, ITS Olivetti (2024/2025)</a:t>
+            </a:r>
+          </a:p>
+          <a:p>
+            <a:pPr lvl="0"/>
+            <a:r>
+              <a:rPr/>
+              <a:t>Teaching NoSQL Database, 30 hrs, ITS Olivetti (2025/2026)</a:t>
+            </a:r>
+          </a:p>
+          <a:p>
+            <a:pPr lvl="0"/>
+            <a:r>
+              <a:rPr/>
+              <a:t>Consultancy on Digitalization in Precision Agriculture, iFarming s.r.l.</a:t>
+            </a:r>
+          </a:p>
+          <a:p>
+            <a:pPr lvl="0" indent="0" marL="0">
+              <a:spcBef>
+                <a:spcPts val="3000"/>
+              </a:spcBef>
+              <a:buNone/>
+            </a:pPr>
+            <a:r>
+              <a:rPr b="1"/>
+              <a:t>Bachelor Thesis advisor</a:t>
+            </a:r>
+          </a:p>
+          <a:p>
+            <a:pPr lvl="0"/>
+            <a:r>
+              <a:rPr/>
+              <a:t>Denis Nikaj (Progettazione e prototipazione di un’applicazione web per l’irrigazione di precisione), March 2024.</a:t>
+            </a:r>
+          </a:p>
+          <a:p>
+            <a:pPr lvl="0"/>
+            <a:r>
+              <a:rPr/>
+              <a:t>Davide Speziali (Progettazione e realizzazione di un simulatore per l’irrigazione di precisione), December 2024.</a:t>
+            </a:r>
+          </a:p>
+          <a:p>
+            <a:pPr lvl="0"/>
+            <a:r>
+              <a:rPr/>
+              <a:t>Federico Capponi (Progettazione e prototipazione di un sistema di irrigazione di precisione), July 2025.</a:t>
+            </a:r>
+          </a:p>
+        </p:txBody>
+      </p:sp>
+    </p:spTree>
+  </p:cSld>
+</p:sld>
+</file>
+
+<file path=ppt/slides/slide15.xml><?xml version="1.0" encoding="utf-8"?>
+<p:sld xmlns:a="http://schemas.openxmlformats.org/drawingml/2006/main" xmlns:r="http://schemas.openxmlformats.org/officeDocument/2006/relationships" xmlns:p="http://schemas.openxmlformats.org/presentationml/2006/main">
+  <p:cSld>
+    <p:spTree>
+      <p:nvGrpSpPr>
+        <p:cNvPr id="1" name=""/>
+        <p:cNvGrpSpPr/>
+        <p:nvPr/>
+      </p:nvGrpSpPr>
+      <p:grpSpPr>
+        <a:xfrm>
+          <a:off x="0" y="0"/>
+          <a:ext cx="0" cy="0"/>
+          <a:chOff x="0" y="0"/>
+          <a:chExt cx="0" cy="0"/>
+        </a:xfrm>
+      </p:grpSpPr>
+      <p:sp>
+        <p:nvSpPr>
+          <p:cNvPr id="3" name="Content Placeholder 2"/>
+          <p:cNvSpPr>
+            <a:spLocks noGrp="1"/>
+          </p:cNvSpPr>
+          <p:nvPr>
+            <p:ph idx="1"/>
+          </p:nvPr>
+        </p:nvSpPr>
+        <p:spPr/>
+        <p:txBody>
+          <a:bodyPr/>
+          <a:lstStyle/>
+          <a:p>
+            <a:pPr lvl="0"/>
+            <a:r>
+              <a:rPr/>
+              <a:t>Manca titolo e info miei</a:t>
+            </a:r>
+          </a:p>
+          <a:p>
+            <a:pPr lvl="0"/>
+            <a:r>
+              <a:rPr/>
+              <a:t>Cambia slide 1, fai focus su altra roba</a:t>
+            </a:r>
+          </a:p>
+          <a:p>
+            <a:pPr lvl="0"/>
+            <a:r>
+              <a:rPr/>
+              <a:t>Three year ongoing project</a:t>
+            </a:r>
+          </a:p>
+          <a:p>
+            <a:pPr lvl="0"/>
+            <a:r>
+              <a:rPr/>
+              <a:t>Ongoing or future works</a:t>
+            </a:r>
+          </a:p>
+          <a:p>
+            <a:pPr lvl="0"/>
+            <a:r>
+              <a:rPr/>
+              <a:t>Aggiungi metamodello</a:t>
+            </a:r>
+          </a:p>
+          <a:p>
+            <a:pPr lvl="0"/>
+            <a:r>
+              <a:rPr/>
+              <a:t>SU DT il modello dati è tailored, application based</a:t>
+            </a:r>
+          </a:p>
+          <a:p>
+            <a:pPr lvl="0"/>
+            <a:r>
+              <a:rPr/>
+              <a:t>per muoverci più in alto, dobbiamo muoverci verso domain, e.g. piattaforma precision agriculture.</a:t>
+            </a:r>
+          </a:p>
+          <a:p>
+            <a:pPr lvl="0"/>
+            <a:r>
+              <a:rPr/>
+              <a:t>Poi metamodello, un caso possibile è quello.</a:t>
+            </a:r>
+          </a:p>
+        </p:txBody>
+      </p:sp>
+    </p:spTree>
+  </p:cSld>
+</p:sld>
+</file>
+
+<file path=ppt/slides/slide2.xml><?xml version="1.0" encoding="utf-8"?>
+<p:sld xmlns:a="http://schemas.openxmlformats.org/drawingml/2006/main" xmlns:r="http://schemas.openxmlformats.org/officeDocument/2006/relationships" xmlns:p="http://schemas.openxmlformats.org/presentationml/2006/main">
+  <p:cSld>
+    <p:spTree>
+      <p:nvGrpSpPr>
+        <p:cNvPr id="1" name=""/>
+        <p:cNvGrpSpPr/>
+        <p:nvPr/>
+      </p:nvGrpSpPr>
+      <p:grpSpPr>
+        <a:xfrm>
+          <a:off x="0" y="0"/>
+          <a:ext cx="0" cy="0"/>
+          <a:chOff x="0" y="0"/>
+          <a:chExt cx="0" cy="0"/>
+        </a:xfrm>
+      </p:grpSpPr>
+      <p:pic>
+        <p:nvPicPr>
+          <p:cNvPr descr="https://github.com/ManuelePasini/slides-markdown/blob/master/slides/images/dt/twin_model_shadow.png?raw=true" id="0" name="Picture 1"/>
+          <p:cNvPicPr>
+            <a:picLocks noGrp="1" noChangeAspect="1"/>
+          </p:cNvPicPr>
+          <p:nvPr/>
+        </p:nvPicPr>
+        <p:blipFill>
+          <a:blip r:embed="rId2"/>
+          <a:stretch>
+            <a:fillRect/>
+          </a:stretch>
+        </p:blipFill>
+        <p:spPr bwMode="auto">
+          <a:xfrm>
+            <a:off x="457200" y="1511300"/>
+            <a:ext cx="4038600" cy="2235200"/>
+          </a:xfrm>
+          <a:prstGeom prst="rect">
+            <a:avLst/>
+          </a:prstGeom>
+          <a:noFill/>
+          <a:ln w="9525">
+            <a:noFill/>
+            <a:headEnd/>
+            <a:tailEnd/>
+          </a:ln>
+        </p:spPr>
+      </p:pic>
+      <p:sp>
+        <p:nvSpPr>
+          <p:cNvPr id="1" name="TextBox 3"/>
+          <p:cNvSpPr txBox="1"/>
+          <p:nvPr/>
+        </p:nvSpPr>
+        <p:spPr>
+          <a:xfrm>
+            <a:off x="457200" y="4076700"/>
+            <a:ext cx="4038600" cy="508000"/>
+          </a:xfrm>
+          <a:prstGeom prst="rect">
+            <a:avLst/>
+          </a:prstGeom>
+          <a:noFill/>
+        </p:spPr>
+        <p:txBody>
+          <a:bodyPr/>
+          <a:lstStyle/>
+          <a:p>
+            <a:pPr lvl="0" indent="0" marL="0" algn="ctr">
+              <a:buNone/>
+            </a:pPr>
+            <a:r>
+              <a:rPr/>
+              <a:t>Differences between twins</a:t>
+            </a:r>
+          </a:p>
+        </p:txBody>
+      </p:sp>
+      <p:pic>
+        <p:nvPicPr>
+          <p:cNvPr descr="https://github.com/ManuelePasini/slides-markdown/blob/master/slides/images/dt/dt.png?raw=true" id="0" name="Picture 1"/>
+          <p:cNvPicPr>
+            <a:picLocks noGrp="1" noChangeAspect="1"/>
+          </p:cNvPicPr>
+          <p:nvPr/>
+        </p:nvPicPr>
+        <p:blipFill>
+          <a:blip r:embed="rId3"/>
+          <a:stretch>
+            <a:fillRect/>
+          </a:stretch>
+        </p:blipFill>
+        <p:spPr bwMode="auto">
+          <a:xfrm>
+            <a:off x="4648200" y="1422400"/>
+            <a:ext cx="4038600" cy="2438400"/>
+          </a:xfrm>
+          <a:prstGeom prst="rect">
+            <a:avLst/>
+          </a:prstGeom>
+          <a:noFill/>
+          <a:ln w="9525">
+            <a:noFill/>
+            <a:headEnd/>
+            <a:tailEnd/>
+          </a:ln>
+        </p:spPr>
+      </p:pic>
+      <p:sp>
+        <p:nvSpPr>
+          <p:cNvPr id="1" name="TextBox 3"/>
+          <p:cNvSpPr txBox="1"/>
+          <p:nvPr/>
+        </p:nvSpPr>
+        <p:spPr>
+          <a:xfrm>
+            <a:off x="4648200" y="4076700"/>
+            <a:ext cx="4038600" cy="508000"/>
+          </a:xfrm>
+          <a:prstGeom prst="rect">
+            <a:avLst/>
+          </a:prstGeom>
+          <a:noFill/>
+        </p:spPr>
+        <p:txBody>
+          <a:bodyPr/>
+          <a:lstStyle/>
+          <a:p>
+            <a:pPr lvl="0" indent="0" marL="0" algn="ctr">
+              <a:buNone/>
+            </a:pPr>
+            <a:r>
+              <a:rPr/>
+              <a:t>DT components</a:t>
+            </a:r>
+          </a:p>
+        </p:txBody>
+      </p:sp>
+    </p:spTree>
+  </p:cSld>
+</p:sld>
+</file>
+
+<file path=ppt/slides/slide3.xml><?xml version="1.0" encoding="utf-8"?>
+<p:sld xmlns:a="http://schemas.openxmlformats.org/drawingml/2006/main" xmlns:r="http://schemas.openxmlformats.org/officeDocument/2006/relationships" xmlns:p="http://schemas.openxmlformats.org/presentationml/2006/main">
+  <p:cSld>
+    <p:spTree>
+      <p:nvGrpSpPr>
+        <p:cNvPr id="1" name=""/>
+        <p:cNvGrpSpPr/>
+        <p:nvPr/>
+      </p:nvGrpSpPr>
+      <p:grpSpPr>
+        <a:xfrm>
+          <a:off x="0" y="0"/>
+          <a:ext cx="0" cy="0"/>
+          <a:chOff x="0" y="0"/>
+          <a:chExt cx="0" cy="0"/>
+        </a:xfrm>
+      </p:grpSpPr>
+      <p:sp>
+        <p:nvSpPr>
+          <p:cNvPr id="3" name="Content Placeholder 2"/>
+          <p:cNvSpPr>
+            <a:spLocks noGrp="1"/>
+          </p:cNvSpPr>
+          <p:nvPr>
+            <p:ph idx="1"/>
+          </p:nvPr>
+        </p:nvSpPr>
+        <p:spPr/>
+        <p:txBody>
+          <a:bodyPr/>
+          <a:lstStyle/>
+          <a:p>
+            <a:pPr lvl="0" indent="0" marL="0">
+              <a:spcBef>
+                <a:spcPts val="3000"/>
+              </a:spcBef>
+              <a:buNone/>
+            </a:pPr>
+            <a:r>
+              <a:rPr b="1"/>
+              <a:t>Introduction to Digital Twins</a:t>
+            </a:r>
+          </a:p>
+          <a:p>
+            <a:pPr lvl="0"/>
+            <a:r>
+              <a:rPr/>
+              <a:t>The role of data as a core component of Digital Twins is increasingly recognized…</a:t>
+            </a:r>
+          </a:p>
+          <a:p>
+            <a:pPr lvl="0"/>
+            <a:r>
+              <a:rPr/>
+              <a:t>… yet it is often overlooked in research contributions.</a:t>
+            </a:r>
+          </a:p>
+          <a:p>
+            <a:pPr lvl="0"/>
+            <a:r>
+              <a:rPr/>
+              <a:t>Some reference models are emerging (e.g., Fei Tao, Univ. of Beijing).</a:t>
+            </a:r>
+          </a:p>
+        </p:txBody>
+      </p:sp>
+    </p:spTree>
+  </p:cSld>
+</p:sld>
+</file>
+
+<file path=ppt/slides/slide4.xml><?xml version="1.0" encoding="utf-8"?>
+<p:sld xmlns:a="http://schemas.openxmlformats.org/drawingml/2006/main" xmlns:r="http://schemas.openxmlformats.org/officeDocument/2006/relationships" xmlns:p="http://schemas.openxmlformats.org/presentationml/2006/main">
+  <p:cSld>
+    <p:spTree>
+      <p:nvGrpSpPr>
+        <p:cNvPr id="1" name=""/>
+        <p:cNvGrpSpPr/>
+        <p:nvPr/>
+      </p:nvGrpSpPr>
+      <p:grpSpPr>
+        <a:xfrm>
+          <a:off x="0" y="0"/>
+          <a:ext cx="0" cy="0"/>
+          <a:chOff x="0" y="0"/>
+          <a:chExt cx="0" cy="0"/>
+        </a:xfrm>
+      </p:grpSpPr>
+      <p:pic>
+        <p:nvPicPr>
+          <p:cNvPr descr="https://github.com/ManuelePasini/slides-markdown/blob/master/slides/images/dt/5dim.png?raw=true" id="0" name="Picture 1"/>
+          <p:cNvPicPr>
+            <a:picLocks noGrp="1" noChangeAspect="1"/>
+          </p:cNvPicPr>
+          <p:nvPr/>
+        </p:nvPicPr>
+        <p:blipFill>
+          <a:blip r:embed="rId2"/>
+          <a:stretch>
+            <a:fillRect/>
+          </a:stretch>
+        </p:blipFill>
+        <p:spPr bwMode="auto">
+          <a:xfrm>
+            <a:off x="457200" y="1435100"/>
+            <a:ext cx="4038600" cy="2413000"/>
+          </a:xfrm>
+          <a:prstGeom prst="rect">
+            <a:avLst/>
+          </a:prstGeom>
+          <a:noFill/>
+          <a:ln w="9525">
+            <a:noFill/>
+            <a:headEnd/>
+            <a:tailEnd/>
+          </a:ln>
+        </p:spPr>
+      </p:pic>
+      <p:sp>
+        <p:nvSpPr>
+          <p:cNvPr id="1" name="TextBox 3"/>
+          <p:cNvSpPr txBox="1"/>
+          <p:nvPr/>
+        </p:nvSpPr>
+        <p:spPr>
+          <a:xfrm>
+            <a:off x="457200" y="4076700"/>
+            <a:ext cx="4038600" cy="508000"/>
+          </a:xfrm>
+          <a:prstGeom prst="rect">
+            <a:avLst/>
+          </a:prstGeom>
+          <a:noFill/>
+        </p:spPr>
+        <p:txBody>
+          <a:bodyPr/>
+          <a:lstStyle/>
+          <a:p>
+            <a:pPr lvl="0" indent="0" marL="0" algn="ctr">
+              <a:buNone/>
+            </a:pPr>
+            <a:r>
+              <a:rPr/>
+              <a:t>5-Dimensional DT (Fei, Tao 2020)</a:t>
+            </a:r>
+          </a:p>
+        </p:txBody>
+      </p:sp>
+      <p:sp>
+        <p:nvSpPr>
+          <p:cNvPr id="4" name="Content Placeholder 3"/>
+          <p:cNvSpPr>
+            <a:spLocks noGrp="1"/>
+          </p:cNvSpPr>
+          <p:nvPr>
+            <p:ph idx="2" sz="half"/>
+          </p:nvPr>
+        </p:nvSpPr>
+        <p:spPr/>
+        <p:txBody>
+          <a:bodyPr/>
+          <a:lstStyle/>
+          <a:p>
+            <a:pPr lvl="0"/>
+            <a:r>
+              <a:rPr/>
+              <a:t>However…</a:t>
+            </a:r>
+          </a:p>
+          <a:p>
+            <a:pPr lvl="1"/>
+            <a:r>
+              <a:rPr/>
+              <a:t>Each solution develops its own data model and storage system;</a:t>
+            </a:r>
+          </a:p>
+          <a:p>
+            <a:pPr lvl="1"/>
+            <a:r>
+              <a:rPr/>
+              <a:t>No interoperability between DTs, even when relying on the same data;</a:t>
+            </a:r>
+          </a:p>
+          <a:p>
+            <a:pPr lvl="1"/>
+            <a:r>
+              <a:rPr/>
+              <a:t>Capabilities of DTs are thus limited;</a:t>
+            </a:r>
+          </a:p>
+          <a:p>
+            <a:pPr lvl="1"/>
+            <a:r>
+              <a:rPr b="1"/>
+              <a:t>A standardization effort is required to foster integration.</a:t>
+            </a:r>
+          </a:p>
+          <a:p>
+            <a:pPr lvl="1"/>
+            <a:r>
+              <a:rPr b="1"/>
+              <a:t>Standardization should begin at the data layer</a:t>
+            </a:r>
+          </a:p>
+        </p:txBody>
+      </p:sp>
+    </p:spTree>
+  </p:cSld>
+</p:sld>
+</file>
+
+<file path=ppt/slides/slide5.xml><?xml version="1.0" encoding="utf-8"?>
+<p:sld xmlns:a="http://schemas.openxmlformats.org/drawingml/2006/main" xmlns:r="http://schemas.openxmlformats.org/officeDocument/2006/relationships" xmlns:p="http://schemas.openxmlformats.org/presentationml/2006/main">
+  <p:cSld>
+    <p:spTree>
+      <p:nvGrpSpPr>
+        <p:cNvPr id="1" name=""/>
+        <p:cNvGrpSpPr/>
+        <p:nvPr/>
+      </p:nvGrpSpPr>
+      <p:grpSpPr>
+        <a:xfrm>
+          <a:off x="0" y="0"/>
+          <a:ext cx="0" cy="0"/>
+          <a:chOff x="0" y="0"/>
+          <a:chExt cx="0" cy="0"/>
+        </a:xfrm>
+      </p:grpSpPr>
+      <p:sp>
+        <p:nvSpPr>
+          <p:cNvPr id="3" name="Content Placeholder 2"/>
+          <p:cNvSpPr>
+            <a:spLocks noGrp="1"/>
+          </p:cNvSpPr>
+          <p:nvPr>
+            <p:ph idx="1"/>
+          </p:nvPr>
+        </p:nvSpPr>
+        <p:spPr/>
+        <p:txBody>
+          <a:bodyPr/>
+          <a:lstStyle/>
+          <a:p>
+            <a:pPr lvl="0" indent="0" marL="0">
+              <a:spcBef>
+                <a:spcPts val="3000"/>
+              </a:spcBef>
+              <a:buNone/>
+            </a:pPr>
+            <a:r>
+              <a:rPr b="1"/>
+              <a:t>A Digital Twin for Precision Agriculture</a:t>
+            </a:r>
+          </a:p>
+          <a:p>
+            <a:pPr lvl="0"/>
+            <a:r>
+              <a:rPr/>
+              <a:t>Five year ongoing project (within PNRR - </a:t>
+            </a:r>
+            <a:r>
+              <a:rPr>
+                <a:hlinkClick r:id="rId2"/>
+              </a:rPr>
+              <a:t>Agritech</a:t>
+            </a:r>
+            <a:r>
+              <a:rPr/>
+              <a:t> Spoke 9) on precision irrigation of fruit orchards</a:t>
+            </a:r>
+          </a:p>
+          <a:p>
+            <a:pPr lvl="0"/>
+            <a:r>
+              <a:rPr/>
+              <a:t>Demo available at </a:t>
+            </a:r>
+            <a:r>
+              <a:rPr>
+                <a:hlinkClick r:id="rId3"/>
+              </a:rPr>
+              <a:t>this link</a:t>
+            </a:r>
+          </a:p>
+          <a:p>
+            <a:pPr lvl="0"/>
+            <a:r>
+              <a:rPr/>
+              <a:t>Paper submitted to </a:t>
+            </a:r>
+            <a:r>
+              <a:rPr>
+                <a:hlinkClick r:id="rId4"/>
+              </a:rPr>
+              <a:t>Computer and Electronics in Agriculture</a:t>
+            </a:r>
+            <a:r>
+              <a:rPr/>
+              <a:t> (September 2025).</a:t>
+            </a:r>
+          </a:p>
+        </p:txBody>
+      </p:sp>
+    </p:spTree>
+  </p:cSld>
+</p:sld>
+</file>
+
+<file path=ppt/slides/slide6.xml><?xml version="1.0" encoding="utf-8"?>
+<p:sld xmlns:a="http://schemas.openxmlformats.org/drawingml/2006/main" xmlns:r="http://schemas.openxmlformats.org/officeDocument/2006/relationships" xmlns:p="http://schemas.openxmlformats.org/presentationml/2006/main">
+  <p:cSld>
+    <p:spTree>
+      <p:nvGrpSpPr>
+        <p:cNvPr id="1" name=""/>
+        <p:cNvGrpSpPr/>
+        <p:nvPr/>
+      </p:nvGrpSpPr>
+      <p:grpSpPr>
+        <a:xfrm>
+          <a:off x="0" y="0"/>
+          <a:ext cx="0" cy="0"/>
+          <a:chOff x="0" y="0"/>
+          <a:chExt cx="0" cy="0"/>
+        </a:xfrm>
+      </p:grpSpPr>
+      <p:pic>
+        <p:nvPicPr>
+          <p:cNvPr descr="https://github.com/ManuelePasini/slides-markdown/blob/master/slides/images/phd2ndyear/dt_agro.png?raw=true" id="0" name="Picture 1"/>
+          <p:cNvPicPr>
+            <a:picLocks noGrp="1" noChangeAspect="1"/>
+          </p:cNvPicPr>
+          <p:nvPr/>
+        </p:nvPicPr>
+        <p:blipFill>
+          <a:blip r:embed="rId2"/>
+          <a:stretch>
+            <a:fillRect/>
+          </a:stretch>
+        </p:blipFill>
+        <p:spPr bwMode="auto">
+          <a:xfrm>
+            <a:off x="457200" y="1701800"/>
+            <a:ext cx="4038600" cy="1879600"/>
+          </a:xfrm>
+          <a:prstGeom prst="rect">
+            <a:avLst/>
+          </a:prstGeom>
+          <a:noFill/>
+          <a:ln w="9525">
+            <a:noFill/>
+            <a:headEnd/>
+            <a:tailEnd/>
+          </a:ln>
+        </p:spPr>
+      </p:pic>
+      <p:sp>
+        <p:nvSpPr>
+          <p:cNvPr id="1" name="TextBox 3"/>
+          <p:cNvSpPr txBox="1"/>
+          <p:nvPr/>
+        </p:nvSpPr>
+        <p:spPr>
+          <a:xfrm>
+            <a:off x="457200" y="4076700"/>
+            <a:ext cx="4038600" cy="508000"/>
+          </a:xfrm>
+          <a:prstGeom prst="rect">
+            <a:avLst/>
+          </a:prstGeom>
+          <a:noFill/>
+        </p:spPr>
+        <p:txBody>
+          <a:bodyPr/>
+          <a:lstStyle/>
+          <a:p>
+            <a:pPr lvl="0" indent="0" marL="0" algn="ctr">
+              <a:buNone/>
+            </a:pPr>
+            <a:r>
+              <a:rPr/>
+              <a:t>Soil moisture distribution within a monitored plant</a:t>
+            </a:r>
+          </a:p>
+        </p:txBody>
+      </p:sp>
+      <p:pic>
+        <p:nvPicPr>
+          <p:cNvPr descr="https://github.com/ManuelePasini/slides-markdown/blob/master/slides/images/phd2ndyear/action_agro_dt.png?raw=true" id="0" name="Picture 1"/>
+          <p:cNvPicPr>
+            <a:picLocks noGrp="1" noChangeAspect="1"/>
+          </p:cNvPicPr>
+          <p:nvPr/>
+        </p:nvPicPr>
+        <p:blipFill>
+          <a:blip r:embed="rId3"/>
+          <a:stretch>
+            <a:fillRect/>
+          </a:stretch>
+        </p:blipFill>
+        <p:spPr bwMode="auto">
+          <a:xfrm>
+            <a:off x="4648200" y="1270000"/>
+            <a:ext cx="4038600" cy="2730500"/>
+          </a:xfrm>
+          <a:prstGeom prst="rect">
+            <a:avLst/>
+          </a:prstGeom>
+          <a:noFill/>
+          <a:ln w="9525">
+            <a:noFill/>
+            <a:headEnd/>
+            <a:tailEnd/>
+          </a:ln>
+        </p:spPr>
+      </p:pic>
+      <p:sp>
+        <p:nvSpPr>
+          <p:cNvPr id="1" name="TextBox 3"/>
+          <p:cNvSpPr txBox="1"/>
+          <p:nvPr/>
+        </p:nvSpPr>
+        <p:spPr>
+          <a:xfrm>
+            <a:off x="4648200" y="4076700"/>
+            <a:ext cx="4038600" cy="508000"/>
+          </a:xfrm>
+          <a:prstGeom prst="rect">
+            <a:avLst/>
+          </a:prstGeom>
+          <a:noFill/>
+        </p:spPr>
+        <p:txBody>
+          <a:bodyPr/>
+          <a:lstStyle/>
+          <a:p>
+            <a:pPr lvl="0" indent="0" marL="0" algn="ctr">
+              <a:buNone/>
+            </a:pPr>
+            <a:r>
+              <a:rPr/>
+              <a:t>Example of controlling action to the physical entity - applying irrigation</a:t>
+            </a:r>
+          </a:p>
+        </p:txBody>
+      </p:sp>
+    </p:spTree>
+  </p:cSld>
+</p:sld>
+</file>
+
+<file path=ppt/slides/slide7.xml><?xml version="1.0" encoding="utf-8"?>
+<p:sld xmlns:a="http://schemas.openxmlformats.org/drawingml/2006/main" xmlns:r="http://schemas.openxmlformats.org/officeDocument/2006/relationships" xmlns:p="http://schemas.openxmlformats.org/presentationml/2006/main">
+  <p:cSld>
+    <p:spTree>
+      <p:nvGrpSpPr>
+        <p:cNvPr id="1" name=""/>
+        <p:cNvGrpSpPr/>
+        <p:nvPr/>
+      </p:nvGrpSpPr>
+      <p:grpSpPr>
+        <a:xfrm>
+          <a:off x="0" y="0"/>
+          <a:ext cx="0" cy="0"/>
+          <a:chOff x="0" y="0"/>
+          <a:chExt cx="0" cy="0"/>
+        </a:xfrm>
+      </p:grpSpPr>
+      <p:sp>
+        <p:nvSpPr>
+          <p:cNvPr id="3" name="Content Placeholder 2"/>
+          <p:cNvSpPr>
+            <a:spLocks noGrp="1"/>
+          </p:cNvSpPr>
+          <p:nvPr>
+            <p:ph idx="1"/>
+          </p:nvPr>
+        </p:nvSpPr>
+        <p:spPr/>
+        <p:txBody>
+          <a:bodyPr/>
+          <a:lstStyle/>
+          <a:p>
+            <a:pPr lvl="0" indent="0" marL="0">
+              <a:buNone/>
+            </a:pPr>
+            <a:r>
+              <a:rPr b="1"/>
+              <a:t>Ongoing work</a:t>
+            </a:r>
+            <a:r>
+              <a:rPr/>
+              <a:t>: </a:t>
+            </a:r>
+            <a:r>
+              <a:rPr>
+                <a:hlinkClick r:id="rId2"/>
+              </a:rPr>
+              <a:t>ZESPRI</a:t>
+            </a:r>
+            <a:r>
+              <a:rPr/>
+              <a:t>, the world’s largest kiwifruit producer, has decided to undertake large-scale experimental implementation of the system for the 2026 irrigation season.</a:t>
+            </a:r>
+          </a:p>
+          <a:p>
+            <a:pPr lvl="0" indent="0" marL="0">
+              <a:spcBef>
+                <a:spcPts val="3000"/>
+              </a:spcBef>
+              <a:buNone/>
+            </a:pPr>
+            <a:r>
+              <a:rPr b="1"/>
+              <a:t>A Data Platform fostering collaboration between DTs</a:t>
+            </a:r>
+          </a:p>
+          <a:p>
+            <a:pPr lvl="0"/>
+            <a:r>
+              <a:rPr/>
+              <a:t>Within Agritech - Spoke 3, a data platform fostering integration across research projects has been developed.</a:t>
+            </a:r>
+          </a:p>
+          <a:p>
+            <a:pPr lvl="0"/>
+            <a:r>
+              <a:rPr/>
+              <a:t>When defining integration policies and standards, several recurrent data requirements were identified:</a:t>
+            </a:r>
+          </a:p>
+          <a:p>
+            <a:pPr lvl="1"/>
+            <a:r>
+              <a:rPr/>
+              <a:t>Heterogeneous data: from structured to unstructured (including images).</a:t>
+            </a:r>
+          </a:p>
+          <a:p>
+            <a:pPr lvl="1"/>
+            <a:r>
+              <a:rPr/>
+              <a:t>Interconnected data: capturing physical entities together with the IoT networks describing them.</a:t>
+            </a:r>
+          </a:p>
+          <a:p>
+            <a:pPr lvl="1"/>
+            <a:r>
+              <a:rPr/>
+              <a:t>Temporal aspects: datasets often evolve as time series.</a:t>
+            </a:r>
+          </a:p>
+          <a:p>
+            <a:pPr lvl="1"/>
+            <a:r>
+              <a:rPr/>
+              <a:t>Spatial aspects: data are often geo-referenced.</a:t>
+            </a:r>
+          </a:p>
+        </p:txBody>
+      </p:sp>
+    </p:spTree>
+  </p:cSld>
+</p:sld>
+</file>
+
+<file path=ppt/slides/slide8.xml><?xml version="1.0" encoding="utf-8"?>
 <p:sld xmlns:a="http://schemas.openxmlformats.org/drawingml/2006/main" xmlns:r="http://schemas.openxmlformats.org/officeDocument/2006/relationships" xmlns:p="http://schemas.openxmlformats.org/presentationml/2006/main">
   <p:cSld>
     <p:spTree>
@@ -3321,1622 +4860,6 @@
 </p:sld>
 </file>
 
-<file path=ppt/slides/slide11.xml><?xml version="1.0" encoding="utf-8"?>
-<p:sld xmlns:a="http://schemas.openxmlformats.org/drawingml/2006/main" xmlns:r="http://schemas.openxmlformats.org/officeDocument/2006/relationships" xmlns:p="http://schemas.openxmlformats.org/presentationml/2006/main">
-  <p:cSld>
-    <p:spTree>
-      <p:nvGrpSpPr>
-        <p:cNvPr id="1" name=""/>
-        <p:cNvGrpSpPr/>
-        <p:nvPr/>
-      </p:nvGrpSpPr>
-      <p:grpSpPr>
-        <a:xfrm>
-          <a:off x="0" y="0"/>
-          <a:ext cx="0" cy="0"/>
-          <a:chOff x="0" y="0"/>
-          <a:chExt cx="0" cy="0"/>
-        </a:xfrm>
-      </p:grpSpPr>
-      <p:sp>
-        <p:nvSpPr>
-          <p:cNvPr id="2" name="Title 1"/>
-          <p:cNvSpPr>
-            <a:spLocks noGrp="1"/>
-          </p:cNvSpPr>
-          <p:nvPr>
-            <p:ph type="title"/>
-          </p:nvPr>
-        </p:nvSpPr>
-        <p:spPr/>
-        <p:txBody>
-          <a:bodyPr/>
-          <a:lstStyle/>
-          <a:p>
-            <a:pPr lvl="0" indent="0" marL="0">
-              <a:buNone/>
-            </a:pPr>
-            <a:r>
-              <a:rPr/>
-              <a:t>From application-oriented to domain-oriented</a:t>
-            </a:r>
-          </a:p>
-        </p:txBody>
-      </p:sp>
-      <p:sp>
-        <p:nvSpPr>
-          <p:cNvPr id="3" name="Content Placeholder 2"/>
-          <p:cNvSpPr>
-            <a:spLocks noGrp="1"/>
-          </p:cNvSpPr>
-          <p:nvPr>
-            <p:ph idx="1"/>
-          </p:nvPr>
-        </p:nvSpPr>
-        <p:spPr/>
-        <p:txBody>
-          <a:bodyPr/>
-          <a:lstStyle/>
-          <a:p>
-            <a:pPr lvl="0"/>
-            <a:r>
-              <a:rPr b="1"/>
-              <a:t>Research Question 1.</a:t>
-            </a:r>
-            <a:r>
-              <a:rPr/>
-              <a:t>: Can we move from application-level DT platforms to domain-level platforms?</a:t>
-            </a:r>
-          </a:p>
-          <a:p>
-            <a:pPr lvl="0" indent="0" marL="0">
-              <a:buNone/>
-            </a:pPr>
-            <a:r>
-              <a:rPr/>
-              <a:t>Takeaway: a DT can be represented as a data pipeline that collects, processes, and exploits data.</a:t>
-            </a:r>
-          </a:p>
-          <a:p>
-            <a:pPr lvl="0"/>
-            <a:r>
-              <a:rPr b="1"/>
-              <a:t>Research question 2.</a:t>
-            </a:r>
-            <a:r>
-              <a:rPr/>
-              <a:t>: given a data pipeline, can we identify the set of data platform services required to support it?</a:t>
-            </a:r>
-          </a:p>
-          <a:p>
-            <a:pPr lvl="0" indent="0" marL="0">
-              <a:buNone/>
-            </a:pPr>
-            <a:r>
-              <a:rPr/>
-              <a:t>References:</a:t>
-            </a:r>
-          </a:p>
-          <a:p>
-            <a:pPr lvl="0" indent="0" marL="0">
-              <a:buNone/>
-            </a:pPr>
-            <a:r>
-              <a:rPr/>
-              <a:t>Matteo Francia, Matteo Golfarelli, Manuele Pasini — Towards a Process-Driven Design of Data Platforms. In DOLAP, pp. 28–35, 2024.</a:t>
-            </a:r>
-          </a:p>
-          <a:p>
-            <a:pPr lvl="0" indent="0" marL="0">
-              <a:buNone/>
-            </a:pPr>
-            <a:r>
-              <a:rPr/>
-              <a:t>Matteo Francia, Matteo Golfarelli, Manuele Pasini — Process-Driven Design of Cloud Data Platforms. Information Systems Journal, Manuscript No. INFOSYS-D-24-00444.</a:t>
-            </a:r>
-          </a:p>
-          <a:p>
-            <a:pPr lvl="0"/>
-            <a:r>
-              <a:rPr/>
-              <a:t>But an issue emerged: pipelines of different DTs entail different data models &amp; storage systems, yet they share some of the same recurrent requirements….</a:t>
-            </a:r>
-          </a:p>
-        </p:txBody>
-      </p:sp>
-    </p:spTree>
-  </p:cSld>
-</p:sld>
-</file>
-
-<file path=ppt/slides/slide12.xml><?xml version="1.0" encoding="utf-8"?>
-<p:sld xmlns:a="http://schemas.openxmlformats.org/drawingml/2006/main" xmlns:r="http://schemas.openxmlformats.org/officeDocument/2006/relationships" xmlns:p="http://schemas.openxmlformats.org/presentationml/2006/main">
-  <p:cSld>
-    <p:spTree>
-      <p:nvGrpSpPr>
-        <p:cNvPr id="1" name=""/>
-        <p:cNvGrpSpPr/>
-        <p:nvPr/>
-      </p:nvGrpSpPr>
-      <p:grpSpPr>
-        <a:xfrm>
-          <a:off x="0" y="0"/>
-          <a:ext cx="0" cy="0"/>
-          <a:chOff x="0" y="0"/>
-          <a:chExt cx="0" cy="0"/>
-        </a:xfrm>
-      </p:grpSpPr>
-      <p:sp>
-        <p:nvSpPr>
-          <p:cNvPr id="2" name="Title 1"/>
-          <p:cNvSpPr>
-            <a:spLocks noGrp="1"/>
-          </p:cNvSpPr>
-          <p:nvPr>
-            <p:ph type="title"/>
-          </p:nvPr>
-        </p:nvSpPr>
-        <p:spPr/>
-        <p:txBody>
-          <a:bodyPr/>
-          <a:lstStyle/>
-          <a:p>
-            <a:pPr lvl="0" indent="0" marL="0">
-              <a:buNone/>
-            </a:pPr>
-            <a:r>
-              <a:rPr/>
-              <a:t>Modelling Digital Twin Data</a:t>
-            </a:r>
-          </a:p>
-        </p:txBody>
-      </p:sp>
-      <p:sp>
-        <p:nvSpPr>
-          <p:cNvPr id="3" name="Content Placeholder 2"/>
-          <p:cNvSpPr>
-            <a:spLocks noGrp="1"/>
-          </p:cNvSpPr>
-          <p:nvPr>
-            <p:ph idx="1" sz="half"/>
-          </p:nvPr>
-        </p:nvSpPr>
-        <p:spPr/>
-        <p:txBody>
-          <a:bodyPr/>
-          <a:lstStyle/>
-          <a:p>
-            <a:pPr lvl="0"/>
-            <a:r>
-              <a:rPr/>
-              <a:t>DT data involve highly interconnected entitieS (e.g., a fruit tree and the IoT network describing it), suggesting the use of graph data layout for efficient storage and querying…</a:t>
-            </a:r>
-          </a:p>
-          <a:p>
-            <a:pPr lvl="1"/>
-            <a:r>
-              <a:rPr/>
-              <a:t>… yet, they struggle with such volume of data</a:t>
-            </a:r>
-          </a:p>
-          <a:p>
-            <a:pPr lvl="0"/>
-            <a:r>
-              <a:rPr/>
-              <a:t>Time-Series storage systems efficiently manage large volumes of temporal data…</a:t>
-            </a:r>
-          </a:p>
-          <a:p>
-            <a:pPr lvl="1"/>
-            <a:r>
-              <a:rPr/>
-              <a:t>… but fall short in capturing the complex inter-entity dynamics.</a:t>
-            </a:r>
-          </a:p>
-          <a:p>
-            <a:pPr lvl="0"/>
-            <a:r>
-              <a:rPr/>
-              <a:t>Even the Data Platform Design methodology suggested different architectures tailored to each DT…</a:t>
-            </a:r>
-          </a:p>
-          <a:p>
-            <a:pPr lvl="0"/>
-            <a:r>
-              <a:rPr/>
-              <a:t>Yet, no multi-store solution has yet achieved broad adoption in the literature.</a:t>
-            </a:r>
-          </a:p>
-          <a:p>
-            <a:pPr lvl="0"/>
-            <a:r>
-              <a:rPr b="1"/>
-              <a:t>What about an hybrid data structure?</a:t>
-            </a:r>
-          </a:p>
-        </p:txBody>
-      </p:sp>
-      <p:pic>
-        <p:nvPicPr>
-          <p:cNvPr descr="https://github.com/ManuelePasini/slides-markdown/blob/master/slides/images/phd2ndyear/agrigraph.png?raw=true" id="0" name="Picture 1"/>
-          <p:cNvPicPr>
-            <a:picLocks noGrp="1" noChangeAspect="1"/>
-          </p:cNvPicPr>
-          <p:nvPr/>
-        </p:nvPicPr>
-        <p:blipFill>
-          <a:blip r:embed="rId2"/>
-          <a:stretch>
-            <a:fillRect/>
-          </a:stretch>
-        </p:blipFill>
-        <p:spPr bwMode="auto">
-          <a:xfrm>
-            <a:off x="4699000" y="1193800"/>
-            <a:ext cx="3924300" cy="2882900"/>
-          </a:xfrm>
-          <a:prstGeom prst="rect">
-            <a:avLst/>
-          </a:prstGeom>
-          <a:noFill/>
-          <a:ln w="9525">
-            <a:noFill/>
-            <a:headEnd/>
-            <a:tailEnd/>
-          </a:ln>
-        </p:spPr>
-      </p:pic>
-      <p:sp>
-        <p:nvSpPr>
-          <p:cNvPr id="1" name="TextBox 3"/>
-          <p:cNvSpPr txBox="1"/>
-          <p:nvPr/>
-        </p:nvSpPr>
-        <p:spPr>
-          <a:xfrm>
-            <a:off x="4648200" y="4076700"/>
-            <a:ext cx="4038600" cy="508000"/>
-          </a:xfrm>
-          <a:prstGeom prst="rect">
-            <a:avLst/>
-          </a:prstGeom>
-          <a:noFill/>
-        </p:spPr>
-        <p:txBody>
-          <a:bodyPr/>
-          <a:lstStyle/>
-          <a:p>
-            <a:pPr lvl="0" indent="0" marL="0" algn="ctr">
-              <a:buNone/>
-            </a:pPr>
-            <a:r>
-              <a:rPr/>
-              <a:t>Graph representation of Precision Irrigation DT</a:t>
-            </a:r>
-          </a:p>
-        </p:txBody>
-      </p:sp>
-      <p:pic>
-        <p:nvPicPr>
-          <p:cNvPr descr="https://raw.githubusercontent.com/ManuelePasini/slides-markdown/refs/heads/master/slides/images/phd2ndyear/agrits.svg" id="0" name="Picture 1"/>
-          <p:cNvPicPr>
-            <a:picLocks noGrp="1" noChangeAspect="1"/>
-          </p:cNvPicPr>
-          <p:nvPr/>
-        </p:nvPicPr>
-        <p:blipFill>
-          <a:blip r:embed="rId3"/>
-          <a:stretch>
-            <a:fillRect/>
-          </a:stretch>
-        </p:blipFill>
-        <p:spPr bwMode="auto">
-          <a:xfrm>
-            <a:off x="4648200" y="2019300"/>
-            <a:ext cx="4038600" cy="1231900"/>
-          </a:xfrm>
-          <a:prstGeom prst="rect">
-            <a:avLst/>
-          </a:prstGeom>
-          <a:noFill/>
-          <a:ln w="9525">
-            <a:noFill/>
-            <a:headEnd/>
-            <a:tailEnd/>
-          </a:ln>
-        </p:spPr>
-      </p:pic>
-      <p:sp>
-        <p:nvSpPr>
-          <p:cNvPr id="1" name="TextBox 3"/>
-          <p:cNvSpPr txBox="1"/>
-          <p:nvPr/>
-        </p:nvSpPr>
-        <p:spPr>
-          <a:xfrm>
-            <a:off x="4648200" y="4076700"/>
-            <a:ext cx="4038600" cy="508000"/>
-          </a:xfrm>
-          <a:prstGeom prst="rect">
-            <a:avLst/>
-          </a:prstGeom>
-          <a:noFill/>
-        </p:spPr>
-        <p:txBody>
-          <a:bodyPr/>
-          <a:lstStyle/>
-          <a:p>
-            <a:pPr lvl="0" indent="0" marL="0" algn="ctr">
-              <a:buNone/>
-            </a:pPr>
-            <a:r>
-              <a:rPr/>
-              <a:t>Time-Series representation of Precision Irrigation DT</a:t>
-            </a:r>
-          </a:p>
-        </p:txBody>
-      </p:sp>
-    </p:spTree>
-  </p:cSld>
-</p:sld>
-</file>
-
-<file path=ppt/slides/slide13.xml><?xml version="1.0" encoding="utf-8"?>
-<p:sld xmlns:a="http://schemas.openxmlformats.org/drawingml/2006/main" xmlns:r="http://schemas.openxmlformats.org/officeDocument/2006/relationships" xmlns:p="http://schemas.openxmlformats.org/presentationml/2006/main">
-  <p:cSld>
-    <p:spTree>
-      <p:nvGrpSpPr>
-        <p:cNvPr id="1" name=""/>
-        <p:cNvGrpSpPr/>
-        <p:nvPr/>
-      </p:nvGrpSpPr>
-      <p:grpSpPr>
-        <a:xfrm>
-          <a:off x="0" y="0"/>
-          <a:ext cx="0" cy="0"/>
-          <a:chOff x="0" y="0"/>
-          <a:chExt cx="0" cy="0"/>
-        </a:xfrm>
-      </p:grpSpPr>
-      <p:sp>
-        <p:nvSpPr>
-          <p:cNvPr id="2" name="Title 1"/>
-          <p:cNvSpPr>
-            <a:spLocks noGrp="1"/>
-          </p:cNvSpPr>
-          <p:nvPr>
-            <p:ph type="title"/>
-          </p:nvPr>
-        </p:nvSpPr>
-        <p:spPr/>
-        <p:txBody>
-          <a:bodyPr/>
-          <a:lstStyle/>
-          <a:p>
-            <a:pPr lvl="0" indent="0" marL="0">
-              <a:buNone/>
-            </a:pPr>
-            <a:r>
-              <a:rPr/>
-              <a:t>An Hybryd data structure enabling Digital Twin Data</a:t>
-            </a:r>
-          </a:p>
-        </p:txBody>
-      </p:sp>
-      <p:sp>
-        <p:nvSpPr>
-          <p:cNvPr id="3" name="Content Placeholder 2"/>
-          <p:cNvSpPr>
-            <a:spLocks noGrp="1"/>
-          </p:cNvSpPr>
-          <p:nvPr>
-            <p:ph idx="1"/>
-          </p:nvPr>
-        </p:nvSpPr>
-        <p:spPr/>
-        <p:txBody>
-          <a:bodyPr/>
-          <a:lstStyle/>
-          <a:p>
-            <a:pPr lvl="0"/>
-            <a:r>
-              <a:rPr/>
-              <a:t>Combining the strength of Graph and Time-Series data layouts with a novel, hybrid data structure.</a:t>
-            </a:r>
-          </a:p>
-        </p:txBody>
-      </p:sp>
-    </p:spTree>
-  </p:cSld>
-</p:sld>
-</file>
-
-<file path=ppt/slides/slide14.xml><?xml version="1.0" encoding="utf-8"?>
-<p:sld xmlns:a="http://schemas.openxmlformats.org/drawingml/2006/main" xmlns:r="http://schemas.openxmlformats.org/officeDocument/2006/relationships" xmlns:p="http://schemas.openxmlformats.org/presentationml/2006/main">
-  <p:cSld>
-    <p:spTree>
-      <p:nvGrpSpPr>
-        <p:cNvPr id="1" name=""/>
-        <p:cNvGrpSpPr/>
-        <p:nvPr/>
-      </p:nvGrpSpPr>
-      <p:grpSpPr>
-        <a:xfrm>
-          <a:off x="0" y="0"/>
-          <a:ext cx="0" cy="0"/>
-          <a:chOff x="0" y="0"/>
-          <a:chExt cx="0" cy="0"/>
-        </a:xfrm>
-      </p:grpSpPr>
-      <p:pic>
-        <p:nvPicPr>
-          <p:cNvPr descr="https://raw.githubusercontent.com/ManuelePasini/slides-markdown/refs/heads/master/slides/images/ioanninaSlides/dt_graph.svg" id="0" name="Picture 1"/>
-          <p:cNvPicPr>
-            <a:picLocks noGrp="1" noChangeAspect="1"/>
-          </p:cNvPicPr>
-          <p:nvPr/>
-        </p:nvPicPr>
-        <p:blipFill>
-          <a:blip r:embed="rId2"/>
-          <a:stretch>
-            <a:fillRect/>
-          </a:stretch>
-        </p:blipFill>
-        <p:spPr bwMode="auto">
-          <a:xfrm>
-            <a:off x="457200" y="1295400"/>
-            <a:ext cx="4038600" cy="2692400"/>
-          </a:xfrm>
-          <a:prstGeom prst="rect">
-            <a:avLst/>
-          </a:prstGeom>
-          <a:noFill/>
-          <a:ln w="9525">
-            <a:noFill/>
-            <a:headEnd/>
-            <a:tailEnd/>
-          </a:ln>
-        </p:spPr>
-      </p:pic>
-      <p:sp>
-        <p:nvSpPr>
-          <p:cNvPr id="1" name="TextBox 3"/>
-          <p:cNvSpPr txBox="1"/>
-          <p:nvPr/>
-        </p:nvSpPr>
-        <p:spPr>
-          <a:xfrm>
-            <a:off x="457200" y="4076700"/>
-            <a:ext cx="4038600" cy="508000"/>
-          </a:xfrm>
-          <a:prstGeom prst="rect">
-            <a:avLst/>
-          </a:prstGeom>
-          <a:noFill/>
-        </p:spPr>
-        <p:txBody>
-          <a:bodyPr/>
-          <a:lstStyle/>
-          <a:p>
-            <a:pPr lvl="0" indent="0" marL="0" algn="ctr">
-              <a:buNone/>
-            </a:pPr>
-            <a:r>
-              <a:rPr/>
-              <a:t>Graph+TimeSeries Hybrid data model</a:t>
-            </a:r>
-          </a:p>
-        </p:txBody>
-      </p:sp>
-      <p:sp>
-        <p:nvSpPr>
-          <p:cNvPr id="4" name="Content Placeholder 3"/>
-          <p:cNvSpPr>
-            <a:spLocks noGrp="1"/>
-          </p:cNvSpPr>
-          <p:nvPr>
-            <p:ph idx="2" sz="half"/>
-          </p:nvPr>
-        </p:nvSpPr>
-        <p:spPr/>
-        <p:txBody>
-          <a:bodyPr/>
-          <a:lstStyle/>
-          <a:p>
-            <a:pPr lvl="0"/>
-            <a:r>
-              <a:rPr/>
-              <a:t>A representative query workload has been designed, capturing the core of Digital Twin applications by integrating IoT, Time-Series, and Graph queries.</a:t>
-            </a:r>
-          </a:p>
-          <a:p>
-            <a:pPr lvl="0"/>
-            <a:r>
-              <a:rPr/>
-              <a:t>The data structure has been implemented in Kotlin and benchmarked against state-of-the-art techniques, showing promising performance gains.</a:t>
-            </a:r>
-          </a:p>
-          <a:p>
-            <a:pPr lvl="0"/>
-            <a:r>
-              <a:rPr/>
-              <a:t>The paper is curently under writing and to be submitted to </a:t>
-            </a:r>
-            <a:r>
-              <a:rPr>
-                <a:hlinkClick r:id="rId3"/>
-              </a:rPr>
-              <a:t>VLDB 2026</a:t>
-            </a:r>
-          </a:p>
-        </p:txBody>
-      </p:sp>
-    </p:spTree>
-  </p:cSld>
-</p:sld>
-</file>
-
-<file path=ppt/slides/slide15.xml><?xml version="1.0" encoding="utf-8"?>
-<p:sld xmlns:a="http://schemas.openxmlformats.org/drawingml/2006/main" xmlns:r="http://schemas.openxmlformats.org/officeDocument/2006/relationships" xmlns:p="http://schemas.openxmlformats.org/presentationml/2006/main">
-  <p:cSld>
-    <p:spTree>
-      <p:nvGrpSpPr>
-        <p:cNvPr id="1" name=""/>
-        <p:cNvGrpSpPr/>
-        <p:nvPr/>
-      </p:nvGrpSpPr>
-      <p:grpSpPr>
-        <a:xfrm>
-          <a:off x="0" y="0"/>
-          <a:ext cx="0" cy="0"/>
-          <a:chOff x="0" y="0"/>
-          <a:chExt cx="0" cy="0"/>
-        </a:xfrm>
-      </p:grpSpPr>
-      <p:sp>
-        <p:nvSpPr>
-          <p:cNvPr id="3" name="Content Placeholder 2"/>
-          <p:cNvSpPr>
-            <a:spLocks noGrp="1"/>
-          </p:cNvSpPr>
-          <p:nvPr>
-            <p:ph idx="1"/>
-          </p:nvPr>
-        </p:nvSpPr>
-        <p:spPr/>
-        <p:txBody>
-          <a:bodyPr/>
-          <a:lstStyle/>
-          <a:p>
-            <a:pPr lvl="0" indent="0" marL="0">
-              <a:buNone/>
-            </a:pPr>
-            <a:r>
-              <a:rPr b="1"/>
-              <a:t>Ongoing and future Works</a:t>
-            </a:r>
-          </a:p>
-          <a:p>
-            <a:pPr lvl="0"/>
-            <a:r>
-              <a:rPr/>
-              <a:t>Efficient querying: The semantic capabilities of Large Language Models (LLMs) make them a compelling solution for managing the inherent complexity of transparent querying in hybrid storage environments.</a:t>
-            </a:r>
-          </a:p>
-        </p:txBody>
-      </p:sp>
-    </p:spTree>
-  </p:cSld>
-</p:sld>
-</file>
-
-<file path=ppt/slides/slide16.xml><?xml version="1.0" encoding="utf-8"?>
-<p:sld xmlns:a="http://schemas.openxmlformats.org/drawingml/2006/main" xmlns:r="http://schemas.openxmlformats.org/officeDocument/2006/relationships" xmlns:p="http://schemas.openxmlformats.org/presentationml/2006/main">
-  <p:cSld>
-    <p:spTree>
-      <p:nvGrpSpPr>
-        <p:cNvPr id="1" name=""/>
-        <p:cNvGrpSpPr/>
-        <p:nvPr/>
-      </p:nvGrpSpPr>
-      <p:grpSpPr>
-        <a:xfrm>
-          <a:off x="0" y="0"/>
-          <a:ext cx="0" cy="0"/>
-          <a:chOff x="0" y="0"/>
-          <a:chExt cx="0" cy="0"/>
-        </a:xfrm>
-      </p:grpSpPr>
-      <p:sp>
-        <p:nvSpPr>
-          <p:cNvPr id="2" name="Title 1"/>
-          <p:cNvSpPr>
-            <a:spLocks noGrp="1"/>
-          </p:cNvSpPr>
-          <p:nvPr>
-            <p:ph type="title"/>
-          </p:nvPr>
-        </p:nvSpPr>
-        <p:spPr/>
-        <p:txBody>
-          <a:bodyPr/>
-          <a:lstStyle/>
-          <a:p>
-            <a:pPr lvl="0" indent="0" marL="0">
-              <a:buNone/>
-            </a:pPr>
-            <a:r>
-              <a:rPr/>
-              <a:t>Other activities</a:t>
-            </a:r>
-          </a:p>
-        </p:txBody>
-      </p:sp>
-      <p:sp>
-        <p:nvSpPr>
-          <p:cNvPr id="3" name="Content Placeholder 2"/>
-          <p:cNvSpPr>
-            <a:spLocks noGrp="1"/>
-          </p:cNvSpPr>
-          <p:nvPr>
-            <p:ph idx="1" sz="half"/>
-          </p:nvPr>
-        </p:nvSpPr>
-        <p:spPr/>
-        <p:txBody>
-          <a:bodyPr/>
-          <a:lstStyle/>
-          <a:p>
-            <a:pPr lvl="0" indent="0" marL="0">
-              <a:spcBef>
-                <a:spcPts val="3000"/>
-              </a:spcBef>
-              <a:buNone/>
-            </a:pPr>
-            <a:r>
-              <a:rPr b="1"/>
-              <a:t>Tutoring</a:t>
-            </a:r>
-          </a:p>
-          <a:p>
-            <a:pPr lvl="0"/>
-            <a:r>
-              <a:rPr/>
-              <a:t>95631 - MACHINE LEARNING AND DATA MINING - 6 cfu (2023/2024)</a:t>
-            </a:r>
-          </a:p>
-          <a:p>
-            <a:pPr lvl="0"/>
-            <a:r>
-              <a:rPr/>
-              <a:t>95631 - MACHINE LEARNING AND DATA MINING - 6 cfu (2024/2025)</a:t>
-            </a:r>
-          </a:p>
-          <a:p>
-            <a:pPr lvl="0"/>
-            <a:r>
-              <a:rPr/>
-              <a:t>95631 - MACHINE LEARNING AND DATA MINING - 6 cfu (2025/2026)</a:t>
-            </a:r>
-          </a:p>
-          <a:p>
-            <a:pPr lvl="0" indent="0" marL="0">
-              <a:spcBef>
-                <a:spcPts val="3000"/>
-              </a:spcBef>
-              <a:buNone/>
-            </a:pPr>
-            <a:r>
-              <a:rPr b="1"/>
-              <a:t>Summer schools</a:t>
-            </a:r>
-          </a:p>
-          <a:p>
-            <a:pPr lvl="0"/>
-            <a:r>
-              <a:rPr/>
-              <a:t>6th ACM Europe Summer School on Data Science, Ioannina (Greece)</a:t>
-            </a:r>
-          </a:p>
-          <a:p>
-            <a:pPr lvl="1"/>
-            <a:r>
-              <a:rPr/>
-              <a:t>Graph foundatons and Graph Data Science</a:t>
-            </a:r>
-          </a:p>
-          <a:p>
-            <a:pPr lvl="1"/>
-            <a:r>
-              <a:rPr/>
-              <a:t>IoT Edge Computing</a:t>
-            </a:r>
-          </a:p>
-          <a:p>
-            <a:pPr lvl="0" indent="0" marL="0">
-              <a:spcBef>
-                <a:spcPts val="3000"/>
-              </a:spcBef>
-              <a:buNone/>
-            </a:pPr>
-            <a:r>
-              <a:rPr b="1"/>
-              <a:t>Conferences</a:t>
-            </a:r>
-          </a:p>
-          <a:p>
-            <a:pPr lvl="0"/>
-            <a:r>
-              <a:rPr/>
-              <a:t>EDBT/ICDT 2024 Joint Conference</a:t>
-            </a:r>
-          </a:p>
-          <a:p>
-            <a:pPr lvl="0"/>
-            <a:r>
-              <a:rPr/>
-              <a:t>SEBD 2024, 2025</a:t>
-            </a:r>
-          </a:p>
-        </p:txBody>
-      </p:sp>
-      <p:sp>
-        <p:nvSpPr>
-          <p:cNvPr id="4" name="Content Placeholder 3"/>
-          <p:cNvSpPr>
-            <a:spLocks noGrp="1"/>
-          </p:cNvSpPr>
-          <p:nvPr>
-            <p:ph idx="2" sz="half"/>
-          </p:nvPr>
-        </p:nvSpPr>
-        <p:spPr/>
-        <p:txBody>
-          <a:bodyPr/>
-          <a:lstStyle/>
-          <a:p>
-            <a:pPr lvl="0" indent="0" marL="0">
-              <a:spcBef>
-                <a:spcPts val="3000"/>
-              </a:spcBef>
-              <a:buNone/>
-            </a:pPr>
-            <a:r>
-              <a:rPr b="1"/>
-              <a:t>External activities</a:t>
-            </a:r>
-          </a:p>
-          <a:p>
-            <a:pPr lvl="0"/>
-            <a:r>
-              <a:rPr/>
-              <a:t>Teaching Relational Database, 30 hrs, ITS Olivetti (2023/2024)</a:t>
-            </a:r>
-          </a:p>
-          <a:p>
-            <a:pPr lvl="0"/>
-            <a:r>
-              <a:rPr/>
-              <a:t>Teaching NoSQL Database, 30 hrs, ITS Olivetti (2024/2025)</a:t>
-            </a:r>
-          </a:p>
-          <a:p>
-            <a:pPr lvl="0"/>
-            <a:r>
-              <a:rPr/>
-              <a:t>Teaching NoSQL Database, 30 hrs, ITS Olivetti (2025/2026)</a:t>
-            </a:r>
-          </a:p>
-          <a:p>
-            <a:pPr lvl="0"/>
-            <a:r>
-              <a:rPr/>
-              <a:t>Consultancy on Digitalization in Precision Agriculture, iFarming s.r.l.</a:t>
-            </a:r>
-          </a:p>
-          <a:p>
-            <a:pPr lvl="0" indent="0" marL="0">
-              <a:spcBef>
-                <a:spcPts val="3000"/>
-              </a:spcBef>
-              <a:buNone/>
-            </a:pPr>
-            <a:r>
-              <a:rPr b="1"/>
-              <a:t>Bachelor Thesis advisor</a:t>
-            </a:r>
-          </a:p>
-          <a:p>
-            <a:pPr lvl="0"/>
-            <a:r>
-              <a:rPr/>
-              <a:t>Denis Nikaj (Progettazione e prototipazione di un’applicazione web per l’irrigazione di precisione), March 2024.</a:t>
-            </a:r>
-          </a:p>
-          <a:p>
-            <a:pPr lvl="0"/>
-            <a:r>
-              <a:rPr/>
-              <a:t>Davide Speziali (Progettazione e realizzazione di un simulatore per l’irrigazione di precisione), December 2024.</a:t>
-            </a:r>
-          </a:p>
-          <a:p>
-            <a:pPr lvl="0"/>
-            <a:r>
-              <a:rPr/>
-              <a:t>Federico Capponi (Progettazione e prototipazione di un sistema di irrigazione di precisione), July 2025.</a:t>
-            </a:r>
-          </a:p>
-        </p:txBody>
-      </p:sp>
-    </p:spTree>
-  </p:cSld>
-</p:sld>
-</file>
-
-<file path=ppt/slides/slide2.xml><?xml version="1.0" encoding="utf-8"?>
-<p:sld xmlns:a="http://schemas.openxmlformats.org/drawingml/2006/main" xmlns:r="http://schemas.openxmlformats.org/officeDocument/2006/relationships" xmlns:p="http://schemas.openxmlformats.org/presentationml/2006/main">
-  <p:cSld>
-    <p:spTree>
-      <p:nvGrpSpPr>
-        <p:cNvPr id="1" name=""/>
-        <p:cNvGrpSpPr/>
-        <p:nvPr/>
-      </p:nvGrpSpPr>
-      <p:grpSpPr>
-        <a:xfrm>
-          <a:off x="0" y="0"/>
-          <a:ext cx="0" cy="0"/>
-          <a:chOff x="0" y="0"/>
-          <a:chExt cx="0" cy="0"/>
-        </a:xfrm>
-      </p:grpSpPr>
-      <p:sp>
-        <p:nvSpPr>
-          <p:cNvPr id="2" name="Title 1"/>
-          <p:cNvSpPr>
-            <a:spLocks noGrp="1"/>
-          </p:cNvSpPr>
-          <p:nvPr>
-            <p:ph type="title"/>
-          </p:nvPr>
-        </p:nvSpPr>
-        <p:spPr/>
-        <p:txBody>
-          <a:bodyPr/>
-          <a:lstStyle/>
-          <a:p>
-            <a:pPr lvl="0" indent="0" marL="0">
-              <a:buNone/>
-            </a:pPr>
-            <a:r>
-              <a:rPr/>
-              <a:t>Introduction to Digital Twins</a:t>
-            </a:r>
-          </a:p>
-        </p:txBody>
-      </p:sp>
-      <p:sp>
-        <p:nvSpPr>
-          <p:cNvPr id="3" name="Content Placeholder 2"/>
-          <p:cNvSpPr>
-            <a:spLocks noGrp="1"/>
-          </p:cNvSpPr>
-          <p:nvPr>
-            <p:ph idx="1"/>
-          </p:nvPr>
-        </p:nvSpPr>
-        <p:spPr/>
-        <p:txBody>
-          <a:bodyPr/>
-          <a:lstStyle/>
-          <a:p>
-            <a:pPr lvl="0"/>
-            <a:r>
-              <a:rPr/>
-              <a:t>Differences between digital shadow, digital model, Digital Twin (DT)</a:t>
-            </a:r>
-          </a:p>
-          <a:p>
-            <a:pPr lvl="0"/>
-            <a:r>
-              <a:rPr/>
-              <a:t>Still a buzzword, but enclosing on a definition…</a:t>
-            </a:r>
-          </a:p>
-          <a:p>
-            <a:pPr lvl="0"/>
-            <a:r>
-              <a:rPr/>
-              <a:t>4 components: phyisical model, virtual model, communication services and the data</a:t>
-            </a:r>
-          </a:p>
-        </p:txBody>
-      </p:sp>
-    </p:spTree>
-  </p:cSld>
-</p:sld>
-</file>
-
-<file path=ppt/slides/slide3.xml><?xml version="1.0" encoding="utf-8"?>
-<p:sld xmlns:a="http://schemas.openxmlformats.org/drawingml/2006/main" xmlns:r="http://schemas.openxmlformats.org/officeDocument/2006/relationships" xmlns:p="http://schemas.openxmlformats.org/presentationml/2006/main">
-  <p:cSld>
-    <p:spTree>
-      <p:nvGrpSpPr>
-        <p:cNvPr id="1" name=""/>
-        <p:cNvGrpSpPr/>
-        <p:nvPr/>
-      </p:nvGrpSpPr>
-      <p:grpSpPr>
-        <a:xfrm>
-          <a:off x="0" y="0"/>
-          <a:ext cx="0" cy="0"/>
-          <a:chOff x="0" y="0"/>
-          <a:chExt cx="0" cy="0"/>
-        </a:xfrm>
-      </p:grpSpPr>
-      <p:pic>
-        <p:nvPicPr>
-          <p:cNvPr descr="https://github.com/ManuelePasini/slides-markdown/blob/master/slides/images/dt/twin_model_shadow.png?raw=true" id="0" name="Picture 1"/>
-          <p:cNvPicPr>
-            <a:picLocks noGrp="1" noChangeAspect="1"/>
-          </p:cNvPicPr>
-          <p:nvPr/>
-        </p:nvPicPr>
-        <p:blipFill>
-          <a:blip r:embed="rId2"/>
-          <a:stretch>
-            <a:fillRect/>
-          </a:stretch>
-        </p:blipFill>
-        <p:spPr bwMode="auto">
-          <a:xfrm>
-            <a:off x="457200" y="1511300"/>
-            <a:ext cx="4038600" cy="2235200"/>
-          </a:xfrm>
-          <a:prstGeom prst="rect">
-            <a:avLst/>
-          </a:prstGeom>
-          <a:noFill/>
-          <a:ln w="9525">
-            <a:noFill/>
-            <a:headEnd/>
-            <a:tailEnd/>
-          </a:ln>
-        </p:spPr>
-      </p:pic>
-      <p:sp>
-        <p:nvSpPr>
-          <p:cNvPr id="1" name="TextBox 3"/>
-          <p:cNvSpPr txBox="1"/>
-          <p:nvPr/>
-        </p:nvSpPr>
-        <p:spPr>
-          <a:xfrm>
-            <a:off x="457200" y="4076700"/>
-            <a:ext cx="4038600" cy="508000"/>
-          </a:xfrm>
-          <a:prstGeom prst="rect">
-            <a:avLst/>
-          </a:prstGeom>
-          <a:noFill/>
-        </p:spPr>
-        <p:txBody>
-          <a:bodyPr/>
-          <a:lstStyle/>
-          <a:p>
-            <a:pPr lvl="0" indent="0" marL="0" algn="ctr">
-              <a:buNone/>
-            </a:pPr>
-            <a:r>
-              <a:rPr/>
-              <a:t>Differences between twins</a:t>
-            </a:r>
-          </a:p>
-        </p:txBody>
-      </p:sp>
-      <p:pic>
-        <p:nvPicPr>
-          <p:cNvPr descr="https://github.com/ManuelePasini/slides-markdown/blob/master/slides/images/dt/dt.png?raw=true" id="0" name="Picture 1"/>
-          <p:cNvPicPr>
-            <a:picLocks noGrp="1" noChangeAspect="1"/>
-          </p:cNvPicPr>
-          <p:nvPr/>
-        </p:nvPicPr>
-        <p:blipFill>
-          <a:blip r:embed="rId3"/>
-          <a:stretch>
-            <a:fillRect/>
-          </a:stretch>
-        </p:blipFill>
-        <p:spPr bwMode="auto">
-          <a:xfrm>
-            <a:off x="4648200" y="1422400"/>
-            <a:ext cx="4038600" cy="2438400"/>
-          </a:xfrm>
-          <a:prstGeom prst="rect">
-            <a:avLst/>
-          </a:prstGeom>
-          <a:noFill/>
-          <a:ln w="9525">
-            <a:noFill/>
-            <a:headEnd/>
-            <a:tailEnd/>
-          </a:ln>
-        </p:spPr>
-      </p:pic>
-      <p:sp>
-        <p:nvSpPr>
-          <p:cNvPr id="1" name="TextBox 3"/>
-          <p:cNvSpPr txBox="1"/>
-          <p:nvPr/>
-        </p:nvSpPr>
-        <p:spPr>
-          <a:xfrm>
-            <a:off x="4648200" y="4076700"/>
-            <a:ext cx="4038600" cy="508000"/>
-          </a:xfrm>
-          <a:prstGeom prst="rect">
-            <a:avLst/>
-          </a:prstGeom>
-          <a:noFill/>
-        </p:spPr>
-        <p:txBody>
-          <a:bodyPr/>
-          <a:lstStyle/>
-          <a:p>
-            <a:pPr lvl="0" indent="0" marL="0" algn="ctr">
-              <a:buNone/>
-            </a:pPr>
-            <a:r>
-              <a:rPr/>
-              <a:t>DT components</a:t>
-            </a:r>
-          </a:p>
-        </p:txBody>
-      </p:sp>
-    </p:spTree>
-  </p:cSld>
-</p:sld>
-</file>
-
-<file path=ppt/slides/slide4.xml><?xml version="1.0" encoding="utf-8"?>
-<p:sld xmlns:a="http://schemas.openxmlformats.org/drawingml/2006/main" xmlns:r="http://schemas.openxmlformats.org/officeDocument/2006/relationships" xmlns:p="http://schemas.openxmlformats.org/presentationml/2006/main">
-  <p:cSld>
-    <p:spTree>
-      <p:nvGrpSpPr>
-        <p:cNvPr id="1" name=""/>
-        <p:cNvGrpSpPr/>
-        <p:nvPr/>
-      </p:nvGrpSpPr>
-      <p:grpSpPr>
-        <a:xfrm>
-          <a:off x="0" y="0"/>
-          <a:ext cx="0" cy="0"/>
-          <a:chOff x="0" y="0"/>
-          <a:chExt cx="0" cy="0"/>
-        </a:xfrm>
-      </p:grpSpPr>
-      <p:sp>
-        <p:nvSpPr>
-          <p:cNvPr id="2" name="Title 1"/>
-          <p:cNvSpPr>
-            <a:spLocks noGrp="1"/>
-          </p:cNvSpPr>
-          <p:nvPr>
-            <p:ph type="title"/>
-          </p:nvPr>
-        </p:nvSpPr>
-        <p:spPr/>
-        <p:txBody>
-          <a:bodyPr/>
-          <a:lstStyle/>
-          <a:p>
-            <a:pPr lvl="0" indent="0" marL="0">
-              <a:buNone/>
-            </a:pPr>
-            <a:r>
-              <a:rPr/>
-              <a:t>Introduction to Digital Twins</a:t>
-            </a:r>
-          </a:p>
-        </p:txBody>
-      </p:sp>
-      <p:sp>
-        <p:nvSpPr>
-          <p:cNvPr id="3" name="Content Placeholder 2"/>
-          <p:cNvSpPr>
-            <a:spLocks noGrp="1"/>
-          </p:cNvSpPr>
-          <p:nvPr>
-            <p:ph idx="1"/>
-          </p:nvPr>
-        </p:nvSpPr>
-        <p:spPr/>
-        <p:txBody>
-          <a:bodyPr/>
-          <a:lstStyle/>
-          <a:p>
-            <a:pPr lvl="0"/>
-            <a:r>
-              <a:rPr/>
-              <a:t>The role of data as a core component of Digital Twins is increasingly recognized…</a:t>
-            </a:r>
-          </a:p>
-          <a:p>
-            <a:pPr lvl="0"/>
-            <a:r>
-              <a:rPr/>
-              <a:t>… yet it is often overlooked in research contributions.</a:t>
-            </a:r>
-          </a:p>
-          <a:p>
-            <a:pPr lvl="0"/>
-            <a:r>
-              <a:rPr/>
-              <a:t>Some reference models are emerging (e.g., Fei Tao, Univ. of Beijing).</a:t>
-            </a:r>
-          </a:p>
-        </p:txBody>
-      </p:sp>
-    </p:spTree>
-  </p:cSld>
-</p:sld>
-</file>
-
-<file path=ppt/slides/slide5.xml><?xml version="1.0" encoding="utf-8"?>
-<p:sld xmlns:a="http://schemas.openxmlformats.org/drawingml/2006/main" xmlns:r="http://schemas.openxmlformats.org/officeDocument/2006/relationships" xmlns:p="http://schemas.openxmlformats.org/presentationml/2006/main">
-  <p:cSld>
-    <p:spTree>
-      <p:nvGrpSpPr>
-        <p:cNvPr id="1" name=""/>
-        <p:cNvGrpSpPr/>
-        <p:nvPr/>
-      </p:nvGrpSpPr>
-      <p:grpSpPr>
-        <a:xfrm>
-          <a:off x="0" y="0"/>
-          <a:ext cx="0" cy="0"/>
-          <a:chOff x="0" y="0"/>
-          <a:chExt cx="0" cy="0"/>
-        </a:xfrm>
-      </p:grpSpPr>
-      <p:pic>
-        <p:nvPicPr>
-          <p:cNvPr descr="https://github.com/ManuelePasini/slides-markdown/blob/master/slides/images/dt/5dim.png?raw=true" id="0" name="Picture 1"/>
-          <p:cNvPicPr>
-            <a:picLocks noGrp="1" noChangeAspect="1"/>
-          </p:cNvPicPr>
-          <p:nvPr/>
-        </p:nvPicPr>
-        <p:blipFill>
-          <a:blip r:embed="rId2"/>
-          <a:stretch>
-            <a:fillRect/>
-          </a:stretch>
-        </p:blipFill>
-        <p:spPr bwMode="auto">
-          <a:xfrm>
-            <a:off x="457200" y="1435100"/>
-            <a:ext cx="4038600" cy="2413000"/>
-          </a:xfrm>
-          <a:prstGeom prst="rect">
-            <a:avLst/>
-          </a:prstGeom>
-          <a:noFill/>
-          <a:ln w="9525">
-            <a:noFill/>
-            <a:headEnd/>
-            <a:tailEnd/>
-          </a:ln>
-        </p:spPr>
-      </p:pic>
-      <p:sp>
-        <p:nvSpPr>
-          <p:cNvPr id="1" name="TextBox 3"/>
-          <p:cNvSpPr txBox="1"/>
-          <p:nvPr/>
-        </p:nvSpPr>
-        <p:spPr>
-          <a:xfrm>
-            <a:off x="457200" y="4076700"/>
-            <a:ext cx="4038600" cy="508000"/>
-          </a:xfrm>
-          <a:prstGeom prst="rect">
-            <a:avLst/>
-          </a:prstGeom>
-          <a:noFill/>
-        </p:spPr>
-        <p:txBody>
-          <a:bodyPr/>
-          <a:lstStyle/>
-          <a:p>
-            <a:pPr lvl="0" indent="0" marL="0" algn="ctr">
-              <a:buNone/>
-            </a:pPr>
-            <a:r>
-              <a:rPr/>
-              <a:t>5-Dimensional DT (Fei, Tao 2020)</a:t>
-            </a:r>
-          </a:p>
-        </p:txBody>
-      </p:sp>
-      <p:sp>
-        <p:nvSpPr>
-          <p:cNvPr id="4" name="Content Placeholder 3"/>
-          <p:cNvSpPr>
-            <a:spLocks noGrp="1"/>
-          </p:cNvSpPr>
-          <p:nvPr>
-            <p:ph idx="2" sz="half"/>
-          </p:nvPr>
-        </p:nvSpPr>
-        <p:spPr/>
-        <p:txBody>
-          <a:bodyPr/>
-          <a:lstStyle/>
-          <a:p>
-            <a:pPr lvl="0"/>
-            <a:r>
-              <a:rPr/>
-              <a:t>However…</a:t>
-            </a:r>
-          </a:p>
-          <a:p>
-            <a:pPr lvl="1"/>
-            <a:r>
-              <a:rPr/>
-              <a:t>Each solution develops its own data model and storage system;</a:t>
-            </a:r>
-          </a:p>
-          <a:p>
-            <a:pPr lvl="1"/>
-            <a:r>
-              <a:rPr/>
-              <a:t>No interoperability between DTs, even when relying on the same data;</a:t>
-            </a:r>
-          </a:p>
-          <a:p>
-            <a:pPr lvl="1"/>
-            <a:r>
-              <a:rPr/>
-              <a:t>Capabilities of DTs are thus limited;</a:t>
-            </a:r>
-          </a:p>
-          <a:p>
-            <a:pPr lvl="1"/>
-            <a:r>
-              <a:rPr b="1"/>
-              <a:t>A standardization effort is required to foster integration.</a:t>
-            </a:r>
-          </a:p>
-          <a:p>
-            <a:pPr lvl="1"/>
-            <a:r>
-              <a:rPr b="1"/>
-              <a:t>Standardization should begin at the data layer</a:t>
-            </a:r>
-          </a:p>
-        </p:txBody>
-      </p:sp>
-    </p:spTree>
-  </p:cSld>
-</p:sld>
-</file>
-
-<file path=ppt/slides/slide6.xml><?xml version="1.0" encoding="utf-8"?>
-<p:sld xmlns:a="http://schemas.openxmlformats.org/drawingml/2006/main" xmlns:r="http://schemas.openxmlformats.org/officeDocument/2006/relationships" xmlns:p="http://schemas.openxmlformats.org/presentationml/2006/main">
-  <p:cSld>
-    <p:spTree>
-      <p:nvGrpSpPr>
-        <p:cNvPr id="1" name=""/>
-        <p:cNvGrpSpPr/>
-        <p:nvPr/>
-      </p:nvGrpSpPr>
-      <p:grpSpPr>
-        <a:xfrm>
-          <a:off x="0" y="0"/>
-          <a:ext cx="0" cy="0"/>
-          <a:chOff x="0" y="0"/>
-          <a:chExt cx="0" cy="0"/>
-        </a:xfrm>
-      </p:grpSpPr>
-      <p:sp>
-        <p:nvSpPr>
-          <p:cNvPr id="2" name="Title 1"/>
-          <p:cNvSpPr>
-            <a:spLocks noGrp="1"/>
-          </p:cNvSpPr>
-          <p:nvPr>
-            <p:ph type="title"/>
-          </p:nvPr>
-        </p:nvSpPr>
-        <p:spPr/>
-        <p:txBody>
-          <a:bodyPr/>
-          <a:lstStyle/>
-          <a:p>
-            <a:pPr lvl="0" indent="0" marL="0">
-              <a:buNone/>
-            </a:pPr>
-            <a:r>
-              <a:rPr/>
-              <a:t>A Digital Twin for Precision Agriculture</a:t>
-            </a:r>
-          </a:p>
-        </p:txBody>
-      </p:sp>
-      <p:sp>
-        <p:nvSpPr>
-          <p:cNvPr id="3" name="Content Placeholder 2"/>
-          <p:cNvSpPr>
-            <a:spLocks noGrp="1"/>
-          </p:cNvSpPr>
-          <p:nvPr>
-            <p:ph idx="1"/>
-          </p:nvPr>
-        </p:nvSpPr>
-        <p:spPr/>
-        <p:txBody>
-          <a:bodyPr/>
-          <a:lstStyle/>
-          <a:p>
-            <a:pPr lvl="0"/>
-            <a:r>
-              <a:rPr/>
-              <a:t>Five year ongoing project (within PNRR - </a:t>
-            </a:r>
-            <a:r>
-              <a:rPr>
-                <a:hlinkClick r:id="rId2"/>
-              </a:rPr>
-              <a:t>Agritech</a:t>
-            </a:r>
-            <a:r>
-              <a:rPr/>
-              <a:t> Spoke 9) on precision irrigation of fruit orchards</a:t>
-            </a:r>
-          </a:p>
-          <a:p>
-            <a:pPr lvl="0"/>
-            <a:r>
-              <a:rPr/>
-              <a:t>Demo available at </a:t>
-            </a:r>
-            <a:r>
-              <a:rPr>
-                <a:hlinkClick r:id="rId3"/>
-              </a:rPr>
-              <a:t>this link</a:t>
-            </a:r>
-          </a:p>
-          <a:p>
-            <a:pPr lvl="0"/>
-            <a:r>
-              <a:rPr/>
-              <a:t>Paper submitted to </a:t>
-            </a:r>
-            <a:r>
-              <a:rPr>
-                <a:hlinkClick r:id="rId4"/>
-              </a:rPr>
-              <a:t>Computer and Electronics in Agriculture</a:t>
-            </a:r>
-            <a:r>
-              <a:rPr/>
-              <a:t> (September 2025).</a:t>
-            </a:r>
-          </a:p>
-        </p:txBody>
-      </p:sp>
-    </p:spTree>
-  </p:cSld>
-</p:sld>
-</file>
-
-<file path=ppt/slides/slide7.xml><?xml version="1.0" encoding="utf-8"?>
-<p:sld xmlns:a="http://schemas.openxmlformats.org/drawingml/2006/main" xmlns:r="http://schemas.openxmlformats.org/officeDocument/2006/relationships" xmlns:p="http://schemas.openxmlformats.org/presentationml/2006/main">
-  <p:cSld>
-    <p:spTree>
-      <p:nvGrpSpPr>
-        <p:cNvPr id="1" name=""/>
-        <p:cNvGrpSpPr/>
-        <p:nvPr/>
-      </p:nvGrpSpPr>
-      <p:grpSpPr>
-        <a:xfrm>
-          <a:off x="0" y="0"/>
-          <a:ext cx="0" cy="0"/>
-          <a:chOff x="0" y="0"/>
-          <a:chExt cx="0" cy="0"/>
-        </a:xfrm>
-      </p:grpSpPr>
-      <p:pic>
-        <p:nvPicPr>
-          <p:cNvPr descr="https://github.com/ManuelePasini/slides-markdown/blob/master/slides/images/phd2ndyear/dt_agro.png?raw=true" id="0" name="Picture 1"/>
-          <p:cNvPicPr>
-            <a:picLocks noGrp="1" noChangeAspect="1"/>
-          </p:cNvPicPr>
-          <p:nvPr/>
-        </p:nvPicPr>
-        <p:blipFill>
-          <a:blip r:embed="rId2"/>
-          <a:stretch>
-            <a:fillRect/>
-          </a:stretch>
-        </p:blipFill>
-        <p:spPr bwMode="auto">
-          <a:xfrm>
-            <a:off x="457200" y="1701800"/>
-            <a:ext cx="4038600" cy="1879600"/>
-          </a:xfrm>
-          <a:prstGeom prst="rect">
-            <a:avLst/>
-          </a:prstGeom>
-          <a:noFill/>
-          <a:ln w="9525">
-            <a:noFill/>
-            <a:headEnd/>
-            <a:tailEnd/>
-          </a:ln>
-        </p:spPr>
-      </p:pic>
-      <p:sp>
-        <p:nvSpPr>
-          <p:cNvPr id="1" name="TextBox 3"/>
-          <p:cNvSpPr txBox="1"/>
-          <p:nvPr/>
-        </p:nvSpPr>
-        <p:spPr>
-          <a:xfrm>
-            <a:off x="457200" y="4076700"/>
-            <a:ext cx="4038600" cy="508000"/>
-          </a:xfrm>
-          <a:prstGeom prst="rect">
-            <a:avLst/>
-          </a:prstGeom>
-          <a:noFill/>
-        </p:spPr>
-        <p:txBody>
-          <a:bodyPr/>
-          <a:lstStyle/>
-          <a:p>
-            <a:pPr lvl="0" indent="0" marL="0" algn="ctr">
-              <a:buNone/>
-            </a:pPr>
-            <a:r>
-              <a:rPr/>
-              <a:t>Soil moisture distribution within a monitored plant</a:t>
-            </a:r>
-          </a:p>
-        </p:txBody>
-      </p:sp>
-      <p:pic>
-        <p:nvPicPr>
-          <p:cNvPr descr="https://github.com/ManuelePasini/slides-markdown/blob/master/slides/images/phd2ndyear/action_agro_dt.png?raw=true" id="0" name="Picture 1"/>
-          <p:cNvPicPr>
-            <a:picLocks noGrp="1" noChangeAspect="1"/>
-          </p:cNvPicPr>
-          <p:nvPr/>
-        </p:nvPicPr>
-        <p:blipFill>
-          <a:blip r:embed="rId3"/>
-          <a:stretch>
-            <a:fillRect/>
-          </a:stretch>
-        </p:blipFill>
-        <p:spPr bwMode="auto">
-          <a:xfrm>
-            <a:off x="4648200" y="1270000"/>
-            <a:ext cx="4038600" cy="2730500"/>
-          </a:xfrm>
-          <a:prstGeom prst="rect">
-            <a:avLst/>
-          </a:prstGeom>
-          <a:noFill/>
-          <a:ln w="9525">
-            <a:noFill/>
-            <a:headEnd/>
-            <a:tailEnd/>
-          </a:ln>
-        </p:spPr>
-      </p:pic>
-      <p:sp>
-        <p:nvSpPr>
-          <p:cNvPr id="1" name="TextBox 3"/>
-          <p:cNvSpPr txBox="1"/>
-          <p:nvPr/>
-        </p:nvSpPr>
-        <p:spPr>
-          <a:xfrm>
-            <a:off x="4648200" y="4076700"/>
-            <a:ext cx="4038600" cy="508000"/>
-          </a:xfrm>
-          <a:prstGeom prst="rect">
-            <a:avLst/>
-          </a:prstGeom>
-          <a:noFill/>
-        </p:spPr>
-        <p:txBody>
-          <a:bodyPr/>
-          <a:lstStyle/>
-          <a:p>
-            <a:pPr lvl="0" indent="0" marL="0" algn="ctr">
-              <a:buNone/>
-            </a:pPr>
-            <a:r>
-              <a:rPr/>
-              <a:t>Example of controlling action to the physical entity - applying irrigation</a:t>
-            </a:r>
-          </a:p>
-        </p:txBody>
-      </p:sp>
-    </p:spTree>
-  </p:cSld>
-</p:sld>
-</file>
-
-<file path=ppt/slides/slide8.xml><?xml version="1.0" encoding="utf-8"?>
-<p:sld xmlns:a="http://schemas.openxmlformats.org/drawingml/2006/main" xmlns:r="http://schemas.openxmlformats.org/officeDocument/2006/relationships" xmlns:p="http://schemas.openxmlformats.org/presentationml/2006/main">
-  <p:cSld>
-    <p:spTree>
-      <p:nvGrpSpPr>
-        <p:cNvPr id="1" name=""/>
-        <p:cNvGrpSpPr/>
-        <p:nvPr/>
-      </p:nvGrpSpPr>
-      <p:grpSpPr>
-        <a:xfrm>
-          <a:off x="0" y="0"/>
-          <a:ext cx="0" cy="0"/>
-          <a:chOff x="0" y="0"/>
-          <a:chExt cx="0" cy="0"/>
-        </a:xfrm>
-      </p:grpSpPr>
-      <p:sp>
-        <p:nvSpPr>
-          <p:cNvPr id="3" name="Content Placeholder 2"/>
-          <p:cNvSpPr>
-            <a:spLocks noGrp="1"/>
-          </p:cNvSpPr>
-          <p:nvPr>
-            <p:ph idx="1"/>
-          </p:nvPr>
-        </p:nvSpPr>
-        <p:spPr/>
-        <p:txBody>
-          <a:bodyPr/>
-          <a:lstStyle/>
-          <a:p>
-            <a:pPr lvl="0" indent="0" marL="0">
-              <a:buNone/>
-            </a:pPr>
-            <a:r>
-              <a:rPr b="1"/>
-              <a:t>Ongoing work</a:t>
-            </a:r>
-            <a:r>
-              <a:rPr/>
-              <a:t>: </a:t>
-            </a:r>
-            <a:r>
-              <a:rPr>
-                <a:hlinkClick r:id="rId2"/>
-              </a:rPr>
-              <a:t>ZESPRI</a:t>
-            </a:r>
-            <a:r>
-              <a:rPr/>
-              <a:t>, the world’s largest kiwifruit producer, has decided to undertake large-scale experimental implementation of the system for the 2026 irrigation season.</a:t>
-            </a:r>
-          </a:p>
-        </p:txBody>
-      </p:sp>
-    </p:spTree>
-  </p:cSld>
-</p:sld>
-</file>
-
 <file path=ppt/slides/slide9.xml><?xml version="1.0" encoding="utf-8"?>
 <p:sld xmlns:a="http://schemas.openxmlformats.org/drawingml/2006/main" xmlns:r="http://schemas.openxmlformats.org/officeDocument/2006/relationships" xmlns:p="http://schemas.openxmlformats.org/presentationml/2006/main">
   <p:cSld>
@@ -4956,12 +4879,12 @@
       </p:grpSpPr>
       <p:sp>
         <p:nvSpPr>
-          <p:cNvPr id="2" name="Title 1"/>
-          <p:cNvSpPr>
-            <a:spLocks noGrp="1"/>
-          </p:cNvSpPr>
-          <p:nvPr>
-            <p:ph type="title"/>
+          <p:cNvPr id="3" name="Content Placeholder 2"/>
+          <p:cNvSpPr>
+            <a:spLocks noGrp="1"/>
+          </p:cNvSpPr>
+          <p:nvPr>
+            <p:ph idx="1"/>
           </p:nvPr>
         </p:nvSpPr>
         <p:spPr/>
@@ -4970,69 +4893,91 @@
           <a:lstStyle/>
           <a:p>
             <a:pPr lvl="0" indent="0" marL="0">
+              <a:spcBef>
+                <a:spcPts val="3000"/>
+              </a:spcBef>
               <a:buNone/>
             </a:pPr>
             <a:r>
-              <a:rPr/>
-              <a:t>A Data Platform fostering collaboration between DTs</a:t>
-            </a:r>
-          </a:p>
-        </p:txBody>
-      </p:sp>
-      <p:sp>
-        <p:nvSpPr>
-          <p:cNvPr id="3" name="Content Placeholder 2"/>
-          <p:cNvSpPr>
-            <a:spLocks noGrp="1"/>
-          </p:cNvSpPr>
-          <p:nvPr>
-            <p:ph idx="1"/>
-          </p:nvPr>
-        </p:nvSpPr>
-        <p:spPr/>
-        <p:txBody>
-          <a:bodyPr/>
-          <a:lstStyle/>
-          <a:p>
-            <a:pPr lvl="0"/>
-            <a:r>
-              <a:rPr/>
-              <a:t>Within Agritech - Spoke 3, a data platform fostering integration across research projects has been developed.</a:t>
-            </a:r>
-          </a:p>
-          <a:p>
-            <a:pPr lvl="0"/>
-            <a:r>
-              <a:rPr/>
-              <a:t>When defining integration policies and standards, several recurrent data requirements were identified:</a:t>
-            </a:r>
-          </a:p>
-          <a:p>
-            <a:pPr lvl="1"/>
-            <a:r>
-              <a:rPr/>
-              <a:t>Heterogeneous data: from structured to unstructured (including images).</a:t>
-            </a:r>
-          </a:p>
-          <a:p>
-            <a:pPr lvl="1"/>
-            <a:r>
-              <a:rPr/>
-              <a:t>Interconnected data: capturing physical entities together with the IoT networks describing them.</a:t>
-            </a:r>
-          </a:p>
-          <a:p>
-            <a:pPr lvl="1"/>
-            <a:r>
-              <a:rPr/>
-              <a:t>Temporal aspects: datasets often evolve as time series.</a:t>
-            </a:r>
-          </a:p>
-          <a:p>
-            <a:pPr lvl="1"/>
-            <a:r>
-              <a:rPr/>
-              <a:t>Spatial aspects: data are often geo-referenced.</a:t>
+              <a:rPr b="1"/>
+              <a:t>From application-oriented to domain-oriented</a:t>
+            </a:r>
+          </a:p>
+          <a:p>
+            <a:pPr lvl="0"/>
+            <a:r>
+              <a:rPr b="1"/>
+              <a:t>Research Question 1.</a:t>
+            </a:r>
+            <a:r>
+              <a:rPr/>
+              <a:t>: Can we move from application-level DT platforms to domain-level platforms?</a:t>
+            </a:r>
+          </a:p>
+          <a:p>
+            <a:pPr lvl="0" indent="0" marL="0">
+              <a:buNone/>
+            </a:pPr>
+            <a:r>
+              <a:rPr/>
+              <a:t>Takeaway: a DT can be represented as a data pipeline that collects, processes, and exploits data.</a:t>
+            </a:r>
+          </a:p>
+          <a:p>
+            <a:pPr lvl="0"/>
+            <a:r>
+              <a:rPr b="1"/>
+              <a:t>Research question 2.</a:t>
+            </a:r>
+            <a:r>
+              <a:rPr/>
+              <a:t>: given a data pipeline, can we identify the set of data platform services required to support it?</a:t>
+            </a:r>
+          </a:p>
+          <a:p>
+            <a:pPr lvl="0" indent="0" marL="0">
+              <a:buNone/>
+            </a:pPr>
+            <a:r>
+              <a:rPr/>
+              <a:t>References:</a:t>
+            </a:r>
+          </a:p>
+          <a:p>
+            <a:pPr lvl="0" indent="0" marL="0">
+              <a:buNone/>
+            </a:pPr>
+            <a:r>
+              <a:rPr/>
+              <a:t>Matteo Francia, Matteo Golfarelli, Manuele Pasini — Towards a Process-Driven Design of Data Platforms. In DOLAP, pp. 28–35, 2024.</a:t>
+            </a:r>
+          </a:p>
+          <a:p>
+            <a:pPr lvl="0" indent="0" marL="0">
+              <a:buNone/>
+            </a:pPr>
+            <a:r>
+              <a:rPr/>
+              <a:t>Matteo Francia, Matteo Golfarelli, Manuele Pasini — Process-Driven Design of Cloud Data Platforms. Information Systems Journal, Manuscript No. INFOSYS-D-24-00444.</a:t>
+            </a:r>
+          </a:p>
+          <a:p>
+            <a:pPr lvl="0"/>
+            <a:r>
+              <a:rPr/>
+              <a:t>But an issue emerged: pipelines of different DTs entail different data models &amp; storage systems, yet they share some of the same recurrent requirements….</a:t>
+            </a:r>
+          </a:p>
+          <a:p>
+            <a:pPr lvl="0" indent="0" marL="0">
+              <a:spcBef>
+                <a:spcPts val="3000"/>
+              </a:spcBef>
+              <a:buNone/>
+            </a:pPr>
+            <a:r>
+              <a:rPr b="1"/>
+              <a:t>Modelling Digital Twin Data</a:t>
             </a:r>
           </a:p>
         </p:txBody>

</xml_diff>

<commit_message>
Deploying to gh-pages from @ ManuelePasini/slides-markdown@38abd946744ee652d07e5a2e5e264b424c255dc8 🚀
</commit_message>
<xml_diff>
--- a/phd_secondyear.pptx
+++ b/phd_secondyear.pptx
@@ -20,6 +20,7 @@
     <p:sldId id="268" r:id="rId14"/>
     <p:sldId id="269" r:id="rId15"/>
     <p:sldId id="270" r:id="rId16"/>
+    <p:sldId id="271" r:id="rId17"/>
   </p:sldIdLst>
   <p:sldSz cx="9144000" cy="5143500" type="screen16x9"/>
   <p:notesSz cx="6858000" cy="9144000"/>
@@ -3228,13 +3229,6 @@
             <a:pPr lvl="0"/>
             <a:r>
               <a:rPr/>
-              <a:t>Differences between digital shadow, digital model, Digital Twin (DT)</a:t>
-            </a:r>
-          </a:p>
-          <a:p>
-            <a:pPr lvl="0"/>
-            <a:r>
-              <a:rPr/>
               <a:t>Still a buzzword, but enclosing on a definition…</a:t>
             </a:r>
           </a:p>
@@ -3243,6 +3237,13 @@
             <a:r>
               <a:rPr/>
               <a:t>4 components: phyisical model, virtual model, communication services and the data</a:t>
+            </a:r>
+          </a:p>
+          <a:p>
+            <a:pPr lvl="0"/>
+            <a:r>
+              <a:rPr/>
+              <a:t>As of today, they result as standalone applications</a:t>
             </a:r>
           </a:p>
         </p:txBody>
@@ -3253,6 +3254,189 @@
 </file>
 
 <file path=ppt/slides/slide10.xml><?xml version="1.0" encoding="utf-8"?>
+<p:sld xmlns:a="http://schemas.openxmlformats.org/drawingml/2006/main" xmlns:r="http://schemas.openxmlformats.org/officeDocument/2006/relationships" xmlns:p="http://schemas.openxmlformats.org/presentationml/2006/main">
+  <p:cSld>
+    <p:spTree>
+      <p:nvGrpSpPr>
+        <p:cNvPr id="1" name=""/>
+        <p:cNvGrpSpPr/>
+        <p:nvPr/>
+      </p:nvGrpSpPr>
+      <p:grpSpPr>
+        <a:xfrm>
+          <a:off x="0" y="0"/>
+          <a:ext cx="0" cy="0"/>
+          <a:chOff x="0" y="0"/>
+          <a:chExt cx="0" cy="0"/>
+        </a:xfrm>
+      </p:grpSpPr>
+      <p:pic>
+        <p:nvPicPr>
+          <p:cNvPr descr="https://github.com/ManuelePasini/slides-markdown/blob/master/slides/images/phd2ndyear/agriplatform.png?raw=true" id="0" name="Picture 1"/>
+          <p:cNvPicPr>
+            <a:picLocks noGrp="1" noChangeAspect="1"/>
+          </p:cNvPicPr>
+          <p:nvPr/>
+        </p:nvPicPr>
+        <p:blipFill>
+          <a:blip r:embed="rId2"/>
+          <a:stretch>
+            <a:fillRect/>
+          </a:stretch>
+        </p:blipFill>
+        <p:spPr bwMode="auto">
+          <a:xfrm>
+            <a:off x="457200" y="1460500"/>
+            <a:ext cx="4038600" cy="2349500"/>
+          </a:xfrm>
+          <a:prstGeom prst="rect">
+            <a:avLst/>
+          </a:prstGeom>
+          <a:noFill/>
+          <a:ln w="9525">
+            <a:noFill/>
+            <a:headEnd/>
+            <a:tailEnd/>
+          </a:ln>
+        </p:spPr>
+      </p:pic>
+      <p:sp>
+        <p:nvSpPr>
+          <p:cNvPr id="1" name="TextBox 3"/>
+          <p:cNvSpPr txBox="1"/>
+          <p:nvPr/>
+        </p:nvSpPr>
+        <p:spPr>
+          <a:xfrm>
+            <a:off x="457200" y="4076700"/>
+            <a:ext cx="4038600" cy="508000"/>
+          </a:xfrm>
+          <a:prstGeom prst="rect">
+            <a:avLst/>
+          </a:prstGeom>
+          <a:noFill/>
+        </p:spPr>
+        <p:txBody>
+          <a:bodyPr/>
+          <a:lstStyle/>
+          <a:p>
+            <a:pPr lvl="0" indent="0" marL="0" algn="ctr">
+              <a:buNone/>
+            </a:pPr>
+            <a:r>
+              <a:rPr/>
+              <a:t>Excerpt of the Agricolture Data Platform</a:t>
+            </a:r>
+          </a:p>
+        </p:txBody>
+      </p:sp>
+      <p:sp>
+        <p:nvSpPr>
+          <p:cNvPr id="4" name="Content Placeholder 3"/>
+          <p:cNvSpPr>
+            <a:spLocks noGrp="1"/>
+          </p:cNvSpPr>
+          <p:nvPr>
+            <p:ph idx="2" sz="half"/>
+          </p:nvPr>
+        </p:nvSpPr>
+        <p:spPr/>
+        <p:txBody>
+          <a:bodyPr/>
+          <a:lstStyle/>
+          <a:p>
+            <a:pPr lvl="0"/>
+            <a:r>
+              <a:rPr/>
+              <a:t>General purpose: supporting heterogeneous data through heterogeneous storage systems;</a:t>
+            </a:r>
+          </a:p>
+          <a:p>
+            <a:pPr lvl="0"/>
+            <a:r>
+              <a:rPr/>
+              <a:t>Interoperable: Interoperable: integration and sharing via common data models (e.g., </a:t>
+            </a:r>
+            <a:r>
+              <a:rPr>
+                <a:hlinkClick r:id="rId3"/>
+              </a:rPr>
+              <a:t>FIWARE</a:t>
+            </a:r>
+            <a:r>
+              <a:rPr/>
+              <a:t>);</a:t>
+            </a:r>
+          </a:p>
+          <a:p>
+            <a:pPr lvl="0"/>
+            <a:r>
+              <a:rPr b="1"/>
+              <a:t>Ongoing work</a:t>
+            </a:r>
+            <a:r>
+              <a:rPr/>
+              <a:t>: supporting and sharing data processes (e.g., donwload ESA images) and applications.</a:t>
+            </a:r>
+          </a:p>
+        </p:txBody>
+      </p:sp>
+    </p:spTree>
+  </p:cSld>
+</p:sld>
+</file>
+
+<file path=ppt/slides/slide11.xml><?xml version="1.0" encoding="utf-8"?>
+<p:sld xmlns:a="http://schemas.openxmlformats.org/drawingml/2006/main" xmlns:r="http://schemas.openxmlformats.org/officeDocument/2006/relationships" xmlns:p="http://schemas.openxmlformats.org/presentationml/2006/main">
+  <p:cSld>
+    <p:spTree>
+      <p:nvGrpSpPr>
+        <p:cNvPr id="1" name=""/>
+        <p:cNvGrpSpPr/>
+        <p:nvPr/>
+      </p:nvGrpSpPr>
+      <p:grpSpPr>
+        <a:xfrm>
+          <a:off x="0" y="0"/>
+          <a:ext cx="0" cy="0"/>
+          <a:chOff x="0" y="0"/>
+          <a:chExt cx="0" cy="0"/>
+        </a:xfrm>
+      </p:grpSpPr>
+      <p:sp>
+        <p:nvSpPr>
+          <p:cNvPr id="3" name="Content Placeholder 2"/>
+          <p:cNvSpPr>
+            <a:spLocks noGrp="1"/>
+          </p:cNvSpPr>
+          <p:nvPr>
+            <p:ph idx="1"/>
+          </p:nvPr>
+        </p:nvSpPr>
+        <p:spPr/>
+        <p:txBody>
+          <a:bodyPr/>
+          <a:lstStyle/>
+          <a:p>
+            <a:pPr lvl="0" indent="0" marL="0">
+              <a:spcBef>
+                <a:spcPts val="3000"/>
+              </a:spcBef>
+              <a:buNone/>
+            </a:pPr>
+            <a:r>
+              <a:rPr b="1"/>
+              <a:t>Modelling Digital Twin Data</a:t>
+            </a:r>
+          </a:p>
+        </p:txBody>
+      </p:sp>
+    </p:spTree>
+  </p:cSld>
+</p:sld>
+</file>
+
+<file path=ppt/slides/slide12.xml><?xml version="1.0" encoding="utf-8"?>
 <p:sld xmlns:a="http://schemas.openxmlformats.org/drawingml/2006/main" xmlns:r="http://schemas.openxmlformats.org/officeDocument/2006/relationships" xmlns:p="http://schemas.openxmlformats.org/presentationml/2006/main">
   <p:cSld>
     <p:spTree>
@@ -3459,7 +3643,7 @@
 </p:sld>
 </file>
 
-<file path=ppt/slides/slide11.xml><?xml version="1.0" encoding="utf-8"?>
+<file path=ppt/slides/slide13.xml><?xml version="1.0" encoding="utf-8"?>
 <p:sld xmlns:a="http://schemas.openxmlformats.org/drawingml/2006/main" xmlns:r="http://schemas.openxmlformats.org/officeDocument/2006/relationships" xmlns:p="http://schemas.openxmlformats.org/presentationml/2006/main">
   <p:cSld>
     <p:spTree>
@@ -3516,7 +3700,7 @@
 </p:sld>
 </file>
 
-<file path=ppt/slides/slide12.xml><?xml version="1.0" encoding="utf-8"?>
+<file path=ppt/slides/slide14.xml><?xml version="1.0" encoding="utf-8"?>
 <p:sld xmlns:a="http://schemas.openxmlformats.org/drawingml/2006/main" xmlns:r="http://schemas.openxmlformats.org/officeDocument/2006/relationships" xmlns:p="http://schemas.openxmlformats.org/presentationml/2006/main">
   <p:cSld>
     <p:spTree>
@@ -3641,291 +3825,6 @@
 </p:sld>
 </file>
 
-<file path=ppt/slides/slide13.xml><?xml version="1.0" encoding="utf-8"?>
-<p:sld xmlns:a="http://schemas.openxmlformats.org/drawingml/2006/main" xmlns:r="http://schemas.openxmlformats.org/officeDocument/2006/relationships" xmlns:p="http://schemas.openxmlformats.org/presentationml/2006/main">
-  <p:cSld>
-    <p:spTree>
-      <p:nvGrpSpPr>
-        <p:cNvPr id="1" name=""/>
-        <p:cNvGrpSpPr/>
-        <p:nvPr/>
-      </p:nvGrpSpPr>
-      <p:grpSpPr>
-        <a:xfrm>
-          <a:off x="0" y="0"/>
-          <a:ext cx="0" cy="0"/>
-          <a:chOff x="0" y="0"/>
-          <a:chExt cx="0" cy="0"/>
-        </a:xfrm>
-      </p:grpSpPr>
-      <p:sp>
-        <p:nvSpPr>
-          <p:cNvPr id="3" name="Content Placeholder 2"/>
-          <p:cNvSpPr>
-            <a:spLocks noGrp="1"/>
-          </p:cNvSpPr>
-          <p:nvPr>
-            <p:ph idx="1"/>
-          </p:nvPr>
-        </p:nvSpPr>
-        <p:spPr/>
-        <p:txBody>
-          <a:bodyPr/>
-          <a:lstStyle/>
-          <a:p>
-            <a:pPr lvl="0" indent="0" marL="0">
-              <a:buNone/>
-            </a:pPr>
-            <a:r>
-              <a:rPr b="1"/>
-              <a:t>Future Works</a:t>
-            </a:r>
-          </a:p>
-          <a:p>
-            <a:pPr lvl="0"/>
-            <a:r>
-              <a:rPr/>
-              <a:t>Efficient querying: The semantic capabilities of Large Language Models (LLMs) make them a compelling solution for managing the inherent complexity of transparent querying in hybrid storage environments.</a:t>
-            </a:r>
-          </a:p>
-          <a:p>
-            <a:pPr lvl="0" indent="0" marL="0">
-              <a:spcBef>
-                <a:spcPts val="3000"/>
-              </a:spcBef>
-              <a:buNone/>
-            </a:pPr>
-            <a:r>
-              <a:rPr b="1"/>
-              <a:t>Other activities</a:t>
-            </a:r>
-          </a:p>
-        </p:txBody>
-      </p:sp>
-    </p:spTree>
-  </p:cSld>
-</p:sld>
-</file>
-
-<file path=ppt/slides/slide14.xml><?xml version="1.0" encoding="utf-8"?>
-<p:sld xmlns:a="http://schemas.openxmlformats.org/drawingml/2006/main" xmlns:r="http://schemas.openxmlformats.org/officeDocument/2006/relationships" xmlns:p="http://schemas.openxmlformats.org/presentationml/2006/main">
-  <p:cSld>
-    <p:spTree>
-      <p:nvGrpSpPr>
-        <p:cNvPr id="1" name=""/>
-        <p:cNvGrpSpPr/>
-        <p:nvPr/>
-      </p:nvGrpSpPr>
-      <p:grpSpPr>
-        <a:xfrm>
-          <a:off x="0" y="0"/>
-          <a:ext cx="0" cy="0"/>
-          <a:chOff x="0" y="0"/>
-          <a:chExt cx="0" cy="0"/>
-        </a:xfrm>
-      </p:grpSpPr>
-      <p:sp>
-        <p:nvSpPr>
-          <p:cNvPr id="3" name="Content Placeholder 2"/>
-          <p:cNvSpPr>
-            <a:spLocks noGrp="1"/>
-          </p:cNvSpPr>
-          <p:nvPr>
-            <p:ph idx="1" sz="half"/>
-          </p:nvPr>
-        </p:nvSpPr>
-        <p:spPr/>
-        <p:txBody>
-          <a:bodyPr/>
-          <a:lstStyle/>
-          <a:p>
-            <a:pPr lvl="0" indent="0" marL="0">
-              <a:spcBef>
-                <a:spcPts val="3000"/>
-              </a:spcBef>
-              <a:buNone/>
-            </a:pPr>
-            <a:r>
-              <a:rPr b="1"/>
-              <a:t>Tutoring</a:t>
-            </a:r>
-          </a:p>
-          <a:p>
-            <a:pPr lvl="0"/>
-            <a:r>
-              <a:rPr/>
-              <a:t>95631 - MACHINE LEARNING AND DATA MINING - 6 cfu (2023/2024)</a:t>
-            </a:r>
-          </a:p>
-          <a:p>
-            <a:pPr lvl="0"/>
-            <a:r>
-              <a:rPr/>
-              <a:t>95631 - MACHINE LEARNING AND DATA MINING - 6 cfu (2024/2025)</a:t>
-            </a:r>
-          </a:p>
-          <a:p>
-            <a:pPr lvl="0"/>
-            <a:r>
-              <a:rPr/>
-              <a:t>95631 - MACHINE LEARNING AND DATA MINING - 6 cfu (2025/2026)</a:t>
-            </a:r>
-          </a:p>
-          <a:p>
-            <a:pPr lvl="0" indent="0" marL="0">
-              <a:spcBef>
-                <a:spcPts val="3000"/>
-              </a:spcBef>
-              <a:buNone/>
-            </a:pPr>
-            <a:r>
-              <a:rPr b="1"/>
-              <a:t>Summer schools</a:t>
-            </a:r>
-          </a:p>
-          <a:p>
-            <a:pPr lvl="0"/>
-            <a:r>
-              <a:rPr/>
-              <a:t>6th ACM Europe Summer School on Data Science, Ioannina (Greece)</a:t>
-            </a:r>
-          </a:p>
-          <a:p>
-            <a:pPr lvl="1"/>
-            <a:r>
-              <a:rPr/>
-              <a:t>Graph foundatons and Graph Data Science</a:t>
-            </a:r>
-          </a:p>
-          <a:p>
-            <a:pPr lvl="1"/>
-            <a:r>
-              <a:rPr/>
-              <a:t>IoT Edge Computing</a:t>
-            </a:r>
-          </a:p>
-          <a:p>
-            <a:pPr lvl="0" indent="0" marL="0">
-              <a:spcBef>
-                <a:spcPts val="3000"/>
-              </a:spcBef>
-              <a:buNone/>
-            </a:pPr>
-            <a:r>
-              <a:rPr b="1"/>
-              <a:t>Conferences</a:t>
-            </a:r>
-          </a:p>
-          <a:p>
-            <a:pPr lvl="0"/>
-            <a:r>
-              <a:rPr/>
-              <a:t>EDBT/ICDT 2024 Joint Conference</a:t>
-            </a:r>
-          </a:p>
-          <a:p>
-            <a:pPr lvl="0"/>
-            <a:r>
-              <a:rPr/>
-              <a:t>SEBD 2024, 2025</a:t>
-            </a:r>
-          </a:p>
-        </p:txBody>
-      </p:sp>
-      <p:sp>
-        <p:nvSpPr>
-          <p:cNvPr id="4" name="Content Placeholder 3"/>
-          <p:cNvSpPr>
-            <a:spLocks noGrp="1"/>
-          </p:cNvSpPr>
-          <p:nvPr>
-            <p:ph idx="2" sz="half"/>
-          </p:nvPr>
-        </p:nvSpPr>
-        <p:spPr/>
-        <p:txBody>
-          <a:bodyPr/>
-          <a:lstStyle/>
-          <a:p>
-            <a:pPr lvl="0" indent="0" marL="0">
-              <a:spcBef>
-                <a:spcPts val="3000"/>
-              </a:spcBef>
-              <a:buNone/>
-            </a:pPr>
-            <a:r>
-              <a:rPr b="1"/>
-              <a:t>External activities</a:t>
-            </a:r>
-          </a:p>
-          <a:p>
-            <a:pPr lvl="0"/>
-            <a:r>
-              <a:rPr/>
-              <a:t>Teaching Relational Database, 30 hrs, ITS Olivetti (2023/2024)</a:t>
-            </a:r>
-          </a:p>
-          <a:p>
-            <a:pPr lvl="0"/>
-            <a:r>
-              <a:rPr/>
-              <a:t>Teaching NoSQL Database, 30 hrs, ITS Olivetti (2024/2025)</a:t>
-            </a:r>
-          </a:p>
-          <a:p>
-            <a:pPr lvl="0"/>
-            <a:r>
-              <a:rPr/>
-              <a:t>Teaching NoSQL Database, 30 hrs, ITS Olivetti (2025/2026)</a:t>
-            </a:r>
-          </a:p>
-          <a:p>
-            <a:pPr lvl="0"/>
-            <a:r>
-              <a:rPr/>
-              <a:t>Consultancy on Digitalization in Precision Agriculture, iFarming s.r.l.</a:t>
-            </a:r>
-          </a:p>
-          <a:p>
-            <a:pPr lvl="0" indent="0" marL="0">
-              <a:spcBef>
-                <a:spcPts val="3000"/>
-              </a:spcBef>
-              <a:buNone/>
-            </a:pPr>
-            <a:r>
-              <a:rPr b="1"/>
-              <a:t>Bachelor Thesis advisor</a:t>
-            </a:r>
-          </a:p>
-          <a:p>
-            <a:pPr lvl="0"/>
-            <a:r>
-              <a:rPr/>
-              <a:t>Denis Nikaj (Progettazione e prototipazione di un’applicazione web per l’irrigazione di precisione), March 2024.</a:t>
-            </a:r>
-          </a:p>
-          <a:p>
-            <a:pPr lvl="0"/>
-            <a:r>
-              <a:rPr/>
-              <a:t>Davide Speziali (Progettazione e realizzazione di un simulatore per l’irrigazione di precisione), December 2024.</a:t>
-            </a:r>
-          </a:p>
-          <a:p>
-            <a:pPr lvl="0"/>
-            <a:r>
-              <a:rPr/>
-              <a:t>Federico Capponi (Progettazione e prototipazione di un sistema di irrigazione di precisione), July 2025.</a:t>
-            </a:r>
-          </a:p>
-        </p:txBody>
-      </p:sp>
-    </p:spTree>
-  </p:cSld>
-</p:sld>
-</file>
-
 <file path=ppt/slides/slide15.xml><?xml version="1.0" encoding="utf-8"?>
 <p:sld xmlns:a="http://schemas.openxmlformats.org/drawingml/2006/main" xmlns:r="http://schemas.openxmlformats.org/officeDocument/2006/relationships" xmlns:p="http://schemas.openxmlformats.org/presentationml/2006/main">
   <p:cSld>
@@ -3958,59 +3857,307 @@
           <a:bodyPr/>
           <a:lstStyle/>
           <a:p>
-            <a:pPr lvl="0"/>
-            <a:r>
-              <a:rPr/>
-              <a:t>Manca titolo e info miei</a:t>
-            </a:r>
-          </a:p>
-          <a:p>
-            <a:pPr lvl="0"/>
-            <a:r>
-              <a:rPr/>
-              <a:t>Cambia slide 1, fai focus su altra roba</a:t>
-            </a:r>
-          </a:p>
-          <a:p>
-            <a:pPr lvl="0"/>
-            <a:r>
-              <a:rPr/>
-              <a:t>Three year ongoing project</a:t>
-            </a:r>
-          </a:p>
-          <a:p>
-            <a:pPr lvl="0"/>
-            <a:r>
-              <a:rPr/>
-              <a:t>Ongoing or future works</a:t>
-            </a:r>
-          </a:p>
-          <a:p>
-            <a:pPr lvl="0"/>
-            <a:r>
-              <a:rPr/>
-              <a:t>Aggiungi metamodello</a:t>
-            </a:r>
-          </a:p>
-          <a:p>
-            <a:pPr lvl="0"/>
-            <a:r>
-              <a:rPr/>
-              <a:t>SU DT il modello dati è tailored, application based</a:t>
-            </a:r>
-          </a:p>
-          <a:p>
-            <a:pPr lvl="0"/>
-            <a:r>
-              <a:rPr/>
-              <a:t>per muoverci più in alto, dobbiamo muoverci verso domain, e.g. piattaforma precision agriculture.</a:t>
-            </a:r>
-          </a:p>
-          <a:p>
-            <a:pPr lvl="0"/>
-            <a:r>
-              <a:rPr/>
-              <a:t>Poi metamodello, un caso possibile è quello.</a:t>
+            <a:pPr lvl="0" indent="0" marL="0">
+              <a:buNone/>
+            </a:pPr>
+            <a:r>
+              <a:rPr b="1"/>
+              <a:t>Future Works</a:t>
+            </a:r>
+          </a:p>
+          <a:p>
+            <a:pPr lvl="0"/>
+            <a:r>
+              <a:rPr/>
+              <a:t>Efficient querying: The semantic capabilities of Large Language Models (LLMs) make them a compelling solution for managing the inherent complexity of transparent querying in hybrid storage environments.</a:t>
+            </a:r>
+          </a:p>
+          <a:p>
+            <a:pPr lvl="0" indent="0" marL="0">
+              <a:spcBef>
+                <a:spcPts val="3000"/>
+              </a:spcBef>
+              <a:buNone/>
+            </a:pPr>
+            <a:r>
+              <a:rPr b="1"/>
+              <a:t>Methodologies in building digital twins</a:t>
+            </a:r>
+          </a:p>
+          <a:p>
+            <a:pPr lvl="0"/>
+            <a:r>
+              <a:rPr b="1"/>
+              <a:t>Research question</a:t>
+            </a:r>
+            <a:r>
+              <a:rPr/>
+              <a:t>: given a data pipeline, can we identify the set of data platform services required to support it?</a:t>
+            </a:r>
+          </a:p>
+          <a:p>
+            <a:pPr lvl="0" indent="0" marL="0">
+              <a:buNone/>
+            </a:pPr>
+            <a:r>
+              <a:rPr/>
+              <a:t>References:</a:t>
+            </a:r>
+          </a:p>
+          <a:p>
+            <a:pPr lvl="0" indent="0" marL="0">
+              <a:buNone/>
+            </a:pPr>
+            <a:r>
+              <a:rPr/>
+              <a:t>Matteo Francia, Matteo Golfarelli, Manuele Pasini — Towards a Process-Driven Design of Data Platforms. In DOLAP, pp. 28–35, 2024.</a:t>
+            </a:r>
+          </a:p>
+          <a:p>
+            <a:pPr lvl="0" indent="0" marL="0">
+              <a:buNone/>
+            </a:pPr>
+            <a:r>
+              <a:rPr/>
+              <a:t>Matteo Francia, Matteo Golfarelli, Manuele Pasini — Process-Driven Design of Cloud Data Platforms. Information Systems Journal, Manuscript No. INFOSYS-D-24-00444.</a:t>
+            </a:r>
+          </a:p>
+          <a:p>
+            <a:pPr lvl="0"/>
+            <a:r>
+              <a:rPr/>
+              <a:t>But an issue emerged: pipelines of different DTs entail different data models &amp; storage systems, yet they share some of the same recurrent requirements….</a:t>
+            </a:r>
+          </a:p>
+          <a:p>
+            <a:pPr lvl="0" indent="0" marL="0">
+              <a:spcBef>
+                <a:spcPts val="3000"/>
+              </a:spcBef>
+              <a:buNone/>
+            </a:pPr>
+            <a:r>
+              <a:rPr b="1"/>
+              <a:t>Other activities</a:t>
+            </a:r>
+          </a:p>
+        </p:txBody>
+      </p:sp>
+    </p:spTree>
+  </p:cSld>
+</p:sld>
+</file>
+
+<file path=ppt/slides/slide16.xml><?xml version="1.0" encoding="utf-8"?>
+<p:sld xmlns:a="http://schemas.openxmlformats.org/drawingml/2006/main" xmlns:r="http://schemas.openxmlformats.org/officeDocument/2006/relationships" xmlns:p="http://schemas.openxmlformats.org/presentationml/2006/main">
+  <p:cSld>
+    <p:spTree>
+      <p:nvGrpSpPr>
+        <p:cNvPr id="1" name=""/>
+        <p:cNvGrpSpPr/>
+        <p:nvPr/>
+      </p:nvGrpSpPr>
+      <p:grpSpPr>
+        <a:xfrm>
+          <a:off x="0" y="0"/>
+          <a:ext cx="0" cy="0"/>
+          <a:chOff x="0" y="0"/>
+          <a:chExt cx="0" cy="0"/>
+        </a:xfrm>
+      </p:grpSpPr>
+      <p:sp>
+        <p:nvSpPr>
+          <p:cNvPr id="3" name="Content Placeholder 2"/>
+          <p:cNvSpPr>
+            <a:spLocks noGrp="1"/>
+          </p:cNvSpPr>
+          <p:nvPr>
+            <p:ph idx="1" sz="half"/>
+          </p:nvPr>
+        </p:nvSpPr>
+        <p:spPr/>
+        <p:txBody>
+          <a:bodyPr/>
+          <a:lstStyle/>
+          <a:p>
+            <a:pPr lvl="0" indent="0" marL="0">
+              <a:spcBef>
+                <a:spcPts val="3000"/>
+              </a:spcBef>
+              <a:buNone/>
+            </a:pPr>
+            <a:r>
+              <a:rPr b="1"/>
+              <a:t>Tutoring</a:t>
+            </a:r>
+          </a:p>
+          <a:p>
+            <a:pPr lvl="0"/>
+            <a:r>
+              <a:rPr/>
+              <a:t>95631 - MACHINE LEARNING AND DATA MINING - 6 cfu (2023/2024)</a:t>
+            </a:r>
+          </a:p>
+          <a:p>
+            <a:pPr lvl="0"/>
+            <a:r>
+              <a:rPr/>
+              <a:t>95631 - MACHINE LEARNING AND DATA MINING - 6 cfu (2024/2025)</a:t>
+            </a:r>
+          </a:p>
+          <a:p>
+            <a:pPr lvl="0"/>
+            <a:r>
+              <a:rPr/>
+              <a:t>95631 - MACHINE LEARNING AND DATA MINING - 6 cfu (2025/2026)</a:t>
+            </a:r>
+          </a:p>
+          <a:p>
+            <a:pPr lvl="0" indent="0" marL="0">
+              <a:spcBef>
+                <a:spcPts val="3000"/>
+              </a:spcBef>
+              <a:buNone/>
+            </a:pPr>
+            <a:r>
+              <a:rPr b="1"/>
+              <a:t>Summer schools</a:t>
+            </a:r>
+          </a:p>
+          <a:p>
+            <a:pPr lvl="0"/>
+            <a:r>
+              <a:rPr/>
+              <a:t>6th ACM Europe Summer School on Data Science, Ioannina (Greece)</a:t>
+            </a:r>
+          </a:p>
+          <a:p>
+            <a:pPr lvl="1"/>
+            <a:r>
+              <a:rPr/>
+              <a:t>Graph foundatons and Graph Data Science</a:t>
+            </a:r>
+          </a:p>
+          <a:p>
+            <a:pPr lvl="1"/>
+            <a:r>
+              <a:rPr/>
+              <a:t>IoT Edge Computing</a:t>
+            </a:r>
+          </a:p>
+          <a:p>
+            <a:pPr lvl="0" indent="0" marL="0">
+              <a:spcBef>
+                <a:spcPts val="3000"/>
+              </a:spcBef>
+              <a:buNone/>
+            </a:pPr>
+            <a:r>
+              <a:rPr b="1"/>
+              <a:t>Conferences</a:t>
+            </a:r>
+          </a:p>
+          <a:p>
+            <a:pPr lvl="0"/>
+            <a:r>
+              <a:rPr/>
+              <a:t>EDBT/ICDT 2024 Joint Conference</a:t>
+            </a:r>
+          </a:p>
+          <a:p>
+            <a:pPr lvl="0"/>
+            <a:r>
+              <a:rPr/>
+              <a:t>SEBD 2024, 2025</a:t>
+            </a:r>
+          </a:p>
+        </p:txBody>
+      </p:sp>
+      <p:sp>
+        <p:nvSpPr>
+          <p:cNvPr id="4" name="Content Placeholder 3"/>
+          <p:cNvSpPr>
+            <a:spLocks noGrp="1"/>
+          </p:cNvSpPr>
+          <p:nvPr>
+            <p:ph idx="2" sz="half"/>
+          </p:nvPr>
+        </p:nvSpPr>
+        <p:spPr/>
+        <p:txBody>
+          <a:bodyPr/>
+          <a:lstStyle/>
+          <a:p>
+            <a:pPr lvl="0" indent="0" marL="0">
+              <a:spcBef>
+                <a:spcPts val="3000"/>
+              </a:spcBef>
+              <a:buNone/>
+            </a:pPr>
+            <a:r>
+              <a:rPr b="1"/>
+              <a:t>External activities</a:t>
+            </a:r>
+          </a:p>
+          <a:p>
+            <a:pPr lvl="0"/>
+            <a:r>
+              <a:rPr/>
+              <a:t>Teaching Relational Database, 30 hrs, ITS Olivetti (2023/2024)</a:t>
+            </a:r>
+          </a:p>
+          <a:p>
+            <a:pPr lvl="0"/>
+            <a:r>
+              <a:rPr/>
+              <a:t>Teaching NoSQL Database, 30 hrs, ITS Olivetti (2024/2025)</a:t>
+            </a:r>
+          </a:p>
+          <a:p>
+            <a:pPr lvl="0"/>
+            <a:r>
+              <a:rPr/>
+              <a:t>Teaching NoSQL Database, 30 hrs, ITS Olivetti (2025/2026)</a:t>
+            </a:r>
+          </a:p>
+          <a:p>
+            <a:pPr lvl="0"/>
+            <a:r>
+              <a:rPr/>
+              <a:t>Consultancy on Digitalization in Precision Agriculture, iFarming s.r.l.</a:t>
+            </a:r>
+          </a:p>
+          <a:p>
+            <a:pPr lvl="0" indent="0" marL="0">
+              <a:spcBef>
+                <a:spcPts val="3000"/>
+              </a:spcBef>
+              <a:buNone/>
+            </a:pPr>
+            <a:r>
+              <a:rPr b="1"/>
+              <a:t>Bachelor Thesis advisor</a:t>
+            </a:r>
+          </a:p>
+          <a:p>
+            <a:pPr lvl="0"/>
+            <a:r>
+              <a:rPr/>
+              <a:t>Denis Nikaj (Progettazione e prototipazione di un’applicazione web per l’irrigazione di precisione), March 2024.</a:t>
+            </a:r>
+          </a:p>
+          <a:p>
+            <a:pPr lvl="0"/>
+            <a:r>
+              <a:rPr/>
+              <a:t>Davide Speziali (Progettazione e realizzazione di un simulatore per l’irrigazione di precisione), December 2024.</a:t>
+            </a:r>
+          </a:p>
+          <a:p>
+            <a:pPr lvl="0"/>
+            <a:r>
+              <a:rPr/>
+              <a:t>Federico Capponi (Progettazione e prototipazione di un sistema di irrigazione di precisione), July 2025.</a:t>
             </a:r>
           </a:p>
         </p:txBody>
@@ -4420,7 +4567,7 @@
             <a:pPr lvl="0"/>
             <a:r>
               <a:rPr/>
-              <a:t>Five year ongoing project (within PNRR - </a:t>
+              <a:t>Three year ongoing project (within PNRR - </a:t>
             </a:r>
             <a:r>
               <a:rPr>
@@ -4675,49 +4822,32 @@
             </a:pPr>
             <a:r>
               <a:rPr b="1"/>
-              <a:t>A Data Platform fostering collaboration between DTs</a:t>
-            </a:r>
-          </a:p>
-          <a:p>
-            <a:pPr lvl="0"/>
-            <a:r>
-              <a:rPr/>
-              <a:t>Within Agritech - Spoke 3, a data platform fostering integration across research projects has been developed.</a:t>
-            </a:r>
-          </a:p>
-          <a:p>
-            <a:pPr lvl="0"/>
-            <a:r>
-              <a:rPr/>
-              <a:t>When defining integration policies and standards, several recurrent data requirements were identified:</a:t>
-            </a:r>
-          </a:p>
-          <a:p>
-            <a:pPr lvl="1"/>
-            <a:r>
-              <a:rPr/>
-              <a:t>Heterogeneous data: from structured to unstructured (including images).</a:t>
-            </a:r>
-          </a:p>
-          <a:p>
-            <a:pPr lvl="1"/>
-            <a:r>
-              <a:rPr/>
-              <a:t>Interconnected data: capturing physical entities together with the IoT networks describing them.</a:t>
-            </a:r>
-          </a:p>
-          <a:p>
-            <a:pPr lvl="1"/>
-            <a:r>
-              <a:rPr/>
-              <a:t>Temporal aspects: datasets often evolve as time series.</a:t>
-            </a:r>
-          </a:p>
-          <a:p>
-            <a:pPr lvl="1"/>
-            <a:r>
-              <a:rPr/>
-              <a:t>Spatial aspects: data are often geo-referenced.</a:t>
+              <a:t>From application-oriented to domain-oriented</a:t>
+            </a:r>
+          </a:p>
+          <a:p>
+            <a:pPr lvl="0"/>
+            <a:r>
+              <a:rPr/>
+              <a:t>The Precision Agriculture Digital Twin is still a standalone application</a:t>
+            </a:r>
+          </a:p>
+          <a:p>
+            <a:pPr lvl="0"/>
+            <a:r>
+              <a:rPr b="1"/>
+              <a:t>Research Question 1.</a:t>
+            </a:r>
+            <a:r>
+              <a:rPr/>
+              <a:t>: Can we move from application-level DT platforms to domain-level platforms?</a:t>
+            </a:r>
+          </a:p>
+          <a:p>
+            <a:pPr lvl="0"/>
+            <a:r>
+              <a:rPr/>
+              <a:t>A first attempt was made within the Agriculture domain:</a:t>
             </a:r>
           </a:p>
         </p:txBody>
@@ -4746,7 +4876,7 @@
       </p:grpSpPr>
       <p:pic>
         <p:nvPicPr>
-          <p:cNvPr descr="https://github.com/ManuelePasini/slides-markdown/blob/master/slides/images/phd2ndyear/agriplatform.png?raw=true" id="0" name="Picture 1"/>
+          <p:cNvPr descr="https://github.com/ManuelePasini/slides-markdown/blob/master/slides/images/phd2ndyear/dm.png?raw=true" id="0" name="Picture 1"/>
           <p:cNvPicPr>
             <a:picLocks noGrp="1" noChangeAspect="1"/>
           </p:cNvPicPr>
@@ -4760,8 +4890,8 @@
         </p:blipFill>
         <p:spPr bwMode="auto">
           <a:xfrm>
-            <a:off x="457200" y="1460500"/>
-            <a:ext cx="4038600" cy="2349500"/>
+            <a:off x="457200" y="1320800"/>
+            <a:ext cx="4038600" cy="2641600"/>
           </a:xfrm>
           <a:prstGeom prst="rect">
             <a:avLst/>
@@ -4799,58 +4929,67 @@
             </a:pPr>
             <a:r>
               <a:rPr/>
-              <a:t>Excerpt of the Agricolture Data Platform</a:t>
-            </a:r>
-          </a:p>
-        </p:txBody>
-      </p:sp>
-      <p:sp>
-        <p:nvSpPr>
-          <p:cNvPr id="4" name="Content Placeholder 3"/>
-          <p:cNvSpPr>
-            <a:spLocks noGrp="1"/>
-          </p:cNvSpPr>
-          <p:nvPr>
-            <p:ph idx="2" sz="half"/>
-          </p:nvPr>
-        </p:nvSpPr>
-        <p:spPr/>
-        <p:txBody>
-          <a:bodyPr/>
-          <a:lstStyle/>
-          <a:p>
-            <a:pPr lvl="0"/>
-            <a:r>
-              <a:rPr/>
-              <a:t>General purpose: supporting heterogeneous data through heterogeneous storage systems;</a:t>
-            </a:r>
-          </a:p>
-          <a:p>
-            <a:pPr lvl="0"/>
-            <a:r>
-              <a:rPr/>
-              <a:t>Interoperable: Interoperable: integration and sharing via common data models (e.g., </a:t>
-            </a:r>
-            <a:r>
-              <a:rPr>
-                <a:hlinkClick r:id="rId3"/>
-              </a:rPr>
-              <a:t>FIWARE</a:t>
-            </a:r>
-            <a:r>
-              <a:rPr/>
-              <a:t>);</a:t>
-            </a:r>
-          </a:p>
-          <a:p>
-            <a:pPr lvl="0"/>
-            <a:r>
-              <a:rPr b="1"/>
-              <a:t>Ongoing work</a:t>
-            </a:r>
-            <a:r>
-              <a:rPr/>
-              <a:t>: supporting and sharing data processes (e.g., donwload ESA images) and applications.</a:t>
+              <a:t>Precision Agriculture data model</a:t>
+            </a:r>
+          </a:p>
+        </p:txBody>
+      </p:sp>
+      <p:pic>
+        <p:nvPicPr>
+          <p:cNvPr descr="https://raw.githubusercontent.com/ManuelePasini/slides-markdown/refs/heads/master/slides/images/phd2ndyear/platform.svg" id="0" name="Picture 1"/>
+          <p:cNvPicPr>
+            <a:picLocks noGrp="1" noChangeAspect="1"/>
+          </p:cNvPicPr>
+          <p:nvPr/>
+        </p:nvPicPr>
+        <p:blipFill>
+          <a:blip r:embed="rId3"/>
+          <a:stretch>
+            <a:fillRect/>
+          </a:stretch>
+        </p:blipFill>
+        <p:spPr bwMode="auto">
+          <a:xfrm>
+            <a:off x="5105400" y="1193800"/>
+            <a:ext cx="3124200" cy="2882900"/>
+          </a:xfrm>
+          <a:prstGeom prst="rect">
+            <a:avLst/>
+          </a:prstGeom>
+          <a:noFill/>
+          <a:ln w="9525">
+            <a:noFill/>
+            <a:headEnd/>
+            <a:tailEnd/>
+          </a:ln>
+        </p:spPr>
+      </p:pic>
+      <p:sp>
+        <p:nvSpPr>
+          <p:cNvPr id="1" name="TextBox 3"/>
+          <p:cNvSpPr txBox="1"/>
+          <p:nvPr/>
+        </p:nvSpPr>
+        <p:spPr>
+          <a:xfrm>
+            <a:off x="4648200" y="4076700"/>
+            <a:ext cx="4038600" cy="508000"/>
+          </a:xfrm>
+          <a:prstGeom prst="rect">
+            <a:avLst/>
+          </a:prstGeom>
+          <a:noFill/>
+        </p:spPr>
+        <p:txBody>
+          <a:bodyPr/>
+          <a:lstStyle/>
+          <a:p>
+            <a:pPr lvl="0" indent="0" marL="0" algn="ctr">
+              <a:buNone/>
+            </a:pPr>
+            <a:r>
+              <a:rPr/>
+              <a:t>Component schema of the Agriculture Data Platform</a:t>
             </a:r>
           </a:p>
         </p:txBody>
@@ -4900,84 +5039,49 @@
             </a:pPr>
             <a:r>
               <a:rPr b="1"/>
-              <a:t>From application-oriented to domain-oriented</a:t>
-            </a:r>
-          </a:p>
-          <a:p>
-            <a:pPr lvl="0"/>
-            <a:r>
-              <a:rPr b="1"/>
-              <a:t>Research Question 1.</a:t>
-            </a:r>
-            <a:r>
-              <a:rPr/>
-              <a:t>: Can we move from application-level DT platforms to domain-level platforms?</a:t>
-            </a:r>
-          </a:p>
-          <a:p>
-            <a:pPr lvl="0" indent="0" marL="0">
-              <a:buNone/>
-            </a:pPr>
-            <a:r>
-              <a:rPr/>
-              <a:t>Takeaway: a DT can be represented as a data pipeline that collects, processes, and exploits data.</a:t>
-            </a:r>
-          </a:p>
-          <a:p>
-            <a:pPr lvl="0"/>
-            <a:r>
-              <a:rPr b="1"/>
-              <a:t>Research question 2.</a:t>
-            </a:r>
-            <a:r>
-              <a:rPr/>
-              <a:t>: given a data pipeline, can we identify the set of data platform services required to support it?</a:t>
-            </a:r>
-          </a:p>
-          <a:p>
-            <a:pPr lvl="0" indent="0" marL="0">
-              <a:buNone/>
-            </a:pPr>
-            <a:r>
-              <a:rPr/>
-              <a:t>References:</a:t>
-            </a:r>
-          </a:p>
-          <a:p>
-            <a:pPr lvl="0" indent="0" marL="0">
-              <a:buNone/>
-            </a:pPr>
-            <a:r>
-              <a:rPr/>
-              <a:t>Matteo Francia, Matteo Golfarelli, Manuele Pasini — Towards a Process-Driven Design of Data Platforms. In DOLAP, pp. 28–35, 2024.</a:t>
-            </a:r>
-          </a:p>
-          <a:p>
-            <a:pPr lvl="0" indent="0" marL="0">
-              <a:buNone/>
-            </a:pPr>
-            <a:r>
-              <a:rPr/>
-              <a:t>Matteo Francia, Matteo Golfarelli, Manuele Pasini — Process-Driven Design of Cloud Data Platforms. Information Systems Journal, Manuscript No. INFOSYS-D-24-00444.</a:t>
-            </a:r>
-          </a:p>
-          <a:p>
-            <a:pPr lvl="0"/>
-            <a:r>
-              <a:rPr/>
-              <a:t>But an issue emerged: pipelines of different DTs entail different data models &amp; storage systems, yet they share some of the same recurrent requirements….</a:t>
-            </a:r>
-          </a:p>
-          <a:p>
-            <a:pPr lvl="0" indent="0" marL="0">
-              <a:spcBef>
-                <a:spcPts val="3000"/>
-              </a:spcBef>
-              <a:buNone/>
-            </a:pPr>
-            <a:r>
-              <a:rPr b="1"/>
-              <a:t>Modelling Digital Twin Data</a:t>
+              <a:t>A Data Platform fostering collaboration between DTs</a:t>
+            </a:r>
+          </a:p>
+          <a:p>
+            <a:pPr lvl="0"/>
+            <a:r>
+              <a:rPr/>
+              <a:t>Within Agritech - Spoke 3, a data platform fostering integration across research projects has been developed.</a:t>
+            </a:r>
+          </a:p>
+          <a:p>
+            <a:pPr lvl="0"/>
+            <a:r>
+              <a:rPr/>
+              <a:t>When defining integration policies and standards, several recurrent data requirements were identified:</a:t>
+            </a:r>
+          </a:p>
+          <a:p>
+            <a:pPr lvl="1"/>
+            <a:r>
+              <a:rPr/>
+              <a:t>Heterogeneous data: from structured to unstructured (including images).</a:t>
+            </a:r>
+          </a:p>
+          <a:p>
+            <a:pPr lvl="1"/>
+            <a:r>
+              <a:rPr/>
+              <a:t>Interconnected data: capturing physical entities together with the IoT networks describing them.</a:t>
+            </a:r>
+          </a:p>
+          <a:p>
+            <a:pPr lvl="1"/>
+            <a:r>
+              <a:rPr/>
+              <a:t>Temporal aspects: datasets often evolve as time series.</a:t>
+            </a:r>
+          </a:p>
+          <a:p>
+            <a:pPr lvl="1"/>
+            <a:r>
+              <a:rPr/>
+              <a:t>Spatial aspects: data are often geo-referenced.</a:t>
             </a:r>
           </a:p>
         </p:txBody>

</xml_diff>

<commit_message>
Deploying to gh-pages from @ ManuelePasini/slides-markdown@f5265e30b8866eb2b8cd99e86eee0f869d5f9bac 🚀
</commit_message>
<xml_diff>
--- a/phd_secondyear.pptx
+++ b/phd_secondyear.pptx
@@ -3193,24 +3193,16 @@
           <a:bodyPr/>
           <a:lstStyle/>
           <a:p>
-            <a:pPr lvl="0"/>
-            <a:r>
-              <a:rPr/>
-              <a:t>Manuele Pasini - Ph.D. Student</a:t>
-            </a:r>
-          </a:p>
-          <a:p>
-            <a:pPr lvl="1"/>
-            <a:r>
-              <a:rPr/>
-              <a:t>Business Intelligence Group (B.I.G.)</a:t>
-            </a:r>
-          </a:p>
-          <a:p>
-            <a:pPr lvl="1"/>
-            <a:r>
-              <a:rPr/>
-              <a:t>Supervisor: Prof. Matteo Golfarelli</a:t>
+            <a:pPr lvl="0" indent="0">
+              <a:buNone/>
+            </a:pPr>
+            <a:r>
+              <a:rPr>
+                <a:latin typeface="Courier"/>
+              </a:rPr>
+              <a:t>- **Manuele Pasini**
+- [Business Intelligence Group](https://big.csr.unibo.it/) (B.I.G.)
+- Supervisor: Prof. Matteo Golfarelli</a:t>
             </a:r>
           </a:p>
           <a:p>
@@ -3881,7 +3873,14 @@
             </a:pPr>
             <a:r>
               <a:rPr b="1"/>
-              <a:t>Methodologies in building digital twins</a:t>
+              <a:t>Methodology aspects</a:t>
+            </a:r>
+          </a:p>
+          <a:p>
+            <a:pPr lvl="0"/>
+            <a:r>
+              <a:rPr/>
+              <a:t>Even within Cloud Service Providers and for expert designers, it is non trivial to determine the set of services enabling a data pipeline.</a:t>
             </a:r>
           </a:p>
           <a:p>
@@ -3920,13 +3919,6 @@
             <a:r>
               <a:rPr/>
               <a:t>Matteo Francia, Matteo Golfarelli, Manuele Pasini — Process-Driven Design of Cloud Data Platforms. Information Systems Journal, Manuscript No. INFOSYS-D-24-00444.</a:t>
-            </a:r>
-          </a:p>
-          <a:p>
-            <a:pPr lvl="0"/>
-            <a:r>
-              <a:rPr/>
-              <a:t>But an issue emerged: pipelines of different DTs entail different data models &amp; storage systems, yet they share some of the same recurrent requirements….</a:t>
             </a:r>
           </a:p>
           <a:p>
@@ -4829,7 +4821,7 @@
             <a:pPr lvl="0"/>
             <a:r>
               <a:rPr/>
-              <a:t>The Precision Agriculture Digital Twin is still a standalone application</a:t>
+              <a:t>The precision agriculture Digital Twin is still a standalone application</a:t>
             </a:r>
           </a:p>
           <a:p>
@@ -4840,14 +4832,14 @@
             </a:r>
             <a:r>
               <a:rPr/>
-              <a:t>: Can we move from application-level DT platforms to domain-level platforms?</a:t>
+              <a:t>: can we move from application-level DT to domain-level DT platforms?</a:t>
             </a:r>
           </a:p>
           <a:p>
             <a:pPr lvl="0"/>
             <a:r>
               <a:rPr/>
-              <a:t>A first attempt was made within the Agriculture domain:</a:t>
+              <a:t>A first attempt was made within the agriculture domain:</a:t>
             </a:r>
           </a:p>
         </p:txBody>
@@ -4929,7 +4921,7 @@
             </a:pPr>
             <a:r>
               <a:rPr/>
-              <a:t>Precision Agriculture data model</a:t>
+              <a:t>Precision agriculture “relational” data model</a:t>
             </a:r>
           </a:p>
         </p:txBody>

</xml_diff>

<commit_message>
Deploying to gh-pages from @ ManuelePasini/slides-markdown@52a033e884e7ef9374a05b65fad9bf9f10709394 🚀
</commit_message>
<xml_diff>
--- a/phd_secondyear.pptx
+++ b/phd_secondyear.pptx
@@ -4821,7 +4821,14 @@
             <a:pPr lvl="0"/>
             <a:r>
               <a:rPr/>
-              <a:t>The precision agriculture Digital Twin is still a standalone application</a:t>
+              <a:t>The precision agriculture digital twin is still a standalone application with a tailored data model.</a:t>
+            </a:r>
+          </a:p>
+          <a:p>
+            <a:pPr lvl="0"/>
+            <a:r>
+              <a:rPr/>
+              <a:t>Integration with different agriculture application is still limited…</a:t>
             </a:r>
           </a:p>
           <a:p>

</xml_diff>

<commit_message>
Deploying to gh-pages from @ ManuelePasini/slides-markdown@9406bb36372081782bc1d1cf2549c9334583f0ed 🚀
</commit_message>
<xml_diff>
--- a/phd_secondyear.pptx
+++ b/phd_secondyear.pptx
@@ -3880,7 +3880,21 @@
             <a:pPr lvl="0"/>
             <a:r>
               <a:rPr/>
-              <a:t>Even within Cloud Service Providers and for expert designers, it is non trivial to determine the set of services enabling a data pipeline.</a:t>
+              <a:t>Given a DTP, how do we efficiently deploy digital twin applications on top of it?</a:t>
+            </a:r>
+          </a:p>
+          <a:p>
+            <a:pPr lvl="0"/>
+            <a:r>
+              <a:rPr/>
+              <a:t>An digital twin application can be as the set of sequential data processes that enable a digital twin.</a:t>
+            </a:r>
+          </a:p>
+          <a:p>
+            <a:pPr lvl="0"/>
+            <a:r>
+              <a:rPr/>
+              <a:t>Even within Cloud Service Providers and for expert designers, it is non trivial to determine the set of services enabling an a data pipeline.</a:t>
             </a:r>
           </a:p>
           <a:p>
@@ -4839,7 +4853,7 @@
             </a:r>
             <a:r>
               <a:rPr/>
-              <a:t>: can we move from application-level DT to domain-level DT platforms?</a:t>
+              <a:t>: can we move from application-level DT to domain-level Digital Twin Platforms (DTP)?</a:t>
             </a:r>
           </a:p>
           <a:p>

</xml_diff>

<commit_message>
Deploying to gh-pages from @ ManuelePasini/slides-markdown@0941f6f11d13cf24626be9e7c9f15a4e5de3dec9 🚀
</commit_message>
<xml_diff>
--- a/phd_secondyear.pptx
+++ b/phd_secondyear.pptx
@@ -3193,16 +3193,30 @@
           <a:bodyPr/>
           <a:lstStyle/>
           <a:p>
-            <a:pPr lvl="0" indent="0">
-              <a:buNone/>
-            </a:pPr>
+            <a:pPr lvl="0"/>
+            <a:r>
+              <a:rPr b="1"/>
+              <a:t>Manuele Pasini</a:t>
+            </a:r>
+          </a:p>
+          <a:p>
+            <a:pPr lvl="1"/>
             <a:r>
               <a:rPr>
-                <a:latin typeface="Courier"/>
+                <a:hlinkClick r:id="rId2"/>
               </a:rPr>
-              <a:t>- **Manuele Pasini**
-- [Business Intelligence Group](https://big.csr.unibo.it/) (B.I.G.)
-- Supervisor: Prof. Matteo Golfarelli</a:t>
+              <a:t>Business Intelligence Group</a:t>
+            </a:r>
+            <a:r>
+              <a:rPr/>
+              <a:t> (B.I.G.)</a:t>
+            </a:r>
+          </a:p>
+          <a:p>
+            <a:pPr lvl="1"/>
+            <a:r>
+              <a:rPr/>
+              <a:t>Supervisor: Prof. Matteo Golfarelli</a:t>
             </a:r>
           </a:p>
           <a:p>

</xml_diff>

<commit_message>
Deploying to gh-pages from @ ManuelePasini/slides-markdown@de2242f36c2df18ba4ad601d0b85361a79da1b7c 🚀
</commit_message>
<xml_diff>
--- a/phd_secondyear.pptx
+++ b/phd_secondyear.pptx
@@ -3242,14 +3242,14 @@
             <a:pPr lvl="0"/>
             <a:r>
               <a:rPr/>
-              <a:t>4 components: phyisical model, virtual model, communication services and the data</a:t>
-            </a:r>
-          </a:p>
-          <a:p>
-            <a:pPr lvl="0"/>
-            <a:r>
-              <a:rPr/>
-              <a:t>As of today, they result as standalone applications</a:t>
+              <a:t>Four key components: physical model, virtual model, data, and communication services.</a:t>
+            </a:r>
+          </a:p>
+          <a:p>
+            <a:pPr lvl="0"/>
+            <a:r>
+              <a:rPr/>
+              <a:t>Currently mostly standalone systems with limited interoperability, especially in collected and exploited data.</a:t>
             </a:r>
           </a:p>
         </p:txBody>

</xml_diff>

<commit_message>
Deploying to gh-pages from @ ManuelePasini/slides-markdown@0d9f2ebf9c0e0e792b0848a642635c92484cd81b 🚀
</commit_message>
<xml_diff>
--- a/phd_secondyear.pptx
+++ b/phd_secondyear.pptx
@@ -3207,10 +3207,6 @@
               </a:rPr>
               <a:t>Business Intelligence Group</a:t>
             </a:r>
-            <a:r>
-              <a:rPr/>
-              <a:t> (B.I.G.)</a:t>
-            </a:r>
           </a:p>
           <a:p>
             <a:pPr lvl="1"/>
@@ -3894,21 +3890,21 @@
             <a:pPr lvl="0"/>
             <a:r>
               <a:rPr/>
-              <a:t>Given a DTP, how do we efficiently deploy digital twin applications on top of it?</a:t>
-            </a:r>
-          </a:p>
-          <a:p>
-            <a:pPr lvl="0"/>
-            <a:r>
-              <a:rPr/>
-              <a:t>An digital twin application can be as the set of sequential data processes that enable a digital twin.</a:t>
-            </a:r>
-          </a:p>
-          <a:p>
-            <a:pPr lvl="0"/>
-            <a:r>
-              <a:rPr/>
-              <a:t>Even within Cloud Service Providers and for expert designers, it is non trivial to determine the set of services enabling an a data pipeline.</a:t>
+              <a:t>How can we efficiently deploy digital twin applications on a DTP?</a:t>
+            </a:r>
+          </a:p>
+          <a:p>
+            <a:pPr lvl="0"/>
+            <a:r>
+              <a:rPr/>
+              <a:t>A digital twin application is essentially a sequence of data processes powering its functionality.</a:t>
+            </a:r>
+          </a:p>
+          <a:p>
+            <a:pPr lvl="0"/>
+            <a:r>
+              <a:rPr/>
+              <a:t>Even for experts and within cloud environments, identifying the right services for a data pipeline is far from trivial.</a:t>
             </a:r>
           </a:p>
           <a:p>

</xml_diff>

<commit_message>
Deploying to gh-pages from @ ManuelePasini/slides-markdown@0a436b6c449b677b8226afc990dcad9585ffdf0e 🚀
</commit_message>
<xml_diff>
--- a/phd_secondyear.pptx
+++ b/phd_secondyear.pptx
@@ -3197,6 +3197,10 @@
             <a:r>
               <a:rPr b="1"/>
               <a:t>Manuele Pasini</a:t>
+            </a:r>
+            <a:r>
+              <a:rPr/>
+              <a:t>, Student ID: 0001129119</a:t>
             </a:r>
           </a:p>
           <a:p>

</xml_diff>

<commit_message>
Deploying to gh-pages from @ ManuelePasini/slides-markdown@5a3bc32dfcba72d2c3cf7a0acf8c929191da8f9e 🚀
</commit_message>
<xml_diff>
--- a/phd_secondyear.pptx
+++ b/phd_secondyear.pptx
@@ -3249,7 +3249,7 @@
             <a:pPr lvl="0"/>
             <a:r>
               <a:rPr/>
-              <a:t>Mostly standalone systems with limited or none data interoperability.</a:t>
+              <a:t>Mostly standalone, application-oriented systems with limited or none data interoperability.</a:t>
             </a:r>
           </a:p>
         </p:txBody>
@@ -3351,6 +3351,15 @@
           <a:bodyPr/>
           <a:lstStyle/>
           <a:p>
+            <a:pPr lvl="0" indent="0" marL="0">
+              <a:buNone/>
+            </a:pPr>
+            <a:r>
+              <a:rPr b="1"/>
+              <a:t>Key aspects</a:t>
+            </a:r>
+          </a:p>
+          <a:p>
             <a:pPr lvl="0"/>
             <a:r>
               <a:rPr/>
@@ -4376,7 +4385,7 @@
             <a:pPr lvl="0"/>
             <a:r>
               <a:rPr/>
-              <a:t>The role of data as a core component of Digital Twins is increasingly recognized…</a:t>
+              <a:t>The role of data as a core component in Digital Twins is increasingly recognized…</a:t>
             </a:r>
           </a:p>
           <a:p>
@@ -4502,7 +4511,7 @@
             <a:pPr lvl="1"/>
             <a:r>
               <a:rPr/>
-              <a:t>Each solution develops its own data model and storage system;</a:t>
+              <a:t>Each solution is independent in both data modelling and semantics</a:t>
             </a:r>
           </a:p>
           <a:p>
@@ -4516,7 +4525,7 @@
             <a:pPr lvl="1"/>
             <a:r>
               <a:rPr/>
-              <a:t>Capabilities of DTs are thus limited;</a:t>
+              <a:t>Capabilities of DTs are thus limited.</a:t>
             </a:r>
           </a:p>
           <a:p>
@@ -4580,7 +4589,7 @@
             </a:pPr>
             <a:r>
               <a:rPr b="1"/>
-              <a:t>A Digital Twin for Precision Agriculture</a:t>
+              <a:t>A Digital Twin in Precision Agriculture</a:t>
             </a:r>
           </a:p>
           <a:p>
@@ -4849,7 +4858,7 @@
             <a:pPr lvl="0"/>
             <a:r>
               <a:rPr/>
-              <a:t>The precision agriculture digital twin is still a standalone application with a tailored data model.</a:t>
+              <a:t>The precision irrigation digital twin is still a standalone system with a tailored data model and semantics.</a:t>
             </a:r>
           </a:p>
           <a:p>
@@ -4867,7 +4876,7 @@
             </a:r>
             <a:r>
               <a:rPr/>
-              <a:t>: can we move from application-level DT to domain-level Digital Twin Platforms (DTP)?</a:t>
+              <a:t>: can we move from application-level DT to domain-level Digital Twin Platforms (DTP) that can facilitate standardization and integration of data?</a:t>
             </a:r>
           </a:p>
           <a:p>
@@ -4956,7 +4965,7 @@
             </a:pPr>
             <a:r>
               <a:rPr/>
-              <a:t>Precision agriculture “relational” data model</a:t>
+              <a:t>Precision agriculture UML data model</a:t>
             </a:r>
           </a:p>
         </p:txBody>

</xml_diff>

<commit_message>
Deploying to gh-pages from @ ManuelePasini/slides-markdown@979b80ef42d85381e9513275f10735d281a0d7dd 🚀
</commit_message>
<xml_diff>
--- a/phd_secondyear.pptx
+++ b/phd_secondyear.pptx
@@ -3249,7 +3249,7 @@
             <a:pPr lvl="0"/>
             <a:r>
               <a:rPr/>
-              <a:t>Mostly standalone, application-oriented systems with limited or none data interoperability.</a:t>
+              <a:t>Mostly standalone, application-oriented systems with limited or none interoperability, in both data and processes.</a:t>
             </a:r>
           </a:p>
         </p:txBody>
@@ -3486,7 +3486,7 @@
             <a:pPr lvl="0"/>
             <a:r>
               <a:rPr/>
-              <a:t>DT data involve highly interconnected entitieS (e.g., a fruit tree and the IoT network describing it), suggesting the use of graph data layout for efficient storage and querying…</a:t>
+              <a:t>DT data involve highly interconnected entities (e.g., a fruit tree and the IoT network describing it), suggesting the use of graph data layout for efficient storage and querying…</a:t>
             </a:r>
           </a:p>
           <a:p>
@@ -3508,13 +3508,6 @@
             <a:r>
               <a:rPr/>
               <a:t>… but fall short in capturing the complex inter-entity dynamics.</a:t>
-            </a:r>
-          </a:p>
-          <a:p>
-            <a:pPr lvl="0"/>
-            <a:r>
-              <a:rPr/>
-              <a:t>Even the Data Platform Design methodology suggested different architectures tailored to each DT…</a:t>
             </a:r>
           </a:p>
           <a:p>
@@ -3910,14 +3903,14 @@
             <a:pPr lvl="0"/>
             <a:r>
               <a:rPr/>
-              <a:t>A digital twin application is essentially a sequence of data processes powering its functionality.</a:t>
-            </a:r>
-          </a:p>
-          <a:p>
-            <a:pPr lvl="0"/>
-            <a:r>
-              <a:rPr/>
-              <a:t>Even for experts and within cloud environments, identifying the right services for a data pipeline is far from trivial.</a:t>
+              <a:t>A digital twin application is essentially a sequence of data processes powering its functionalities.</a:t>
+            </a:r>
+          </a:p>
+          <a:p>
+            <a:pPr lvl="0"/>
+            <a:r>
+              <a:rPr/>
+              <a:t>Even for experts and within cloud environments, identifying the right services enabling a data pipeline is far from trivial.</a:t>
             </a:r>
           </a:p>
           <a:p>
@@ -3928,7 +3921,7 @@
             </a:r>
             <a:r>
               <a:rPr/>
-              <a:t>: given a data pipeline, can we identify the set of data platform services required to support it?</a:t>
+              <a:t>: given a data pipeline, can we define a methodology to identify the set of data platform services required to support it?</a:t>
             </a:r>
           </a:p>
           <a:p>
@@ -4511,7 +4504,7 @@
             <a:pPr lvl="1"/>
             <a:r>
               <a:rPr/>
-              <a:t>Each solution is independent in both data modelling and semantics</a:t>
+              <a:t>Each solution is independent in both data modelling and semantics;</a:t>
             </a:r>
           </a:p>
           <a:p>
@@ -4865,7 +4858,7 @@
             <a:pPr lvl="0"/>
             <a:r>
               <a:rPr/>
-              <a:t>Integration with different agriculture application is still limited…</a:t>
+              <a:t>Integration with different application in the agriculture domain is still limited…</a:t>
             </a:r>
           </a:p>
           <a:p>
@@ -4876,7 +4869,7 @@
             </a:r>
             <a:r>
               <a:rPr/>
-              <a:t>: can we move from application-level DT to domain-level Digital Twin Platforms (DTP) that can facilitate standardization and integration of data?</a:t>
+              <a:t>: can we move from application-level DT to domain-level Digital Twin Platforms (DTP) that can facilitate the standardization and integration of DT applications?</a:t>
             </a:r>
           </a:p>
           <a:p>
@@ -4912,7 +4905,7 @@
       </p:grpSpPr>
       <p:pic>
         <p:nvPicPr>
-          <p:cNvPr descr="https://github.com/ManuelePasini/slides-markdown/blob/master/slides/images/phd2ndyear/dm.png?raw=true" id="0" name="Picture 1"/>
+          <p:cNvPr descr="https://raw.githubusercontent.com/ManuelePasini/slides-markdown/refs/heads/master/slides/images/phd2ndyear/agritech_dw.svg" id="0" name="Picture 1"/>
           <p:cNvPicPr>
             <a:picLocks noGrp="1" noChangeAspect="1"/>
           </p:cNvPicPr>
@@ -4965,7 +4958,7 @@
             </a:pPr>
             <a:r>
               <a:rPr/>
-              <a:t>Precision agriculture UML data model</a:t>
+              <a:t>Precision agriculture UML data model, blue = domain level, green = application level</a:t>
             </a:r>
           </a:p>
         </p:txBody>

</xml_diff>

<commit_message>
Deploying to gh-pages from @ ManuelePasini/slides-markdown@a4386a929cc0c81b25aefc9b03adf967bc42dcaf 🚀
</commit_message>
<xml_diff>
--- a/phd_secondyear.pptx
+++ b/phd_secondyear.pptx
@@ -3486,7 +3486,7 @@
             <a:pPr lvl="0"/>
             <a:r>
               <a:rPr/>
-              <a:t>DT data involve highly interconnected entities (e.g., a fruit tree and the IoT network describing it), suggesting the use of graph data layout for efficient storage and querying…</a:t>
+              <a:t>DT data involve highly interconnected entities (e.g., a fruit tree and the IoT network describing it), suggesting the use of graph data layout for efficient modelling and querying…</a:t>
             </a:r>
           </a:p>
           <a:p>
@@ -4532,7 +4532,7 @@
             <a:pPr lvl="1"/>
             <a:r>
               <a:rPr b="1"/>
-              <a:t>Standardization should begin at the data layer</a:t>
+              <a:t>Standardization should begin at the data layer!</a:t>
             </a:r>
           </a:p>
         </p:txBody>
@@ -4958,7 +4958,7 @@
             </a:pPr>
             <a:r>
               <a:rPr/>
-              <a:t>Precision agriculture UML data model, blue = domain level, green = application level</a:t>
+              <a:t>Precision agriculture UML data model, blue = domain level entities, green = application level entities</a:t>
             </a:r>
           </a:p>
         </p:txBody>

</xml_diff>